<commit_message>
feat: Update live streaming service presentation
</commit_message>
<xml_diff>
--- a/Documents/live-streaming-service-presentation.pptx
+++ b/Documents/live-streaming-service-presentation.pptx
@@ -14,6 +14,10 @@
     <p:sldId id="262" r:id="rId8"/>
     <p:sldId id="263" r:id="rId9"/>
     <p:sldId id="264" r:id="rId10"/>
+    <p:sldId id="265" r:id="rId11"/>
+    <p:sldId id="266" r:id="rId12"/>
+    <p:sldId id="267" r:id="rId13"/>
+    <p:sldId id="268" r:id="rId14"/>
   </p:sldIdLst>
   <p:sldSz cx="12192000" cy="6858000"/>
   <p:notesSz cx="6858000" cy="9144000"/>
@@ -112,6 +116,11 @@
       </a:defRPr>
     </a:lvl9pPr>
   </p:defaultTextStyle>
+  <p:extLst>
+    <p:ext uri="{EFAFB233-063F-42B5-8137-9DF3F51BA10A}">
+      <p15:sldGuideLst xmlns:p15="http://schemas.microsoft.com/office/powerpoint/2012/main"/>
+    </p:ext>
+  </p:extLst>
 </p:presentation>
 </file>
 
@@ -3311,7 +3320,7 @@
           <a:p>
             <a:fld id="{F2EE3B7B-C7B5-42CF-90CF-67B3D21B2314}" type="datetime1">
               <a:rPr lang="en-US" smtClean="0"/>
-              <a:t>5/11/2025</a:t>
+              <a:t>5/13/2025</a:t>
             </a:fld>
             <a:endParaRPr lang="en-US"/>
           </a:p>
@@ -3524,7 +3533,7 @@
           <a:p>
             <a:fld id="{6BAD9902-F134-45BD-ABD2-80C28059B090}" type="datetime1">
               <a:rPr lang="en-US" smtClean="0"/>
-              <a:t>5/11/2025</a:t>
+              <a:t>5/13/2025</a:t>
             </a:fld>
             <a:endParaRPr lang="en-US"/>
           </a:p>
@@ -3736,7 +3745,7 @@
           <a:p>
             <a:fld id="{C2B04DB0-379A-41B7-9B29-7F42F0D571D5}" type="datetime1">
               <a:rPr lang="en-US" smtClean="0"/>
-              <a:t>5/11/2025</a:t>
+              <a:t>5/13/2025</a:t>
             </a:fld>
             <a:endParaRPr lang="en-US"/>
           </a:p>
@@ -3937,7 +3946,7 @@
           <a:p>
             <a:fld id="{0F996519-E62D-4F8C-AE1E-36928EC7D15C}" type="datetime1">
               <a:rPr lang="en-US" smtClean="0"/>
-              <a:t>5/11/2025</a:t>
+              <a:t>5/13/2025</a:t>
             </a:fld>
             <a:endParaRPr lang="en-US"/>
           </a:p>
@@ -4220,7 +4229,7 @@
           <a:p>
             <a:fld id="{6477AEB6-FCE1-4CD5-923B-84E54F1460D5}" type="datetime1">
               <a:rPr lang="en-US" smtClean="0"/>
-              <a:t>5/11/2025</a:t>
+              <a:t>5/13/2025</a:t>
             </a:fld>
             <a:endParaRPr lang="en-US"/>
           </a:p>
@@ -4532,7 +4541,7 @@
           <a:p>
             <a:fld id="{96374C2F-71A1-43C9-B2F6-A4FAC8157F1A}" type="datetime1">
               <a:rPr lang="en-US" smtClean="0"/>
-              <a:t>5/11/2025</a:t>
+              <a:t>5/13/2025</a:t>
             </a:fld>
             <a:endParaRPr lang="en-US"/>
           </a:p>
@@ -4953,7 +4962,7 @@
           <a:p>
             <a:fld id="{AD631DCC-9916-4BB7-A2E9-25EC84C740A7}" type="datetime1">
               <a:rPr lang="en-US" smtClean="0"/>
-              <a:t>5/11/2025</a:t>
+              <a:t>5/13/2025</a:t>
             </a:fld>
             <a:endParaRPr lang="en-US"/>
           </a:p>
@@ -5103,7 +5112,7 @@
           <a:p>
             <a:fld id="{AF59146A-335D-4B7F-86AE-5D483B1F631C}" type="datetime1">
               <a:rPr lang="en-US" smtClean="0"/>
-              <a:t>5/11/2025</a:t>
+              <a:t>5/13/2025</a:t>
             </a:fld>
             <a:endParaRPr lang="en-US"/>
           </a:p>
@@ -5219,7 +5228,7 @@
           <a:p>
             <a:fld id="{DD71D8EC-8E17-4CE6-99C2-C22488572868}" type="datetime1">
               <a:rPr lang="en-US" smtClean="0"/>
-              <a:t>5/11/2025</a:t>
+              <a:t>5/13/2025</a:t>
             </a:fld>
             <a:endParaRPr lang="en-US"/>
           </a:p>
@@ -5535,7 +5544,7 @@
           <a:p>
             <a:fld id="{9A750ABA-DFFA-4B13-BB77-624D9164A38B}" type="datetime1">
               <a:rPr lang="en-US" smtClean="0"/>
-              <a:t>5/11/2025</a:t>
+              <a:t>5/13/2025</a:t>
             </a:fld>
             <a:endParaRPr lang="en-US"/>
           </a:p>
@@ -5835,7 +5844,7 @@
           <a:p>
             <a:fld id="{3220A08F-2B1D-4498-A043-7C299B1C2561}" type="datetime1">
               <a:rPr lang="en-US" smtClean="0"/>
-              <a:t>5/11/2025</a:t>
+              <a:t>5/13/2025</a:t>
             </a:fld>
             <a:endParaRPr lang="en-US"/>
           </a:p>
@@ -6079,7 +6088,7 @@
           <a:p>
             <a:fld id="{567E9B64-DC09-41C8-9DE3-DA74AF8D2F97}" type="datetime1">
               <a:rPr lang="en-US" smtClean="0"/>
-              <a:t>5/11/2025</a:t>
+              <a:t>5/13/2025</a:t>
             </a:fld>
             <a:endParaRPr lang="en-US" dirty="0"/>
           </a:p>
@@ -6774,7 +6783,7 @@
 </p:sld>
 </file>
 
-<file path=ppt/slides/slide2.xml><?xml version="1.0" encoding="utf-8"?>
+<file path=ppt/slides/slide10.xml><?xml version="1.0" encoding="utf-8"?>
 <p:sld xmlns:a="http://schemas.openxmlformats.org/drawingml/2006/main" xmlns:r="http://schemas.openxmlformats.org/officeDocument/2006/relationships" xmlns:p="http://schemas.openxmlformats.org/presentationml/2006/main">
   <p:cSld>
     <p:bg>
@@ -6804,7 +6813,7 @@
           <p:cNvPr id="13" name="Rectangle 12">
             <a:extLst>
               <a:ext uri="{FF2B5EF4-FFF2-40B4-BE49-F238E27FC236}">
-                <a16:creationId xmlns:a16="http://schemas.microsoft.com/office/drawing/2014/main" id="{FA6B3B35-324C-0E4F-9288-7DF50CE9FE4A}"/>
+                <a16:creationId xmlns:a16="http://schemas.microsoft.com/office/drawing/2014/main" id="{332F2A31-C129-2298-9973-26A0E0FAAEFD}"/>
               </a:ext>
               <a:ext uri="{C183D7F6-B498-43B3-948B-1728B52AA6E4}">
                 <adec:decorative xmlns:adec="http://schemas.microsoft.com/office/drawing/2017/decorative" val="1"/>
@@ -6880,6 +6889,1891 @@
           <p:cNvPr id="2" name="Title 1">
             <a:extLst>
               <a:ext uri="{FF2B5EF4-FFF2-40B4-BE49-F238E27FC236}">
+                <a16:creationId xmlns:a16="http://schemas.microsoft.com/office/drawing/2014/main" id="{9CD8A768-6B06-EBA9-8A36-58CDF99F345D}"/>
+              </a:ext>
+            </a:extLst>
+          </p:cNvPr>
+          <p:cNvSpPr>
+            <a:spLocks noGrp="1"/>
+          </p:cNvSpPr>
+          <p:nvPr>
+            <p:ph type="title"/>
+          </p:nvPr>
+        </p:nvSpPr>
+        <p:spPr>
+          <a:xfrm>
+            <a:off x="308388" y="749808"/>
+            <a:ext cx="5093863" cy="1811482"/>
+          </a:xfrm>
+        </p:spPr>
+        <p:txBody>
+          <a:bodyPr anchor="t">
+            <a:normAutofit/>
+          </a:bodyPr>
+          <a:lstStyle/>
+          <a:p>
+            <a:r>
+              <a:rPr lang="en-US" dirty="0" err="1"/>
+              <a:t>Tervezett</a:t>
+            </a:r>
+            <a:r>
+              <a:rPr lang="en-US" dirty="0"/>
+              <a:t> </a:t>
+            </a:r>
+            <a:r>
+              <a:rPr lang="en-US" dirty="0" err="1"/>
+              <a:t>funkciók</a:t>
+            </a:r>
+            <a:endParaRPr lang="en-GB" dirty="0"/>
+          </a:p>
+        </p:txBody>
+      </p:sp>
+      <p:sp>
+        <p:nvSpPr>
+          <p:cNvPr id="4" name="Date Placeholder 3">
+            <a:extLst>
+              <a:ext uri="{FF2B5EF4-FFF2-40B4-BE49-F238E27FC236}">
+                <a16:creationId xmlns:a16="http://schemas.microsoft.com/office/drawing/2014/main" id="{CFF1DA14-9EE6-178C-B2CB-011EA2A73C3E}"/>
+              </a:ext>
+            </a:extLst>
+          </p:cNvPr>
+          <p:cNvSpPr>
+            <a:spLocks noGrp="1"/>
+          </p:cNvSpPr>
+          <p:nvPr>
+            <p:ph type="dt" sz="half" idx="10"/>
+          </p:nvPr>
+        </p:nvSpPr>
+        <p:spPr>
+          <a:xfrm>
+            <a:off x="340137" y="63202"/>
+            <a:ext cx="2743200" cy="318221"/>
+          </a:xfrm>
+        </p:spPr>
+        <p:txBody>
+          <a:bodyPr>
+            <a:normAutofit/>
+          </a:bodyPr>
+          <a:lstStyle/>
+          <a:p>
+            <a:pPr>
+              <a:spcAft>
+                <a:spcPts val="600"/>
+              </a:spcAft>
+            </a:pPr>
+            <a:fld id="{0F996519-E62D-4F8C-AE1E-36928EC7D15C}" type="datetime1">
+              <a:rPr lang="en-US" smtClean="0"/>
+              <a:pPr>
+                <a:spcAft>
+                  <a:spcPts val="600"/>
+                </a:spcAft>
+              </a:pPr>
+              <a:t>5/13/2025</a:t>
+            </a:fld>
+            <a:endParaRPr lang="en-US"/>
+          </a:p>
+        </p:txBody>
+      </p:sp>
+      <p:sp>
+        <p:nvSpPr>
+          <p:cNvPr id="3" name="Content Placeholder 2">
+            <a:extLst>
+              <a:ext uri="{FF2B5EF4-FFF2-40B4-BE49-F238E27FC236}">
+                <a16:creationId xmlns:a16="http://schemas.microsoft.com/office/drawing/2014/main" id="{0029D888-D292-A4C3-4421-8C123800285A}"/>
+              </a:ext>
+            </a:extLst>
+          </p:cNvPr>
+          <p:cNvSpPr>
+            <a:spLocks noGrp="1"/>
+          </p:cNvSpPr>
+          <p:nvPr>
+            <p:ph idx="1"/>
+          </p:nvPr>
+        </p:nvSpPr>
+        <p:spPr>
+          <a:xfrm>
+            <a:off x="340137" y="2574488"/>
+            <a:ext cx="5062115" cy="3547872"/>
+          </a:xfrm>
+        </p:spPr>
+        <p:txBody>
+          <a:bodyPr anchor="b">
+            <a:normAutofit/>
+          </a:bodyPr>
+          <a:lstStyle/>
+          <a:p>
+            <a:pPr>
+              <a:lnSpc>
+                <a:spcPct val="110000"/>
+              </a:lnSpc>
+              <a:buFont typeface="Arial" panose="020B0604020202020204" pitchFamily="34" charset="0"/>
+              <a:buChar char="•"/>
+            </a:pPr>
+            <a:r>
+              <a:rPr lang="hu-HU" sz="1500" b="0" i="0">
+                <a:effectLst/>
+                <a:latin typeface="Segoe WPC"/>
+              </a:rPr>
+              <a:t>Felhasználói regisztráció és bejelentkezés (JWT alapú hitelesítés)</a:t>
+            </a:r>
+          </a:p>
+          <a:p>
+            <a:pPr>
+              <a:lnSpc>
+                <a:spcPct val="110000"/>
+              </a:lnSpc>
+              <a:buFont typeface="Arial" panose="020B0604020202020204" pitchFamily="34" charset="0"/>
+              <a:buChar char="•"/>
+            </a:pPr>
+            <a:r>
+              <a:rPr lang="hu-HU" sz="1500" b="0" i="0">
+                <a:effectLst/>
+                <a:latin typeface="Segoe WPC"/>
+              </a:rPr>
+              <a:t>Élő </a:t>
+            </a:r>
+            <a:r>
+              <a:rPr lang="hu-HU" sz="1500" b="0" i="0" err="1">
+                <a:effectLst/>
+                <a:latin typeface="Segoe WPC"/>
+              </a:rPr>
+              <a:t>stream</a:t>
+            </a:r>
+            <a:r>
+              <a:rPr lang="hu-HU" sz="1500" b="0" i="0">
+                <a:effectLst/>
+                <a:latin typeface="Segoe WPC"/>
+              </a:rPr>
+              <a:t> indítása egyedi </a:t>
+            </a:r>
+            <a:r>
+              <a:rPr lang="hu-HU" sz="1500" b="0" i="0" err="1">
+                <a:effectLst/>
+                <a:latin typeface="Segoe WPC"/>
+              </a:rPr>
+              <a:t>stream</a:t>
+            </a:r>
+            <a:r>
+              <a:rPr lang="hu-HU" sz="1500" b="0" i="0">
+                <a:effectLst/>
+                <a:latin typeface="Segoe WPC"/>
+              </a:rPr>
+              <a:t> kulccsal</a:t>
+            </a:r>
+          </a:p>
+          <a:p>
+            <a:pPr>
+              <a:lnSpc>
+                <a:spcPct val="110000"/>
+              </a:lnSpc>
+              <a:buFont typeface="Arial" panose="020B0604020202020204" pitchFamily="34" charset="0"/>
+              <a:buChar char="•"/>
+            </a:pPr>
+            <a:r>
+              <a:rPr lang="hu-HU" sz="1500" b="0" i="0" err="1">
+                <a:effectLst/>
+                <a:latin typeface="Segoe WPC"/>
+              </a:rPr>
+              <a:t>Streamek</a:t>
+            </a:r>
+            <a:r>
+              <a:rPr lang="hu-HU" sz="1500" b="0" i="0">
+                <a:effectLst/>
+                <a:latin typeface="Segoe WPC"/>
+              </a:rPr>
+              <a:t> böngészése, nézése valós idejű nézőszámlálással</a:t>
+            </a:r>
+          </a:p>
+          <a:p>
+            <a:pPr>
+              <a:lnSpc>
+                <a:spcPct val="110000"/>
+              </a:lnSpc>
+              <a:buFont typeface="Arial" panose="020B0604020202020204" pitchFamily="34" charset="0"/>
+              <a:buChar char="•"/>
+            </a:pPr>
+            <a:r>
+              <a:rPr lang="hu-HU" sz="1500" b="0" i="0" err="1">
+                <a:effectLst/>
+                <a:latin typeface="Segoe WPC"/>
+              </a:rPr>
+              <a:t>Stream</a:t>
+            </a:r>
+            <a:r>
+              <a:rPr lang="hu-HU" sz="1500" b="0" i="0">
+                <a:effectLst/>
+                <a:latin typeface="Segoe WPC"/>
+              </a:rPr>
+              <a:t> ajánlások (népszerűség, követések alapján)</a:t>
+            </a:r>
+          </a:p>
+          <a:p>
+            <a:pPr>
+              <a:lnSpc>
+                <a:spcPct val="110000"/>
+              </a:lnSpc>
+              <a:buFont typeface="Arial" panose="020B0604020202020204" pitchFamily="34" charset="0"/>
+              <a:buChar char="•"/>
+            </a:pPr>
+            <a:r>
+              <a:rPr lang="hu-HU" sz="1500" b="0" i="0">
+                <a:effectLst/>
+                <a:latin typeface="Segoe WPC"/>
+              </a:rPr>
+              <a:t>Követés funkció (</a:t>
+            </a:r>
+            <a:r>
+              <a:rPr lang="hu-HU" sz="1500" b="0" i="0" err="1">
+                <a:effectLst/>
+                <a:latin typeface="Segoe WPC"/>
+              </a:rPr>
+              <a:t>streamerek</a:t>
+            </a:r>
+            <a:r>
+              <a:rPr lang="hu-HU" sz="1500" b="0" i="0">
+                <a:effectLst/>
+                <a:latin typeface="Segoe WPC"/>
+              </a:rPr>
+              <a:t> követése, élő státusz megjelenítése)</a:t>
+            </a:r>
+          </a:p>
+          <a:p>
+            <a:pPr>
+              <a:lnSpc>
+                <a:spcPct val="110000"/>
+              </a:lnSpc>
+              <a:buFont typeface="Arial" panose="020B0604020202020204" pitchFamily="34" charset="0"/>
+              <a:buChar char="•"/>
+            </a:pPr>
+            <a:r>
+              <a:rPr lang="hu-HU" sz="1500" b="0" i="0">
+                <a:effectLst/>
+                <a:latin typeface="Segoe WPC"/>
+              </a:rPr>
+              <a:t>Modern, reszponzív webes felület (</a:t>
+            </a:r>
+            <a:r>
+              <a:rPr lang="hu-HU" sz="1500" b="0" i="0" err="1">
+                <a:effectLst/>
+                <a:latin typeface="Segoe WPC"/>
+              </a:rPr>
+              <a:t>Angular</a:t>
+            </a:r>
+            <a:r>
+              <a:rPr lang="hu-HU" sz="1500" b="0" i="0">
+                <a:effectLst/>
+                <a:latin typeface="Segoe WPC"/>
+              </a:rPr>
+              <a:t> frontend)</a:t>
+            </a:r>
+            <a:endParaRPr lang="en-US" sz="1500" b="0" i="0">
+              <a:effectLst/>
+              <a:latin typeface="Segoe WPC"/>
+            </a:endParaRPr>
+          </a:p>
+          <a:p>
+            <a:pPr>
+              <a:lnSpc>
+                <a:spcPct val="110000"/>
+              </a:lnSpc>
+              <a:buFont typeface="Arial" panose="020B0604020202020204" pitchFamily="34" charset="0"/>
+              <a:buChar char="•"/>
+            </a:pPr>
+            <a:r>
+              <a:rPr lang="en-US" sz="1500" err="1">
+                <a:latin typeface="Segoe WPC"/>
+              </a:rPr>
+              <a:t>Mikroszolgáltatás</a:t>
+            </a:r>
+            <a:r>
+              <a:rPr lang="en-US" sz="1500">
+                <a:latin typeface="Segoe WPC"/>
+              </a:rPr>
+              <a:t> </a:t>
+            </a:r>
+            <a:r>
+              <a:rPr lang="en-US" sz="1500" err="1">
+                <a:latin typeface="Segoe WPC"/>
+              </a:rPr>
+              <a:t>architektúra</a:t>
+            </a:r>
+            <a:r>
+              <a:rPr lang="en-US" sz="1500">
+                <a:latin typeface="Segoe WPC"/>
+              </a:rPr>
+              <a:t> </a:t>
+            </a:r>
+            <a:r>
+              <a:rPr lang="en-US" sz="1500" err="1">
+                <a:latin typeface="Segoe WPC"/>
+              </a:rPr>
+              <a:t>Kubernetesben</a:t>
+            </a:r>
+            <a:endParaRPr lang="hu-HU" sz="1500" b="0" i="0">
+              <a:effectLst/>
+              <a:latin typeface="Segoe WPC"/>
+            </a:endParaRPr>
+          </a:p>
+          <a:p>
+            <a:pPr>
+              <a:lnSpc>
+                <a:spcPct val="110000"/>
+              </a:lnSpc>
+            </a:pPr>
+            <a:endParaRPr lang="en-GB" sz="1500"/>
+          </a:p>
+        </p:txBody>
+      </p:sp>
+      <p:pic>
+        <p:nvPicPr>
+          <p:cNvPr id="8" name="Picture 7" descr="A pen and a roll of blueprints&#10;&#10;AI-generated content may be incorrect.">
+            <a:extLst>
+              <a:ext uri="{FF2B5EF4-FFF2-40B4-BE49-F238E27FC236}">
+                <a16:creationId xmlns:a16="http://schemas.microsoft.com/office/drawing/2014/main" id="{2C41E366-6286-A3A8-3FAB-28C07F0A80DB}"/>
+              </a:ext>
+            </a:extLst>
+          </p:cNvPr>
+          <p:cNvPicPr>
+            <a:picLocks noChangeAspect="1"/>
+          </p:cNvPicPr>
+          <p:nvPr/>
+        </p:nvPicPr>
+        <p:blipFill>
+          <a:blip r:embed="rId2">
+            <a:extLst>
+              <a:ext uri="{28A0092B-C50C-407E-A947-70E740481C1C}">
+                <a14:useLocalDpi xmlns:a14="http://schemas.microsoft.com/office/drawing/2010/main" val="0"/>
+              </a:ext>
+            </a:extLst>
+          </a:blip>
+          <a:srcRect l="52429" r="4976" b="-2"/>
+          <a:stretch/>
+        </p:blipFill>
+        <p:spPr>
+          <a:xfrm>
+            <a:off x="7156290" y="78539"/>
+            <a:ext cx="4963886" cy="6700922"/>
+          </a:xfrm>
+          <a:custGeom>
+            <a:avLst/>
+            <a:gdLst/>
+            <a:ahLst/>
+            <a:cxnLst/>
+            <a:rect l="l" t="t" r="r" b="b"/>
+            <a:pathLst>
+              <a:path w="4963886" h="6700922">
+                <a:moveTo>
+                  <a:pt x="678017" y="0"/>
+                </a:moveTo>
+                <a:lnTo>
+                  <a:pt x="4285869" y="0"/>
+                </a:lnTo>
+                <a:cubicBezTo>
+                  <a:pt x="4660327" y="0"/>
+                  <a:pt x="4963886" y="303559"/>
+                  <a:pt x="4963886" y="678017"/>
+                </a:cubicBezTo>
+                <a:lnTo>
+                  <a:pt x="4963886" y="6022905"/>
+                </a:lnTo>
+                <a:cubicBezTo>
+                  <a:pt x="4963886" y="6397363"/>
+                  <a:pt x="4660327" y="6700922"/>
+                  <a:pt x="4285869" y="6700922"/>
+                </a:cubicBezTo>
+                <a:lnTo>
+                  <a:pt x="678017" y="6700922"/>
+                </a:lnTo>
+                <a:cubicBezTo>
+                  <a:pt x="303559" y="6700922"/>
+                  <a:pt x="0" y="6397363"/>
+                  <a:pt x="0" y="6022905"/>
+                </a:cubicBezTo>
+                <a:lnTo>
+                  <a:pt x="0" y="678017"/>
+                </a:lnTo>
+                <a:cubicBezTo>
+                  <a:pt x="0" y="303559"/>
+                  <a:pt x="303559" y="0"/>
+                  <a:pt x="678017" y="0"/>
+                </a:cubicBezTo>
+                <a:close/>
+              </a:path>
+            </a:pathLst>
+          </a:custGeom>
+        </p:spPr>
+      </p:pic>
+      <p:sp>
+        <p:nvSpPr>
+          <p:cNvPr id="6" name="Slide Number Placeholder 5">
+            <a:extLst>
+              <a:ext uri="{FF2B5EF4-FFF2-40B4-BE49-F238E27FC236}">
+                <a16:creationId xmlns:a16="http://schemas.microsoft.com/office/drawing/2014/main" id="{6CB7894D-B3F9-35AB-0789-AD6ED141619A}"/>
+              </a:ext>
+            </a:extLst>
+          </p:cNvPr>
+          <p:cNvSpPr>
+            <a:spLocks noGrp="1"/>
+          </p:cNvSpPr>
+          <p:nvPr>
+            <p:ph type="sldNum" sz="quarter" idx="12"/>
+          </p:nvPr>
+        </p:nvSpPr>
+        <p:spPr>
+          <a:xfrm>
+            <a:off x="11403951" y="6425816"/>
+            <a:ext cx="429768" cy="365125"/>
+          </a:xfrm>
+        </p:spPr>
+        <p:txBody>
+          <a:bodyPr>
+            <a:normAutofit/>
+          </a:bodyPr>
+          <a:lstStyle/>
+          <a:p>
+            <a:pPr>
+              <a:spcAft>
+                <a:spcPts val="600"/>
+              </a:spcAft>
+            </a:pPr>
+            <a:fld id="{6E91CC32-6A6B-4E2E-BBA1-6864F305DA26}" type="slidenum">
+              <a:rPr lang="en-US">
+                <a:solidFill>
+                  <a:srgbClr val="FFFFFF"/>
+                </a:solidFill>
+              </a:rPr>
+              <a:pPr>
+                <a:spcAft>
+                  <a:spcPts val="600"/>
+                </a:spcAft>
+              </a:pPr>
+              <a:t>10</a:t>
+            </a:fld>
+            <a:endParaRPr lang="en-US">
+              <a:solidFill>
+                <a:srgbClr val="FFFFFF"/>
+              </a:solidFill>
+            </a:endParaRPr>
+          </a:p>
+        </p:txBody>
+      </p:sp>
+    </p:spTree>
+    <p:extLst>
+      <p:ext uri="{BB962C8B-B14F-4D97-AF65-F5344CB8AC3E}">
+        <p14:creationId xmlns:p14="http://schemas.microsoft.com/office/powerpoint/2010/main" val="603732772"/>
+      </p:ext>
+    </p:extLst>
+  </p:cSld>
+  <p:clrMapOvr>
+    <a:masterClrMapping/>
+  </p:clrMapOvr>
+</p:sld>
+</file>
+
+<file path=ppt/slides/slide11.xml><?xml version="1.0" encoding="utf-8"?>
+<p:sld xmlns:a="http://schemas.openxmlformats.org/drawingml/2006/main" xmlns:r="http://schemas.openxmlformats.org/officeDocument/2006/relationships" xmlns:p="http://schemas.openxmlformats.org/presentationml/2006/main">
+  <p:cSld>
+    <p:bg>
+      <p:bgPr>
+        <a:solidFill>
+          <a:schemeClr val="bg1"/>
+        </a:solidFill>
+        <a:effectLst/>
+      </p:bgPr>
+    </p:bg>
+    <p:spTree>
+      <p:nvGrpSpPr>
+        <p:cNvPr id="1" name=""/>
+        <p:cNvGrpSpPr/>
+        <p:nvPr/>
+      </p:nvGrpSpPr>
+      <p:grpSpPr>
+        <a:xfrm>
+          <a:off x="0" y="0"/>
+          <a:ext cx="0" cy="0"/>
+          <a:chOff x="0" y="0"/>
+          <a:chExt cx="0" cy="0"/>
+        </a:xfrm>
+      </p:grpSpPr>
+      <p:sp>
+        <p:nvSpPr>
+          <p:cNvPr id="32" name="Rectangle 31">
+            <a:extLst>
+              <a:ext uri="{FF2B5EF4-FFF2-40B4-BE49-F238E27FC236}">
+                <a16:creationId xmlns:a16="http://schemas.microsoft.com/office/drawing/2014/main" id="{80E9F74D-F55F-F7B2-75C2-14DECC31E69C}"/>
+              </a:ext>
+              <a:ext uri="{C183D7F6-B498-43B3-948B-1728B52AA6E4}">
+                <adec:decorative xmlns:adec="http://schemas.microsoft.com/office/drawing/2017/decorative" val="1"/>
+              </a:ext>
+            </a:extLst>
+          </p:cNvPr>
+          <p:cNvSpPr>
+            <a:spLocks noGrp="1" noRot="1" noChangeAspect="1" noMove="1" noResize="1" noEditPoints="1" noAdjustHandles="1" noChangeArrowheads="1" noChangeShapeType="1" noTextEdit="1"/>
+          </p:cNvSpPr>
+          <p:nvPr>
+            <p:extLst>
+              <p:ext uri="{386F3935-93C4-4BCD-93E2-E3B085C9AB24}">
+                <p16:designElem xmlns:p16="http://schemas.microsoft.com/office/powerpoint/2015/main" val="1"/>
+              </p:ext>
+            </p:extLst>
+          </p:nvPr>
+        </p:nvSpPr>
+        <p:spPr>
+          <a:xfrm>
+            <a:off x="0" y="0"/>
+            <a:ext cx="12192000" cy="6858000"/>
+          </a:xfrm>
+          <a:prstGeom prst="rect">
+            <a:avLst/>
+          </a:prstGeom>
+          <a:solidFill>
+            <a:schemeClr val="tx1"/>
+          </a:solidFill>
+          <a:ln w="12700" cap="flat" cmpd="sng" algn="ctr">
+            <a:noFill/>
+            <a:prstDash val="solid"/>
+            <a:miter lim="800000"/>
+          </a:ln>
+          <a:effectLst/>
+        </p:spPr>
+        <p:style>
+          <a:lnRef idx="2">
+            <a:schemeClr val="accent1">
+              <a:shade val="50000"/>
+            </a:schemeClr>
+          </a:lnRef>
+          <a:fillRef idx="1">
+            <a:schemeClr val="accent1"/>
+          </a:fillRef>
+          <a:effectRef idx="0">
+            <a:schemeClr val="accent1"/>
+          </a:effectRef>
+          <a:fontRef idx="minor">
+            <a:schemeClr val="lt1"/>
+          </a:fontRef>
+        </p:style>
+        <p:txBody>
+          <a:bodyPr rtlCol="0" anchor="ctr"/>
+          <a:lstStyle/>
+          <a:p>
+            <a:pPr algn="ctr"/>
+            <a:endParaRPr lang="en-US"/>
+          </a:p>
+        </p:txBody>
+      </p:sp>
+      <p:sp useBgFill="1">
+        <p:nvSpPr>
+          <p:cNvPr id="34" name="Freeform: Shape 33">
+            <a:extLst>
+              <a:ext uri="{FF2B5EF4-FFF2-40B4-BE49-F238E27FC236}">
+                <a16:creationId xmlns:a16="http://schemas.microsoft.com/office/drawing/2014/main" id="{710A2054-FB7A-EA09-5DA6-8CFF315208C7}"/>
+              </a:ext>
+              <a:ext uri="{C183D7F6-B498-43B3-948B-1728B52AA6E4}">
+                <adec:decorative xmlns:adec="http://schemas.microsoft.com/office/drawing/2017/decorative" val="1"/>
+              </a:ext>
+            </a:extLst>
+          </p:cNvPr>
+          <p:cNvSpPr>
+            <a:spLocks noGrp="1" noRot="1" noChangeAspect="1" noMove="1" noResize="1" noEditPoints="1" noAdjustHandles="1" noChangeArrowheads="1" noChangeShapeType="1" noTextEdit="1"/>
+          </p:cNvSpPr>
+          <p:nvPr>
+            <p:extLst>
+              <p:ext uri="{386F3935-93C4-4BCD-93E2-E3B085C9AB24}">
+                <p16:designElem xmlns:p16="http://schemas.microsoft.com/office/powerpoint/2015/main" val="1"/>
+              </p:ext>
+            </p:extLst>
+          </p:nvPr>
+        </p:nvSpPr>
+        <p:spPr>
+          <a:xfrm flipH="1">
+            <a:off x="-18379" y="0"/>
+            <a:ext cx="5058469" cy="6874453"/>
+          </a:xfrm>
+          <a:custGeom>
+            <a:avLst/>
+            <a:gdLst>
+              <a:gd name="connsiteX0" fmla="*/ 679539 w 5058469"/>
+              <a:gd name="connsiteY0" fmla="*/ 0 h 6874453"/>
+              <a:gd name="connsiteX1" fmla="*/ 5058469 w 5058469"/>
+              <a:gd name="connsiteY1" fmla="*/ 0 h 6874453"/>
+              <a:gd name="connsiteX2" fmla="*/ 5058469 w 5058469"/>
+              <a:gd name="connsiteY2" fmla="*/ 6874453 h 6874453"/>
+              <a:gd name="connsiteX3" fmla="*/ 679539 w 5058469"/>
+              <a:gd name="connsiteY3" fmla="*/ 6874453 h 6874453"/>
+              <a:gd name="connsiteX4" fmla="*/ 0 w 5058469"/>
+              <a:gd name="connsiteY4" fmla="*/ 6194913 h 6874453"/>
+              <a:gd name="connsiteX5" fmla="*/ 0 w 5058469"/>
+              <a:gd name="connsiteY5" fmla="*/ 679540 h 6874453"/>
+              <a:gd name="connsiteX6" fmla="*/ 679539 w 5058469"/>
+              <a:gd name="connsiteY6" fmla="*/ 0 h 6874453"/>
+            </a:gdLst>
+            <a:ahLst/>
+            <a:cxnLst>
+              <a:cxn ang="0">
+                <a:pos x="connsiteX0" y="connsiteY0"/>
+              </a:cxn>
+              <a:cxn ang="0">
+                <a:pos x="connsiteX1" y="connsiteY1"/>
+              </a:cxn>
+              <a:cxn ang="0">
+                <a:pos x="connsiteX2" y="connsiteY2"/>
+              </a:cxn>
+              <a:cxn ang="0">
+                <a:pos x="connsiteX3" y="connsiteY3"/>
+              </a:cxn>
+              <a:cxn ang="0">
+                <a:pos x="connsiteX4" y="connsiteY4"/>
+              </a:cxn>
+              <a:cxn ang="0">
+                <a:pos x="connsiteX5" y="connsiteY5"/>
+              </a:cxn>
+              <a:cxn ang="0">
+                <a:pos x="connsiteX6" y="connsiteY6"/>
+              </a:cxn>
+            </a:cxnLst>
+            <a:rect l="l" t="t" r="r" b="b"/>
+            <a:pathLst>
+              <a:path w="5058469" h="6874453">
+                <a:moveTo>
+                  <a:pt x="679539" y="0"/>
+                </a:moveTo>
+                <a:lnTo>
+                  <a:pt x="5058469" y="0"/>
+                </a:lnTo>
+                <a:lnTo>
+                  <a:pt x="5058469" y="6874453"/>
+                </a:lnTo>
+                <a:lnTo>
+                  <a:pt x="679539" y="6874453"/>
+                </a:lnTo>
+                <a:cubicBezTo>
+                  <a:pt x="304240" y="6874453"/>
+                  <a:pt x="0" y="6570213"/>
+                  <a:pt x="0" y="6194913"/>
+                </a:cubicBezTo>
+                <a:lnTo>
+                  <a:pt x="0" y="679540"/>
+                </a:lnTo>
+                <a:cubicBezTo>
+                  <a:pt x="0" y="304240"/>
+                  <a:pt x="304240" y="0"/>
+                  <a:pt x="679539" y="0"/>
+                </a:cubicBezTo>
+                <a:close/>
+              </a:path>
+            </a:pathLst>
+          </a:custGeom>
+          <a:ln>
+            <a:noFill/>
+          </a:ln>
+        </p:spPr>
+        <p:style>
+          <a:lnRef idx="2">
+            <a:schemeClr val="accent1">
+              <a:shade val="50000"/>
+            </a:schemeClr>
+          </a:lnRef>
+          <a:fillRef idx="1">
+            <a:schemeClr val="accent1"/>
+          </a:fillRef>
+          <a:effectRef idx="0">
+            <a:schemeClr val="accent1"/>
+          </a:effectRef>
+          <a:fontRef idx="minor">
+            <a:schemeClr val="lt1"/>
+          </a:fontRef>
+        </p:style>
+        <p:txBody>
+          <a:bodyPr wrap="square" rtlCol="0" anchor="ctr">
+            <a:noAutofit/>
+          </a:bodyPr>
+          <a:lstStyle/>
+          <a:p>
+            <a:pPr algn="ctr"/>
+            <a:endParaRPr lang="en-US"/>
+          </a:p>
+        </p:txBody>
+      </p:sp>
+      <p:sp>
+        <p:nvSpPr>
+          <p:cNvPr id="2" name="Title 1">
+            <a:extLst>
+              <a:ext uri="{FF2B5EF4-FFF2-40B4-BE49-F238E27FC236}">
+                <a16:creationId xmlns:a16="http://schemas.microsoft.com/office/drawing/2014/main" id="{C2AF9AD0-DEA2-2068-E31C-EA31C8511DE7}"/>
+              </a:ext>
+            </a:extLst>
+          </p:cNvPr>
+          <p:cNvSpPr>
+            <a:spLocks noGrp="1"/>
+          </p:cNvSpPr>
+          <p:nvPr>
+            <p:ph type="title"/>
+          </p:nvPr>
+        </p:nvSpPr>
+        <p:spPr>
+          <a:xfrm>
+            <a:off x="308387" y="753034"/>
+            <a:ext cx="4256263" cy="1799665"/>
+          </a:xfrm>
+        </p:spPr>
+        <p:txBody>
+          <a:bodyPr vert="horz" lIns="91440" tIns="45720" rIns="91440" bIns="45720" rtlCol="0" anchor="t">
+            <a:normAutofit/>
+          </a:bodyPr>
+          <a:lstStyle/>
+          <a:p>
+            <a:r>
+              <a:rPr lang="en-US" b="1" kern="1200">
+                <a:solidFill>
+                  <a:schemeClr val="tx1"/>
+                </a:solidFill>
+                <a:latin typeface="+mj-lt"/>
+                <a:ea typeface="+mj-ea"/>
+                <a:cs typeface="+mj-cs"/>
+              </a:rPr>
+              <a:t>Architektúra</a:t>
+            </a:r>
+          </a:p>
+        </p:txBody>
+      </p:sp>
+      <p:sp>
+        <p:nvSpPr>
+          <p:cNvPr id="4" name="Date Placeholder 3">
+            <a:extLst>
+              <a:ext uri="{FF2B5EF4-FFF2-40B4-BE49-F238E27FC236}">
+                <a16:creationId xmlns:a16="http://schemas.microsoft.com/office/drawing/2014/main" id="{B00AD029-A571-A284-4A1B-B8F90BF39D3C}"/>
+              </a:ext>
+            </a:extLst>
+          </p:cNvPr>
+          <p:cNvSpPr>
+            <a:spLocks noGrp="1"/>
+          </p:cNvSpPr>
+          <p:nvPr>
+            <p:ph type="dt" sz="half" idx="10"/>
+          </p:nvPr>
+        </p:nvSpPr>
+        <p:spPr>
+          <a:xfrm>
+            <a:off x="340137" y="63202"/>
+            <a:ext cx="2743200" cy="318221"/>
+          </a:xfrm>
+        </p:spPr>
+        <p:txBody>
+          <a:bodyPr vert="horz" lIns="91440" tIns="45720" rIns="91440" bIns="45720" rtlCol="0" anchor="ctr">
+            <a:normAutofit/>
+          </a:bodyPr>
+          <a:lstStyle/>
+          <a:p>
+            <a:pPr>
+              <a:spcAft>
+                <a:spcPts val="600"/>
+              </a:spcAft>
+            </a:pPr>
+            <a:fld id="{0F996519-E62D-4F8C-AE1E-36928EC7D15C}" type="datetime1">
+              <a:rPr lang="en-US" smtClean="0"/>
+              <a:pPr>
+                <a:spcAft>
+                  <a:spcPts val="600"/>
+                </a:spcAft>
+              </a:pPr>
+              <a:t>5/13/2025</a:t>
+            </a:fld>
+            <a:endParaRPr lang="en-US"/>
+          </a:p>
+        </p:txBody>
+      </p:sp>
+      <p:sp>
+        <p:nvSpPr>
+          <p:cNvPr id="16" name="TextBox 15">
+            <a:extLst>
+              <a:ext uri="{FF2B5EF4-FFF2-40B4-BE49-F238E27FC236}">
+                <a16:creationId xmlns:a16="http://schemas.microsoft.com/office/drawing/2014/main" id="{E0D99524-A473-C4B2-40C4-34A45C52CCF4}"/>
+              </a:ext>
+            </a:extLst>
+          </p:cNvPr>
+          <p:cNvSpPr txBox="1"/>
+          <p:nvPr/>
+        </p:nvSpPr>
+        <p:spPr>
+          <a:xfrm>
+            <a:off x="170309" y="1721105"/>
+            <a:ext cx="4532418" cy="3472190"/>
+          </a:xfrm>
+          <a:prstGeom prst="rect">
+            <a:avLst/>
+          </a:prstGeom>
+        </p:spPr>
+        <p:txBody>
+          <a:bodyPr vert="horz" lIns="91440" tIns="45720" rIns="91440" bIns="45720" rtlCol="0" anchor="b">
+            <a:normAutofit/>
+          </a:bodyPr>
+          <a:lstStyle/>
+          <a:p>
+            <a:pPr indent="-228600">
+              <a:lnSpc>
+                <a:spcPct val="110000"/>
+              </a:lnSpc>
+              <a:spcAft>
+                <a:spcPts val="600"/>
+              </a:spcAft>
+              <a:buFont typeface="Arial" panose="020B0604020202020204" pitchFamily="34" charset="0"/>
+              <a:buChar char="•"/>
+            </a:pPr>
+            <a:r>
+              <a:rPr lang="en-US" sz="1100" b="0" i="0" dirty="0" err="1">
+                <a:effectLst/>
+              </a:rPr>
+              <a:t>Mikroszolgáltatás-alapú</a:t>
+            </a:r>
+            <a:r>
+              <a:rPr lang="en-US" sz="1100" b="0" i="0" dirty="0">
+                <a:effectLst/>
+              </a:rPr>
+              <a:t> backend (</a:t>
+            </a:r>
+            <a:r>
+              <a:rPr lang="en-US" sz="1100" b="0" i="0" dirty="0" err="1">
+                <a:effectLst/>
+              </a:rPr>
+              <a:t>különálló</a:t>
+            </a:r>
+            <a:r>
+              <a:rPr lang="en-US" sz="1100" b="0" i="0" dirty="0">
+                <a:effectLst/>
+              </a:rPr>
+              <a:t> </a:t>
+            </a:r>
+            <a:r>
+              <a:rPr lang="en-US" sz="1100" b="0" i="0" dirty="0" err="1">
+                <a:effectLst/>
+              </a:rPr>
+              <a:t>szolgáltatások</a:t>
+            </a:r>
+            <a:r>
+              <a:rPr lang="en-US" sz="1100" b="0" i="0" dirty="0">
+                <a:effectLst/>
+              </a:rPr>
+              <a:t>: Auth, User, Stream, Viewer, Follower)</a:t>
+            </a:r>
+          </a:p>
+          <a:p>
+            <a:pPr indent="-228600">
+              <a:lnSpc>
+                <a:spcPct val="110000"/>
+              </a:lnSpc>
+              <a:spcAft>
+                <a:spcPts val="600"/>
+              </a:spcAft>
+              <a:buFont typeface="Arial" panose="020B0604020202020204" pitchFamily="34" charset="0"/>
+              <a:buChar char="•"/>
+            </a:pPr>
+            <a:r>
+              <a:rPr lang="en-US" sz="1100" b="0" i="0" dirty="0">
+                <a:effectLst/>
+              </a:rPr>
+              <a:t>Minden </a:t>
+            </a:r>
+            <a:r>
+              <a:rPr lang="en-US" sz="1100" b="0" i="0" dirty="0" err="1">
+                <a:effectLst/>
+              </a:rPr>
+              <a:t>fő</a:t>
+            </a:r>
+            <a:r>
+              <a:rPr lang="en-US" sz="1100" b="0" i="0" dirty="0">
+                <a:effectLst/>
+              </a:rPr>
+              <a:t> </a:t>
+            </a:r>
+            <a:r>
+              <a:rPr lang="en-US" sz="1100" b="0" i="0" dirty="0" err="1">
+                <a:effectLst/>
+              </a:rPr>
+              <a:t>komponens</a:t>
+            </a:r>
+            <a:r>
+              <a:rPr lang="en-US" sz="1100" b="0" i="0" dirty="0">
+                <a:effectLst/>
+              </a:rPr>
+              <a:t> </a:t>
+            </a:r>
+            <a:r>
+              <a:rPr lang="en-US" sz="1100" b="0" i="0" dirty="0" err="1">
+                <a:effectLst/>
+              </a:rPr>
+              <a:t>külön</a:t>
+            </a:r>
+            <a:r>
+              <a:rPr lang="en-US" sz="1100" b="0" i="0" dirty="0">
+                <a:effectLst/>
+              </a:rPr>
+              <a:t> </a:t>
+            </a:r>
+            <a:r>
+              <a:rPr lang="en-US" sz="1100" b="0" i="0" dirty="0" err="1">
+                <a:effectLst/>
+              </a:rPr>
+              <a:t>konténerben</a:t>
+            </a:r>
+            <a:r>
+              <a:rPr lang="en-US" sz="1100" b="0" i="0" dirty="0">
+                <a:effectLst/>
+              </a:rPr>
+              <a:t>, Kubernetes </a:t>
+            </a:r>
+            <a:r>
+              <a:rPr lang="en-US" sz="1100" b="0" i="0" dirty="0" err="1">
+                <a:effectLst/>
+              </a:rPr>
+              <a:t>klaszterben</a:t>
+            </a:r>
+            <a:r>
+              <a:rPr lang="en-US" sz="1100" b="0" i="0" dirty="0">
+                <a:effectLst/>
+              </a:rPr>
+              <a:t> </a:t>
+            </a:r>
+            <a:r>
+              <a:rPr lang="en-US" sz="1100" b="0" i="0" dirty="0" err="1">
+                <a:effectLst/>
+              </a:rPr>
+              <a:t>fut</a:t>
+            </a:r>
+            <a:endParaRPr lang="en-US" sz="1100" b="0" i="0" dirty="0">
+              <a:effectLst/>
+            </a:endParaRPr>
+          </a:p>
+          <a:p>
+            <a:pPr indent="-228600">
+              <a:lnSpc>
+                <a:spcPct val="110000"/>
+              </a:lnSpc>
+              <a:spcAft>
+                <a:spcPts val="600"/>
+              </a:spcAft>
+              <a:buFont typeface="Arial" panose="020B0604020202020204" pitchFamily="34" charset="0"/>
+              <a:buChar char="•"/>
+            </a:pPr>
+            <a:r>
+              <a:rPr lang="en-US" sz="1100" b="0" i="0" dirty="0" err="1">
+                <a:effectLst/>
+              </a:rPr>
+              <a:t>Komponensek</a:t>
+            </a:r>
+            <a:r>
+              <a:rPr lang="en-US" sz="1100" b="0" i="0" dirty="0">
+                <a:effectLst/>
+              </a:rPr>
+              <a:t> </a:t>
+            </a:r>
+            <a:r>
+              <a:rPr lang="en-US" sz="1100" b="0" i="0" dirty="0" err="1">
+                <a:effectLst/>
+              </a:rPr>
+              <a:t>közötti</a:t>
+            </a:r>
+            <a:r>
+              <a:rPr lang="en-US" sz="1100" b="0" i="0" dirty="0">
+                <a:effectLst/>
+              </a:rPr>
+              <a:t> </a:t>
+            </a:r>
+            <a:r>
+              <a:rPr lang="en-US" sz="1100" b="0" i="0" dirty="0" err="1">
+                <a:effectLst/>
+              </a:rPr>
+              <a:t>kommunikáció</a:t>
+            </a:r>
+            <a:r>
+              <a:rPr lang="en-US" sz="1100" b="0" i="0" dirty="0">
+                <a:effectLst/>
+              </a:rPr>
+              <a:t>: REST API, WebSocket</a:t>
+            </a:r>
+          </a:p>
+          <a:p>
+            <a:pPr indent="-228600">
+              <a:lnSpc>
+                <a:spcPct val="110000"/>
+              </a:lnSpc>
+              <a:spcAft>
+                <a:spcPts val="600"/>
+              </a:spcAft>
+              <a:buFont typeface="Arial" panose="020B0604020202020204" pitchFamily="34" charset="0"/>
+              <a:buChar char="•"/>
+            </a:pPr>
+            <a:r>
+              <a:rPr lang="en-US" sz="1100" b="0" i="0" dirty="0">
+                <a:effectLst/>
+              </a:rPr>
+              <a:t>Streaming </a:t>
+            </a:r>
+            <a:r>
+              <a:rPr lang="en-US" sz="1100" b="0" i="0" dirty="0" err="1">
+                <a:effectLst/>
+              </a:rPr>
+              <a:t>szerver</a:t>
+            </a:r>
+            <a:r>
+              <a:rPr lang="en-US" sz="1100" b="0" i="0" dirty="0">
+                <a:effectLst/>
+              </a:rPr>
+              <a:t>: Nginx-RTMP (RTMP </a:t>
+            </a:r>
+            <a:r>
+              <a:rPr lang="en-US" sz="1100" b="0" i="0" dirty="0" err="1">
+                <a:effectLst/>
+              </a:rPr>
+              <a:t>fogadás</a:t>
+            </a:r>
+            <a:r>
+              <a:rPr lang="en-US" sz="1100" b="0" i="0" dirty="0">
+                <a:effectLst/>
+              </a:rPr>
+              <a:t>, HLS </a:t>
+            </a:r>
+            <a:r>
+              <a:rPr lang="en-US" sz="1100" b="0" i="0" dirty="0" err="1">
+                <a:effectLst/>
+              </a:rPr>
+              <a:t>továbbítás</a:t>
+            </a:r>
+            <a:r>
+              <a:rPr lang="en-US" sz="1100" b="0" i="0" dirty="0">
+                <a:effectLst/>
+              </a:rPr>
+              <a:t>)</a:t>
+            </a:r>
+          </a:p>
+          <a:p>
+            <a:pPr indent="-228600">
+              <a:lnSpc>
+                <a:spcPct val="110000"/>
+              </a:lnSpc>
+              <a:spcAft>
+                <a:spcPts val="600"/>
+              </a:spcAft>
+              <a:buFont typeface="Arial" panose="020B0604020202020204" pitchFamily="34" charset="0"/>
+              <a:buChar char="•"/>
+            </a:pPr>
+            <a:r>
+              <a:rPr lang="en-US" sz="1100" b="0" i="0" dirty="0" err="1">
+                <a:effectLst/>
+              </a:rPr>
+              <a:t>Adatkezelés</a:t>
+            </a:r>
+            <a:r>
+              <a:rPr lang="en-US" sz="1100" b="0" i="0" dirty="0">
+                <a:effectLst/>
+              </a:rPr>
+              <a:t>: PostgreSQL (</a:t>
+            </a:r>
+            <a:r>
+              <a:rPr lang="en-US" sz="1100" b="0" i="0" dirty="0" err="1">
+                <a:effectLst/>
+              </a:rPr>
+              <a:t>tartós</a:t>
+            </a:r>
+            <a:r>
+              <a:rPr lang="en-US" sz="1100" b="0" i="0" dirty="0">
+                <a:effectLst/>
+              </a:rPr>
+              <a:t> </a:t>
+            </a:r>
+            <a:r>
+              <a:rPr lang="en-US" sz="1100" b="0" i="0" dirty="0" err="1">
+                <a:effectLst/>
+              </a:rPr>
+              <a:t>adatok</a:t>
+            </a:r>
+            <a:r>
+              <a:rPr lang="en-US" sz="1100" b="0" i="0" dirty="0">
+                <a:effectLst/>
+              </a:rPr>
+              <a:t>), Redis (</a:t>
+            </a:r>
+            <a:r>
+              <a:rPr lang="en-US" sz="1100" b="0" i="0" dirty="0" err="1">
+                <a:effectLst/>
+              </a:rPr>
+              <a:t>gyorsítótár</a:t>
+            </a:r>
+            <a:r>
+              <a:rPr lang="en-US" sz="1100" b="0" i="0" dirty="0">
+                <a:effectLst/>
+              </a:rPr>
+              <a:t>, </a:t>
+            </a:r>
+            <a:r>
+              <a:rPr lang="en-US" sz="1100" b="0" i="0" dirty="0" err="1">
+                <a:effectLst/>
+              </a:rPr>
+              <a:t>valós</a:t>
+            </a:r>
+            <a:r>
+              <a:rPr lang="en-US" sz="1100" b="0" i="0" dirty="0">
+                <a:effectLst/>
+              </a:rPr>
+              <a:t> </a:t>
+            </a:r>
+            <a:r>
+              <a:rPr lang="en-US" sz="1100" b="0" i="0" dirty="0" err="1">
+                <a:effectLst/>
+              </a:rPr>
+              <a:t>idejű</a:t>
+            </a:r>
+            <a:r>
+              <a:rPr lang="en-US" sz="1100" b="0" i="0" dirty="0">
+                <a:effectLst/>
+              </a:rPr>
+              <a:t> </a:t>
+            </a:r>
+            <a:r>
+              <a:rPr lang="en-US" sz="1100" b="0" i="0" dirty="0" err="1">
+                <a:effectLst/>
+              </a:rPr>
+              <a:t>nézőszám</a:t>
+            </a:r>
+            <a:r>
+              <a:rPr lang="en-US" sz="1100" b="0" i="0" dirty="0">
+                <a:effectLst/>
+              </a:rPr>
+              <a:t>)</a:t>
+            </a:r>
+          </a:p>
+          <a:p>
+            <a:pPr indent="-228600">
+              <a:lnSpc>
+                <a:spcPct val="110000"/>
+              </a:lnSpc>
+              <a:spcAft>
+                <a:spcPts val="600"/>
+              </a:spcAft>
+              <a:buFont typeface="Arial" panose="020B0604020202020204" pitchFamily="34" charset="0"/>
+              <a:buChar char="•"/>
+            </a:pPr>
+            <a:r>
+              <a:rPr lang="en-US" sz="1100" b="0" i="0" dirty="0">
+                <a:effectLst/>
+              </a:rPr>
+              <a:t>Ingress controller a </a:t>
+            </a:r>
+            <a:r>
+              <a:rPr lang="en-US" sz="1100" b="0" i="0" dirty="0" err="1">
+                <a:effectLst/>
+              </a:rPr>
+              <a:t>külső</a:t>
+            </a:r>
+            <a:r>
+              <a:rPr lang="en-US" sz="1100" b="0" i="0" dirty="0">
+                <a:effectLst/>
+              </a:rPr>
+              <a:t> </a:t>
+            </a:r>
+            <a:r>
+              <a:rPr lang="en-US" sz="1100" b="0" i="0" dirty="0" err="1">
+                <a:effectLst/>
+              </a:rPr>
+              <a:t>forgalom</a:t>
+            </a:r>
+            <a:r>
+              <a:rPr lang="en-US" sz="1100" b="0" i="0" dirty="0">
+                <a:effectLst/>
+              </a:rPr>
+              <a:t> </a:t>
+            </a:r>
+            <a:r>
+              <a:rPr lang="en-US" sz="1100" b="0" i="0" dirty="0" err="1">
+                <a:effectLst/>
+              </a:rPr>
+              <a:t>irányítására</a:t>
+            </a:r>
+            <a:endParaRPr lang="en-US" sz="1100" b="0" i="0" dirty="0">
+              <a:effectLst/>
+            </a:endParaRPr>
+          </a:p>
+          <a:p>
+            <a:pPr indent="-228600">
+              <a:lnSpc>
+                <a:spcPct val="110000"/>
+              </a:lnSpc>
+              <a:spcAft>
+                <a:spcPts val="600"/>
+              </a:spcAft>
+              <a:buFont typeface="Arial" panose="020B0604020202020204" pitchFamily="34" charset="0"/>
+              <a:buChar char="•"/>
+            </a:pPr>
+            <a:r>
+              <a:rPr lang="en-US" sz="1100" b="0" i="0" dirty="0">
+                <a:effectLst/>
+              </a:rPr>
+              <a:t>Frontend: Angular </a:t>
+            </a:r>
+            <a:r>
+              <a:rPr lang="en-US" sz="1100" b="0" i="0" dirty="0" err="1">
+                <a:effectLst/>
+              </a:rPr>
+              <a:t>alapú</a:t>
+            </a:r>
+            <a:r>
+              <a:rPr lang="en-US" sz="1100" b="0" i="0" dirty="0">
+                <a:effectLst/>
+              </a:rPr>
+              <a:t> </a:t>
+            </a:r>
+            <a:r>
+              <a:rPr lang="en-US" sz="1100" b="0" i="0" dirty="0" err="1">
+                <a:effectLst/>
+              </a:rPr>
+              <a:t>webalkalmazás</a:t>
+            </a:r>
+            <a:r>
+              <a:rPr lang="en-US" sz="1100" b="0" i="0" dirty="0">
+                <a:effectLst/>
+              </a:rPr>
+              <a:t>, HLS </a:t>
+            </a:r>
+            <a:r>
+              <a:rPr lang="en-US" sz="1100" b="0" i="0" dirty="0" err="1">
+                <a:effectLst/>
+              </a:rPr>
+              <a:t>lejátszás</a:t>
+            </a:r>
+            <a:r>
+              <a:rPr lang="en-US" sz="1100" b="0" i="0" dirty="0">
+                <a:effectLst/>
+              </a:rPr>
+              <a:t> Shaka </a:t>
+            </a:r>
+            <a:r>
+              <a:rPr lang="en-US" sz="1100" b="0" i="0" dirty="0" err="1">
+                <a:effectLst/>
+              </a:rPr>
+              <a:t>Playerrel</a:t>
+            </a:r>
+            <a:endParaRPr lang="en-US" sz="1100" b="0" i="0" dirty="0">
+              <a:effectLst/>
+            </a:endParaRPr>
+          </a:p>
+          <a:p>
+            <a:pPr indent="-228600">
+              <a:lnSpc>
+                <a:spcPct val="110000"/>
+              </a:lnSpc>
+              <a:spcAft>
+                <a:spcPts val="600"/>
+              </a:spcAft>
+              <a:buFont typeface="Arial" panose="020B0604020202020204" pitchFamily="34" charset="0"/>
+              <a:buChar char="•"/>
+            </a:pPr>
+            <a:r>
+              <a:rPr lang="en-US" sz="1100" b="0" i="0" dirty="0" err="1">
+                <a:effectLst/>
+              </a:rPr>
+              <a:t>Skálázható</a:t>
+            </a:r>
+            <a:r>
+              <a:rPr lang="en-US" sz="1100" b="0" i="0" dirty="0">
+                <a:effectLst/>
+              </a:rPr>
+              <a:t>, </a:t>
+            </a:r>
+            <a:r>
+              <a:rPr lang="en-US" sz="1100" b="0" i="0" dirty="0" err="1">
+                <a:effectLst/>
+              </a:rPr>
+              <a:t>bővíthető</a:t>
+            </a:r>
+            <a:r>
+              <a:rPr lang="en-US" sz="1100" b="0" i="0" dirty="0">
+                <a:effectLst/>
+              </a:rPr>
+              <a:t>, </a:t>
+            </a:r>
+            <a:r>
+              <a:rPr lang="en-US" sz="1100" b="0" i="0" dirty="0" err="1">
+                <a:effectLst/>
+              </a:rPr>
+              <a:t>biztonságos</a:t>
+            </a:r>
+            <a:r>
+              <a:rPr lang="en-US" sz="1100" b="0" i="0" dirty="0">
+                <a:effectLst/>
+              </a:rPr>
+              <a:t> </a:t>
+            </a:r>
+            <a:r>
+              <a:rPr lang="en-US" sz="1100" b="0" i="0" dirty="0" err="1">
+                <a:effectLst/>
+              </a:rPr>
+              <a:t>rendszerfelépítés</a:t>
+            </a:r>
+            <a:endParaRPr lang="en-US" sz="1100" b="0" i="0" dirty="0">
+              <a:effectLst/>
+            </a:endParaRPr>
+          </a:p>
+          <a:p>
+            <a:pPr indent="-228600">
+              <a:lnSpc>
+                <a:spcPct val="110000"/>
+              </a:lnSpc>
+              <a:spcAft>
+                <a:spcPts val="600"/>
+              </a:spcAft>
+            </a:pPr>
+            <a:endParaRPr lang="en-US" sz="1100" dirty="0"/>
+          </a:p>
+        </p:txBody>
+      </p:sp>
+      <p:pic>
+        <p:nvPicPr>
+          <p:cNvPr id="15" name="Content Placeholder 14">
+            <a:extLst>
+              <a:ext uri="{FF2B5EF4-FFF2-40B4-BE49-F238E27FC236}">
+                <a16:creationId xmlns:a16="http://schemas.microsoft.com/office/drawing/2014/main" id="{0043D236-1410-658D-7271-53A814F38666}"/>
+              </a:ext>
+            </a:extLst>
+          </p:cNvPr>
+          <p:cNvPicPr>
+            <a:picLocks noGrp="1" noChangeAspect="1"/>
+          </p:cNvPicPr>
+          <p:nvPr>
+            <p:ph idx="1"/>
+          </p:nvPr>
+        </p:nvPicPr>
+        <p:blipFill>
+          <a:blip r:embed="rId2"/>
+          <a:stretch>
+            <a:fillRect/>
+          </a:stretch>
+        </p:blipFill>
+        <p:spPr>
+          <a:xfrm>
+            <a:off x="5126823" y="1239513"/>
+            <a:ext cx="6978444" cy="4378974"/>
+          </a:xfrm>
+          <a:prstGeom prst="rect">
+            <a:avLst/>
+          </a:prstGeom>
+        </p:spPr>
+      </p:pic>
+      <p:sp>
+        <p:nvSpPr>
+          <p:cNvPr id="6" name="Slide Number Placeholder 5">
+            <a:extLst>
+              <a:ext uri="{FF2B5EF4-FFF2-40B4-BE49-F238E27FC236}">
+                <a16:creationId xmlns:a16="http://schemas.microsoft.com/office/drawing/2014/main" id="{75375D08-C104-C998-F8A0-E7B5709E242E}"/>
+              </a:ext>
+            </a:extLst>
+          </p:cNvPr>
+          <p:cNvSpPr>
+            <a:spLocks noGrp="1"/>
+          </p:cNvSpPr>
+          <p:nvPr>
+            <p:ph type="sldNum" sz="quarter" idx="12"/>
+          </p:nvPr>
+        </p:nvSpPr>
+        <p:spPr>
+          <a:xfrm>
+            <a:off x="11403951" y="6425816"/>
+            <a:ext cx="429768" cy="365125"/>
+          </a:xfrm>
+        </p:spPr>
+        <p:txBody>
+          <a:bodyPr vert="horz" lIns="91440" tIns="45720" rIns="91440" bIns="45720" rtlCol="0" anchor="ctr">
+            <a:normAutofit/>
+          </a:bodyPr>
+          <a:lstStyle/>
+          <a:p>
+            <a:pPr>
+              <a:spcAft>
+                <a:spcPts val="600"/>
+              </a:spcAft>
+            </a:pPr>
+            <a:fld id="{6E91CC32-6A6B-4E2E-BBA1-6864F305DA26}" type="slidenum">
+              <a:rPr lang="en-US">
+                <a:solidFill>
+                  <a:schemeClr val="bg1"/>
+                </a:solidFill>
+              </a:rPr>
+              <a:pPr>
+                <a:spcAft>
+                  <a:spcPts val="600"/>
+                </a:spcAft>
+              </a:pPr>
+              <a:t>11</a:t>
+            </a:fld>
+            <a:endParaRPr lang="en-US" dirty="0">
+              <a:solidFill>
+                <a:schemeClr val="bg1"/>
+              </a:solidFill>
+            </a:endParaRPr>
+          </a:p>
+        </p:txBody>
+      </p:sp>
+    </p:spTree>
+    <p:extLst>
+      <p:ext uri="{BB962C8B-B14F-4D97-AF65-F5344CB8AC3E}">
+        <p14:creationId xmlns:p14="http://schemas.microsoft.com/office/powerpoint/2010/main" val="573100510"/>
+      </p:ext>
+    </p:extLst>
+  </p:cSld>
+  <p:clrMapOvr>
+    <a:masterClrMapping/>
+  </p:clrMapOvr>
+</p:sld>
+</file>
+
+<file path=ppt/slides/slide12.xml><?xml version="1.0" encoding="utf-8"?>
+<p:sld xmlns:a="http://schemas.openxmlformats.org/drawingml/2006/main" xmlns:r="http://schemas.openxmlformats.org/officeDocument/2006/relationships" xmlns:p="http://schemas.openxmlformats.org/presentationml/2006/main">
+  <p:cSld>
+    <p:spTree>
+      <p:nvGrpSpPr>
+        <p:cNvPr id="1" name=""/>
+        <p:cNvGrpSpPr/>
+        <p:nvPr/>
+      </p:nvGrpSpPr>
+      <p:grpSpPr>
+        <a:xfrm>
+          <a:off x="0" y="0"/>
+          <a:ext cx="0" cy="0"/>
+          <a:chOff x="0" y="0"/>
+          <a:chExt cx="0" cy="0"/>
+        </a:xfrm>
+      </p:grpSpPr>
+      <p:sp>
+        <p:nvSpPr>
+          <p:cNvPr id="2" name="Title 1">
+            <a:extLst>
+              <a:ext uri="{FF2B5EF4-FFF2-40B4-BE49-F238E27FC236}">
+                <a16:creationId xmlns:a16="http://schemas.microsoft.com/office/drawing/2014/main" id="{939E5E0B-0B6A-27CA-4123-067B7069ABFF}"/>
+              </a:ext>
+            </a:extLst>
+          </p:cNvPr>
+          <p:cNvSpPr>
+            <a:spLocks noGrp="1"/>
+          </p:cNvSpPr>
+          <p:nvPr>
+            <p:ph type="title"/>
+          </p:nvPr>
+        </p:nvSpPr>
+        <p:spPr/>
+        <p:txBody>
+          <a:bodyPr/>
+          <a:lstStyle/>
+          <a:p>
+            <a:r>
+              <a:rPr lang="en-US" dirty="0"/>
+              <a:t>Streaming </a:t>
+            </a:r>
+            <a:r>
+              <a:rPr lang="en-US" dirty="0" err="1"/>
+              <a:t>működése</a:t>
+            </a:r>
+            <a:endParaRPr lang="en-GB" dirty="0"/>
+          </a:p>
+        </p:txBody>
+      </p:sp>
+      <p:sp>
+        <p:nvSpPr>
+          <p:cNvPr id="3" name="Content Placeholder 2">
+            <a:extLst>
+              <a:ext uri="{FF2B5EF4-FFF2-40B4-BE49-F238E27FC236}">
+                <a16:creationId xmlns:a16="http://schemas.microsoft.com/office/drawing/2014/main" id="{A4554129-2516-F620-26E5-8627B7A64993}"/>
+              </a:ext>
+            </a:extLst>
+          </p:cNvPr>
+          <p:cNvSpPr>
+            <a:spLocks noGrp="1"/>
+          </p:cNvSpPr>
+          <p:nvPr>
+            <p:ph idx="1"/>
+          </p:nvPr>
+        </p:nvSpPr>
+        <p:spPr/>
+        <p:txBody>
+          <a:bodyPr/>
+          <a:lstStyle/>
+          <a:p>
+            <a:endParaRPr lang="en-GB"/>
+          </a:p>
+        </p:txBody>
+      </p:sp>
+      <p:sp>
+        <p:nvSpPr>
+          <p:cNvPr id="4" name="Date Placeholder 3">
+            <a:extLst>
+              <a:ext uri="{FF2B5EF4-FFF2-40B4-BE49-F238E27FC236}">
+                <a16:creationId xmlns:a16="http://schemas.microsoft.com/office/drawing/2014/main" id="{020B5373-7E11-F965-B7B9-91679AE8417E}"/>
+              </a:ext>
+            </a:extLst>
+          </p:cNvPr>
+          <p:cNvSpPr>
+            <a:spLocks noGrp="1"/>
+          </p:cNvSpPr>
+          <p:nvPr>
+            <p:ph type="dt" sz="half" idx="10"/>
+          </p:nvPr>
+        </p:nvSpPr>
+        <p:spPr/>
+        <p:txBody>
+          <a:bodyPr/>
+          <a:lstStyle/>
+          <a:p>
+            <a:fld id="{0F996519-E62D-4F8C-AE1E-36928EC7D15C}" type="datetime1">
+              <a:rPr lang="en-US" smtClean="0"/>
+              <a:t>5/13/2025</a:t>
+            </a:fld>
+            <a:endParaRPr lang="en-US"/>
+          </a:p>
+        </p:txBody>
+      </p:sp>
+      <p:sp>
+        <p:nvSpPr>
+          <p:cNvPr id="5" name="Footer Placeholder 4">
+            <a:extLst>
+              <a:ext uri="{FF2B5EF4-FFF2-40B4-BE49-F238E27FC236}">
+                <a16:creationId xmlns:a16="http://schemas.microsoft.com/office/drawing/2014/main" id="{94368B97-6E1B-CCD0-80DE-8A0A2BEA382F}"/>
+              </a:ext>
+            </a:extLst>
+          </p:cNvPr>
+          <p:cNvSpPr>
+            <a:spLocks noGrp="1"/>
+          </p:cNvSpPr>
+          <p:nvPr>
+            <p:ph type="ftr" sz="quarter" idx="11"/>
+          </p:nvPr>
+        </p:nvSpPr>
+        <p:spPr/>
+        <p:txBody>
+          <a:bodyPr/>
+          <a:lstStyle/>
+          <a:p>
+            <a:r>
+              <a:rPr lang="en-US"/>
+              <a:t>Sample Footer Text</a:t>
+            </a:r>
+          </a:p>
+        </p:txBody>
+      </p:sp>
+      <p:sp>
+        <p:nvSpPr>
+          <p:cNvPr id="6" name="Slide Number Placeholder 5">
+            <a:extLst>
+              <a:ext uri="{FF2B5EF4-FFF2-40B4-BE49-F238E27FC236}">
+                <a16:creationId xmlns:a16="http://schemas.microsoft.com/office/drawing/2014/main" id="{8D551BB4-B4AB-22EF-90FC-2EEEA753A35E}"/>
+              </a:ext>
+            </a:extLst>
+          </p:cNvPr>
+          <p:cNvSpPr>
+            <a:spLocks noGrp="1"/>
+          </p:cNvSpPr>
+          <p:nvPr>
+            <p:ph type="sldNum" sz="quarter" idx="12"/>
+          </p:nvPr>
+        </p:nvSpPr>
+        <p:spPr/>
+        <p:txBody>
+          <a:bodyPr/>
+          <a:lstStyle/>
+          <a:p>
+            <a:fld id="{6E91CC32-6A6B-4E2E-BBA1-6864F305DA26}" type="slidenum">
+              <a:rPr lang="en-US" smtClean="0"/>
+              <a:t>12</a:t>
+            </a:fld>
+            <a:endParaRPr lang="en-US"/>
+          </a:p>
+        </p:txBody>
+      </p:sp>
+    </p:spTree>
+    <p:extLst>
+      <p:ext uri="{BB962C8B-B14F-4D97-AF65-F5344CB8AC3E}">
+        <p14:creationId xmlns:p14="http://schemas.microsoft.com/office/powerpoint/2010/main" val="3933709273"/>
+      </p:ext>
+    </p:extLst>
+  </p:cSld>
+  <p:clrMapOvr>
+    <a:masterClrMapping/>
+  </p:clrMapOvr>
+</p:sld>
+</file>
+
+<file path=ppt/slides/slide13.xml><?xml version="1.0" encoding="utf-8"?>
+<p:sld xmlns:a="http://schemas.openxmlformats.org/drawingml/2006/main" xmlns:r="http://schemas.openxmlformats.org/officeDocument/2006/relationships" xmlns:p="http://schemas.openxmlformats.org/presentationml/2006/main">
+  <p:cSld>
+    <p:spTree>
+      <p:nvGrpSpPr>
+        <p:cNvPr id="1" name=""/>
+        <p:cNvGrpSpPr/>
+        <p:nvPr/>
+      </p:nvGrpSpPr>
+      <p:grpSpPr>
+        <a:xfrm>
+          <a:off x="0" y="0"/>
+          <a:ext cx="0" cy="0"/>
+          <a:chOff x="0" y="0"/>
+          <a:chExt cx="0" cy="0"/>
+        </a:xfrm>
+      </p:grpSpPr>
+      <p:sp>
+        <p:nvSpPr>
+          <p:cNvPr id="2" name="Title 1">
+            <a:extLst>
+              <a:ext uri="{FF2B5EF4-FFF2-40B4-BE49-F238E27FC236}">
+                <a16:creationId xmlns:a16="http://schemas.microsoft.com/office/drawing/2014/main" id="{73F53867-5770-3126-BFED-BCEDC7DE3D45}"/>
+              </a:ext>
+            </a:extLst>
+          </p:cNvPr>
+          <p:cNvSpPr>
+            <a:spLocks noGrp="1"/>
+          </p:cNvSpPr>
+          <p:nvPr>
+            <p:ph type="title"/>
+          </p:nvPr>
+        </p:nvSpPr>
+        <p:spPr/>
+        <p:txBody>
+          <a:bodyPr/>
+          <a:lstStyle/>
+          <a:p>
+            <a:r>
+              <a:rPr lang="en-US" dirty="0" err="1"/>
+              <a:t>Összefoglalva</a:t>
+            </a:r>
+            <a:endParaRPr lang="en-GB" dirty="0"/>
+          </a:p>
+        </p:txBody>
+      </p:sp>
+      <p:sp>
+        <p:nvSpPr>
+          <p:cNvPr id="3" name="Content Placeholder 2">
+            <a:extLst>
+              <a:ext uri="{FF2B5EF4-FFF2-40B4-BE49-F238E27FC236}">
+                <a16:creationId xmlns:a16="http://schemas.microsoft.com/office/drawing/2014/main" id="{1CA23CA7-BA98-FF1A-914D-AF8EE3D0CE70}"/>
+              </a:ext>
+            </a:extLst>
+          </p:cNvPr>
+          <p:cNvSpPr>
+            <a:spLocks noGrp="1"/>
+          </p:cNvSpPr>
+          <p:nvPr>
+            <p:ph idx="1"/>
+          </p:nvPr>
+        </p:nvSpPr>
+        <p:spPr/>
+        <p:txBody>
+          <a:bodyPr/>
+          <a:lstStyle/>
+          <a:p>
+            <a:endParaRPr lang="en-GB" dirty="0"/>
+          </a:p>
+        </p:txBody>
+      </p:sp>
+      <p:sp>
+        <p:nvSpPr>
+          <p:cNvPr id="4" name="Date Placeholder 3">
+            <a:extLst>
+              <a:ext uri="{FF2B5EF4-FFF2-40B4-BE49-F238E27FC236}">
+                <a16:creationId xmlns:a16="http://schemas.microsoft.com/office/drawing/2014/main" id="{4B498C31-B6F3-3134-8B18-A36C5C345190}"/>
+              </a:ext>
+            </a:extLst>
+          </p:cNvPr>
+          <p:cNvSpPr>
+            <a:spLocks noGrp="1"/>
+          </p:cNvSpPr>
+          <p:nvPr>
+            <p:ph type="dt" sz="half" idx="10"/>
+          </p:nvPr>
+        </p:nvSpPr>
+        <p:spPr/>
+        <p:txBody>
+          <a:bodyPr/>
+          <a:lstStyle/>
+          <a:p>
+            <a:fld id="{0F996519-E62D-4F8C-AE1E-36928EC7D15C}" type="datetime1">
+              <a:rPr lang="en-US" smtClean="0"/>
+              <a:t>5/13/2025</a:t>
+            </a:fld>
+            <a:endParaRPr lang="en-US"/>
+          </a:p>
+        </p:txBody>
+      </p:sp>
+      <p:sp>
+        <p:nvSpPr>
+          <p:cNvPr id="5" name="Footer Placeholder 4">
+            <a:extLst>
+              <a:ext uri="{FF2B5EF4-FFF2-40B4-BE49-F238E27FC236}">
+                <a16:creationId xmlns:a16="http://schemas.microsoft.com/office/drawing/2014/main" id="{38A1FD55-38F0-DBBD-0766-0D4067DCA6AF}"/>
+              </a:ext>
+            </a:extLst>
+          </p:cNvPr>
+          <p:cNvSpPr>
+            <a:spLocks noGrp="1"/>
+          </p:cNvSpPr>
+          <p:nvPr>
+            <p:ph type="ftr" sz="quarter" idx="11"/>
+          </p:nvPr>
+        </p:nvSpPr>
+        <p:spPr/>
+        <p:txBody>
+          <a:bodyPr/>
+          <a:lstStyle/>
+          <a:p>
+            <a:r>
+              <a:rPr lang="en-US"/>
+              <a:t>Sample Footer Text</a:t>
+            </a:r>
+          </a:p>
+        </p:txBody>
+      </p:sp>
+      <p:sp>
+        <p:nvSpPr>
+          <p:cNvPr id="6" name="Slide Number Placeholder 5">
+            <a:extLst>
+              <a:ext uri="{FF2B5EF4-FFF2-40B4-BE49-F238E27FC236}">
+                <a16:creationId xmlns:a16="http://schemas.microsoft.com/office/drawing/2014/main" id="{292130B4-8DA1-533F-FFA4-753E3D433C85}"/>
+              </a:ext>
+            </a:extLst>
+          </p:cNvPr>
+          <p:cNvSpPr>
+            <a:spLocks noGrp="1"/>
+          </p:cNvSpPr>
+          <p:nvPr>
+            <p:ph type="sldNum" sz="quarter" idx="12"/>
+          </p:nvPr>
+        </p:nvSpPr>
+        <p:spPr/>
+        <p:txBody>
+          <a:bodyPr/>
+          <a:lstStyle/>
+          <a:p>
+            <a:fld id="{6E91CC32-6A6B-4E2E-BBA1-6864F305DA26}" type="slidenum">
+              <a:rPr lang="en-US" smtClean="0"/>
+              <a:t>13</a:t>
+            </a:fld>
+            <a:endParaRPr lang="en-US"/>
+          </a:p>
+        </p:txBody>
+      </p:sp>
+    </p:spTree>
+    <p:extLst>
+      <p:ext uri="{BB962C8B-B14F-4D97-AF65-F5344CB8AC3E}">
+        <p14:creationId xmlns:p14="http://schemas.microsoft.com/office/powerpoint/2010/main" val="3297956559"/>
+      </p:ext>
+    </p:extLst>
+  </p:cSld>
+  <p:clrMapOvr>
+    <a:masterClrMapping/>
+  </p:clrMapOvr>
+</p:sld>
+</file>
+
+<file path=ppt/slides/slide2.xml><?xml version="1.0" encoding="utf-8"?>
+<p:sld xmlns:a="http://schemas.openxmlformats.org/drawingml/2006/main" xmlns:r="http://schemas.openxmlformats.org/officeDocument/2006/relationships" xmlns:p="http://schemas.openxmlformats.org/presentationml/2006/main">
+  <p:cSld>
+    <p:bg>
+      <p:bgPr>
+        <a:solidFill>
+          <a:schemeClr val="bg1"/>
+        </a:solidFill>
+        <a:effectLst/>
+      </p:bgPr>
+    </p:bg>
+    <p:spTree>
+      <p:nvGrpSpPr>
+        <p:cNvPr id="1" name=""/>
+        <p:cNvGrpSpPr/>
+        <p:nvPr/>
+      </p:nvGrpSpPr>
+      <p:grpSpPr>
+        <a:xfrm>
+          <a:off x="0" y="0"/>
+          <a:ext cx="0" cy="0"/>
+          <a:chOff x="0" y="0"/>
+          <a:chExt cx="0" cy="0"/>
+        </a:xfrm>
+      </p:grpSpPr>
+      <p:sp useBgFill="1">
+        <p:nvSpPr>
+          <p:cNvPr id="13" name="Rectangle 12">
+            <a:extLst>
+              <a:ext uri="{FF2B5EF4-FFF2-40B4-BE49-F238E27FC236}">
+                <a16:creationId xmlns:a16="http://schemas.microsoft.com/office/drawing/2014/main" id="{FA6B3B35-324C-0E4F-9288-7DF50CE9FE4A}"/>
+              </a:ext>
+              <a:ext uri="{C183D7F6-B498-43B3-948B-1728B52AA6E4}">
+                <adec:decorative xmlns:adec="http://schemas.microsoft.com/office/drawing/2017/decorative" val="1"/>
+              </a:ext>
+            </a:extLst>
+          </p:cNvPr>
+          <p:cNvSpPr>
+            <a:spLocks noGrp="1" noRot="1" noChangeAspect="1" noMove="1" noResize="1" noEditPoints="1" noAdjustHandles="1" noChangeArrowheads="1" noChangeShapeType="1" noTextEdit="1"/>
+          </p:cNvSpPr>
+          <p:nvPr>
+            <p:extLst>
+              <p:ext uri="{386F3935-93C4-4BCD-93E2-E3B085C9AB24}">
+                <p16:designElem xmlns:p16="http://schemas.microsoft.com/office/powerpoint/2015/main" val="1"/>
+              </p:ext>
+            </p:extLst>
+          </p:nvPr>
+        </p:nvSpPr>
+        <p:spPr>
+          <a:xfrm>
+            <a:off x="0" y="0"/>
+            <a:ext cx="12192000" cy="6858000"/>
+          </a:xfrm>
+          <a:prstGeom prst="rect">
+            <a:avLst/>
+          </a:prstGeom>
+          <a:ln w="12700" cap="flat" cmpd="sng" algn="ctr">
+            <a:noFill/>
+            <a:prstDash val="solid"/>
+            <a:miter lim="800000"/>
+          </a:ln>
+          <a:effectLst/>
+          <a:extLst>
+            <a:ext uri="{91240B29-F687-4F45-9708-019B960494DF}">
+              <a14:hiddenLine xmlns:a14="http://schemas.microsoft.com/office/drawing/2010/main" w="12700" cap="flat" cmpd="sng" algn="ctr">
+                <a:solidFill>
+                  <a:schemeClr val="accent1">
+                    <a:shade val="50000"/>
+                  </a:schemeClr>
+                </a:solidFill>
+                <a:prstDash val="solid"/>
+                <a:miter lim="800000"/>
+              </a14:hiddenLine>
+            </a:ext>
+          </a:extLst>
+        </p:spPr>
+        <p:style>
+          <a:lnRef idx="2">
+            <a:schemeClr val="accent1">
+              <a:shade val="50000"/>
+            </a:schemeClr>
+          </a:lnRef>
+          <a:fillRef idx="1">
+            <a:schemeClr val="accent1"/>
+          </a:fillRef>
+          <a:effectRef idx="0">
+            <a:schemeClr val="accent1"/>
+          </a:effectRef>
+          <a:fontRef idx="minor">
+            <a:schemeClr val="lt1"/>
+          </a:fontRef>
+        </p:style>
+        <p:txBody>
+          <a:bodyPr rtlCol="0" anchor="ctr"/>
+          <a:lstStyle/>
+          <a:p>
+            <a:pPr algn="ctr"/>
+            <a:endParaRPr lang="en-US"/>
+          </a:p>
+        </p:txBody>
+      </p:sp>
+      <p:sp>
+        <p:nvSpPr>
+          <p:cNvPr id="2" name="Title 1">
+            <a:extLst>
+              <a:ext uri="{FF2B5EF4-FFF2-40B4-BE49-F238E27FC236}">
                 <a16:creationId xmlns:a16="http://schemas.microsoft.com/office/drawing/2014/main" id="{93017C33-2FA8-5D45-939E-8C14BF98DF81}"/>
               </a:ext>
             </a:extLst>
@@ -6907,42 +8801,6 @@
               <a:rPr lang="en-US" sz="4800"/>
               <a:t>Bevezetés</a:t>
             </a:r>
-          </a:p>
-        </p:txBody>
-      </p:sp>
-      <p:sp>
-        <p:nvSpPr>
-          <p:cNvPr id="3" name="Text Placeholder 2">
-            <a:extLst>
-              <a:ext uri="{FF2B5EF4-FFF2-40B4-BE49-F238E27FC236}">
-                <a16:creationId xmlns:a16="http://schemas.microsoft.com/office/drawing/2014/main" id="{7FCBE72C-FA28-1B50-89C4-D31A6FD177E5}"/>
-              </a:ext>
-            </a:extLst>
-          </p:cNvPr>
-          <p:cNvSpPr>
-            <a:spLocks noGrp="1"/>
-          </p:cNvSpPr>
-          <p:nvPr>
-            <p:ph type="body" idx="1"/>
-          </p:nvPr>
-        </p:nvSpPr>
-        <p:spPr>
-          <a:xfrm>
-            <a:off x="321218" y="5897931"/>
-            <a:ext cx="11203841" cy="539804"/>
-          </a:xfrm>
-        </p:spPr>
-        <p:txBody>
-          <a:bodyPr vert="horz" lIns="91440" tIns="45720" rIns="91440" bIns="45720" rtlCol="0" anchor="t">
-            <a:normAutofit/>
-          </a:bodyPr>
-          <a:lstStyle/>
-          <a:p>
-            <a:endParaRPr lang="en-US">
-              <a:solidFill>
-                <a:schemeClr val="tx1"/>
-              </a:solidFill>
-            </a:endParaRPr>
           </a:p>
         </p:txBody>
       </p:sp>
@@ -7065,60 +8923,13 @@
                   <a:spcPts val="600"/>
                 </a:spcAft>
               </a:pPr>
-              <a:t>5/11/2025</a:t>
+              <a:t>5/13/2025</a:t>
             </a:fld>
             <a:endParaRPr lang="en-US">
               <a:solidFill>
                 <a:srgbClr val="FFFFFF"/>
               </a:solidFill>
             </a:endParaRPr>
-          </a:p>
-        </p:txBody>
-      </p:sp>
-      <p:sp>
-        <p:nvSpPr>
-          <p:cNvPr id="5" name="Footer Placeholder 4">
-            <a:extLst>
-              <a:ext uri="{FF2B5EF4-FFF2-40B4-BE49-F238E27FC236}">
-                <a16:creationId xmlns:a16="http://schemas.microsoft.com/office/drawing/2014/main" id="{B67BECAA-6B38-38C2-77AE-47ADDD94D148}"/>
-              </a:ext>
-            </a:extLst>
-          </p:cNvPr>
-          <p:cNvSpPr>
-            <a:spLocks noGrp="1"/>
-          </p:cNvSpPr>
-          <p:nvPr>
-            <p:ph type="ftr" sz="quarter" idx="11"/>
-          </p:nvPr>
-        </p:nvSpPr>
-        <p:spPr>
-          <a:xfrm>
-            <a:off x="7344016" y="6424761"/>
-            <a:ext cx="4059936" cy="365125"/>
-          </a:xfrm>
-        </p:spPr>
-        <p:txBody>
-          <a:bodyPr vert="horz" lIns="91440" tIns="45720" rIns="91440" bIns="45720" rtlCol="0" anchor="ctr">
-            <a:normAutofit/>
-          </a:bodyPr>
-          <a:lstStyle/>
-          <a:p>
-            <a:pPr>
-              <a:spcAft>
-                <a:spcPts val="600"/>
-              </a:spcAft>
-            </a:pPr>
-            <a:r>
-              <a:rPr lang="en-US" b="0" kern="1200" cap="all" spc="0" baseline="0">
-                <a:solidFill>
-                  <a:schemeClr val="tx1"/>
-                </a:solidFill>
-                <a:latin typeface="+mn-lt"/>
-                <a:ea typeface="+mn-ea"/>
-                <a:cs typeface="+mn-cs"/>
-              </a:rPr>
-              <a:t>Sample Footer Text</a:t>
-            </a:r>
           </a:p>
         </p:txBody>
       </p:sp>
@@ -7437,7 +9248,7 @@
                   <a:spcPts val="600"/>
                 </a:spcAft>
               </a:pPr>
-              <a:t>5/11/2025</a:t>
+              <a:t>5/13/2025</a:t>
             </a:fld>
             <a:endParaRPr lang="en-US"/>
           </a:p>
@@ -7727,47 +9538,6 @@
       </p:sp>
       <p:sp>
         <p:nvSpPr>
-          <p:cNvPr id="5" name="Footer Placeholder 4">
-            <a:extLst>
-              <a:ext uri="{FF2B5EF4-FFF2-40B4-BE49-F238E27FC236}">
-                <a16:creationId xmlns:a16="http://schemas.microsoft.com/office/drawing/2014/main" id="{5AD540CB-2038-672A-CFC1-B356AA774ADB}"/>
-              </a:ext>
-            </a:extLst>
-          </p:cNvPr>
-          <p:cNvSpPr>
-            <a:spLocks noGrp="1"/>
-          </p:cNvSpPr>
-          <p:nvPr>
-            <p:ph type="ftr" sz="quarter" idx="11"/>
-          </p:nvPr>
-        </p:nvSpPr>
-        <p:spPr>
-          <a:xfrm>
-            <a:off x="7344016" y="6424761"/>
-            <a:ext cx="4059936" cy="365125"/>
-          </a:xfrm>
-        </p:spPr>
-        <p:txBody>
-          <a:bodyPr>
-            <a:normAutofit/>
-          </a:bodyPr>
-          <a:lstStyle/>
-          <a:p>
-            <a:pPr>
-              <a:spcAft>
-                <a:spcPts val="600"/>
-              </a:spcAft>
-            </a:pPr>
-            <a:endParaRPr lang="en-US" dirty="0">
-              <a:solidFill>
-                <a:schemeClr val="bg1"/>
-              </a:solidFill>
-            </a:endParaRPr>
-          </a:p>
-        </p:txBody>
-      </p:sp>
-      <p:sp>
-        <p:nvSpPr>
           <p:cNvPr id="6" name="Slide Number Placeholder 5">
             <a:extLst>
               <a:ext uri="{FF2B5EF4-FFF2-40B4-BE49-F238E27FC236}">
@@ -8180,7 +9950,7 @@
                   <a:spcPts val="600"/>
                 </a:spcAft>
               </a:pPr>
-              <a:t>5/11/2025</a:t>
+              <a:t>5/13/2025</a:t>
             </a:fld>
             <a:endParaRPr lang="en-US"/>
           </a:p>
@@ -8334,53 +10104,6 @@
           </a:prstGeom>
         </p:spPr>
       </p:pic>
-      <p:sp>
-        <p:nvSpPr>
-          <p:cNvPr id="6" name="Footer Placeholder 5">
-            <a:extLst>
-              <a:ext uri="{FF2B5EF4-FFF2-40B4-BE49-F238E27FC236}">
-                <a16:creationId xmlns:a16="http://schemas.microsoft.com/office/drawing/2014/main" id="{4CF9FB86-2107-4351-7639-552FB9A3DBC1}"/>
-              </a:ext>
-            </a:extLst>
-          </p:cNvPr>
-          <p:cNvSpPr>
-            <a:spLocks noGrp="1"/>
-          </p:cNvSpPr>
-          <p:nvPr>
-            <p:ph type="ftr" sz="quarter" idx="11"/>
-          </p:nvPr>
-        </p:nvSpPr>
-        <p:spPr>
-          <a:xfrm>
-            <a:off x="7344016" y="6424761"/>
-            <a:ext cx="4059936" cy="365125"/>
-          </a:xfrm>
-        </p:spPr>
-        <p:txBody>
-          <a:bodyPr vert="horz" lIns="91440" tIns="45720" rIns="91440" bIns="45720" rtlCol="0" anchor="ctr">
-            <a:normAutofit/>
-          </a:bodyPr>
-          <a:lstStyle/>
-          <a:p>
-            <a:pPr>
-              <a:spcAft>
-                <a:spcPts val="600"/>
-              </a:spcAft>
-            </a:pPr>
-            <a:r>
-              <a:rPr lang="en-US" b="0" kern="1200" cap="all" spc="0" baseline="0">
-                <a:solidFill>
-                  <a:schemeClr val="bg1"/>
-                </a:solidFill>
-                <a:latin typeface="+mn-lt"/>
-                <a:ea typeface="+mn-ea"/>
-                <a:cs typeface="+mn-cs"/>
-              </a:rPr>
-              <a:t>Sample Footer Text</a:t>
-            </a:r>
-          </a:p>
-        </p:txBody>
-      </p:sp>
       <p:sp>
         <p:nvSpPr>
           <p:cNvPr id="7" name="Slide Number Placeholder 6">
@@ -8765,53 +10488,13 @@
                   <a:spcPts val="600"/>
                 </a:spcAft>
               </a:pPr>
-              <a:t>5/11/2025</a:t>
+              <a:t>5/13/2025</a:t>
             </a:fld>
             <a:endParaRPr lang="en-US">
               <a:solidFill>
                 <a:schemeClr val="bg1"/>
               </a:solidFill>
             </a:endParaRPr>
-          </a:p>
-        </p:txBody>
-      </p:sp>
-      <p:sp>
-        <p:nvSpPr>
-          <p:cNvPr id="5" name="Footer Placeholder 4">
-            <a:extLst>
-              <a:ext uri="{FF2B5EF4-FFF2-40B4-BE49-F238E27FC236}">
-                <a16:creationId xmlns:a16="http://schemas.microsoft.com/office/drawing/2014/main" id="{9883D6B7-E79D-18C8-1737-EB3514B542DF}"/>
-              </a:ext>
-            </a:extLst>
-          </p:cNvPr>
-          <p:cNvSpPr>
-            <a:spLocks noGrp="1"/>
-          </p:cNvSpPr>
-          <p:nvPr>
-            <p:ph type="ftr" sz="quarter" idx="11"/>
-          </p:nvPr>
-        </p:nvSpPr>
-        <p:spPr>
-          <a:xfrm>
-            <a:off x="7344016" y="6424761"/>
-            <a:ext cx="4059936" cy="365125"/>
-          </a:xfrm>
-        </p:spPr>
-        <p:txBody>
-          <a:bodyPr>
-            <a:normAutofit/>
-          </a:bodyPr>
-          <a:lstStyle/>
-          <a:p>
-            <a:pPr>
-              <a:spcAft>
-                <a:spcPts val="600"/>
-              </a:spcAft>
-            </a:pPr>
-            <a:r>
-              <a:rPr lang="en-US"/>
-              <a:t>Sample Footer Text</a:t>
-            </a:r>
           </a:p>
         </p:txBody>
       </p:sp>
@@ -8964,42 +10647,6 @@
               <a:rPr lang="en-US" sz="4800" dirty="0"/>
               <a:t> Háttér</a:t>
             </a:r>
-          </a:p>
-        </p:txBody>
-      </p:sp>
-      <p:sp>
-        <p:nvSpPr>
-          <p:cNvPr id="3" name="Text Placeholder 2">
-            <a:extLst>
-              <a:ext uri="{FF2B5EF4-FFF2-40B4-BE49-F238E27FC236}">
-                <a16:creationId xmlns:a16="http://schemas.microsoft.com/office/drawing/2014/main" id="{7022B55D-2DC1-8704-6C4F-DE084D10F8E8}"/>
-              </a:ext>
-            </a:extLst>
-          </p:cNvPr>
-          <p:cNvSpPr>
-            <a:spLocks noGrp="1"/>
-          </p:cNvSpPr>
-          <p:nvPr>
-            <p:ph type="body" idx="1"/>
-          </p:nvPr>
-        </p:nvSpPr>
-        <p:spPr>
-          <a:xfrm>
-            <a:off x="321218" y="5897931"/>
-            <a:ext cx="11203841" cy="539804"/>
-          </a:xfrm>
-        </p:spPr>
-        <p:txBody>
-          <a:bodyPr vert="horz" lIns="91440" tIns="45720" rIns="91440" bIns="45720" rtlCol="0" anchor="t">
-            <a:normAutofit/>
-          </a:bodyPr>
-          <a:lstStyle/>
-          <a:p>
-            <a:endParaRPr lang="en-US">
-              <a:solidFill>
-                <a:schemeClr val="tx1"/>
-              </a:solidFill>
-            </a:endParaRPr>
           </a:p>
         </p:txBody>
       </p:sp>
@@ -9122,60 +10769,13 @@
                   <a:spcPts val="600"/>
                 </a:spcAft>
               </a:pPr>
-              <a:t>5/11/2025</a:t>
+              <a:t>5/13/2025</a:t>
             </a:fld>
             <a:endParaRPr lang="en-US">
               <a:solidFill>
                 <a:srgbClr val="FFFFFF"/>
               </a:solidFill>
             </a:endParaRPr>
-          </a:p>
-        </p:txBody>
-      </p:sp>
-      <p:sp>
-        <p:nvSpPr>
-          <p:cNvPr id="5" name="Footer Placeholder 4">
-            <a:extLst>
-              <a:ext uri="{FF2B5EF4-FFF2-40B4-BE49-F238E27FC236}">
-                <a16:creationId xmlns:a16="http://schemas.microsoft.com/office/drawing/2014/main" id="{7C84BEEA-9B42-2660-70B7-2DE4A589AE6F}"/>
-              </a:ext>
-            </a:extLst>
-          </p:cNvPr>
-          <p:cNvSpPr>
-            <a:spLocks noGrp="1"/>
-          </p:cNvSpPr>
-          <p:nvPr>
-            <p:ph type="ftr" sz="quarter" idx="11"/>
-          </p:nvPr>
-        </p:nvSpPr>
-        <p:spPr>
-          <a:xfrm>
-            <a:off x="7344016" y="6424761"/>
-            <a:ext cx="4059936" cy="365125"/>
-          </a:xfrm>
-        </p:spPr>
-        <p:txBody>
-          <a:bodyPr vert="horz" lIns="91440" tIns="45720" rIns="91440" bIns="45720" rtlCol="0" anchor="ctr">
-            <a:normAutofit/>
-          </a:bodyPr>
-          <a:lstStyle/>
-          <a:p>
-            <a:pPr>
-              <a:spcAft>
-                <a:spcPts val="600"/>
-              </a:spcAft>
-            </a:pPr>
-            <a:r>
-              <a:rPr lang="en-US" b="0" kern="1200" cap="all" spc="0" baseline="0">
-                <a:solidFill>
-                  <a:schemeClr val="tx1"/>
-                </a:solidFill>
-                <a:latin typeface="+mn-lt"/>
-                <a:ea typeface="+mn-ea"/>
-                <a:cs typeface="+mn-cs"/>
-              </a:rPr>
-              <a:t>Sample Footer Text</a:t>
-            </a:r>
           </a:p>
         </p:txBody>
       </p:sp>
@@ -9423,7 +11023,7 @@
                   <a:spcPts val="600"/>
                 </a:spcAft>
               </a:pPr>
-              <a:t>5/11/2025</a:t>
+              <a:t>5/13/2025</a:t>
             </a:fld>
             <a:endParaRPr lang="en-US"/>
           </a:p>
@@ -9686,50 +11286,6 @@
       </p:pic>
       <p:sp>
         <p:nvSpPr>
-          <p:cNvPr id="5" name="Footer Placeholder 4">
-            <a:extLst>
-              <a:ext uri="{FF2B5EF4-FFF2-40B4-BE49-F238E27FC236}">
-                <a16:creationId xmlns:a16="http://schemas.microsoft.com/office/drawing/2014/main" id="{ADF0B0A2-96F6-3888-D125-7E532C8C39AF}"/>
-              </a:ext>
-            </a:extLst>
-          </p:cNvPr>
-          <p:cNvSpPr>
-            <a:spLocks noGrp="1"/>
-          </p:cNvSpPr>
-          <p:nvPr>
-            <p:ph type="ftr" sz="quarter" idx="11"/>
-          </p:nvPr>
-        </p:nvSpPr>
-        <p:spPr>
-          <a:xfrm>
-            <a:off x="7344016" y="6424761"/>
-            <a:ext cx="4059936" cy="365125"/>
-          </a:xfrm>
-        </p:spPr>
-        <p:txBody>
-          <a:bodyPr>
-            <a:normAutofit/>
-          </a:bodyPr>
-          <a:lstStyle/>
-          <a:p>
-            <a:pPr>
-              <a:spcAft>
-                <a:spcPts val="600"/>
-              </a:spcAft>
-            </a:pPr>
-            <a:r>
-              <a:rPr lang="en-US">
-                <a:solidFill>
-                  <a:srgbClr val="000000"/>
-                </a:solidFill>
-              </a:rPr>
-              <a:t>Sample Footer Text</a:t>
-            </a:r>
-          </a:p>
-        </p:txBody>
-      </p:sp>
-      <p:sp>
-        <p:nvSpPr>
           <p:cNvPr id="6" name="Slide Number Placeholder 5">
             <a:extLst>
               <a:ext uri="{FF2B5EF4-FFF2-40B4-BE49-F238E27FC236}">
@@ -10115,7 +11671,7 @@
                   <a:spcPts val="600"/>
                 </a:spcAft>
               </a:pPr>
-              <a:t>5/11/2025</a:t>
+              <a:t>5/13/2025</a:t>
             </a:fld>
             <a:endParaRPr lang="en-US"/>
           </a:p>
@@ -10286,50 +11842,6 @@
           </a:prstGeom>
         </p:spPr>
       </p:pic>
-      <p:sp>
-        <p:nvSpPr>
-          <p:cNvPr id="5" name="Footer Placeholder 4">
-            <a:extLst>
-              <a:ext uri="{FF2B5EF4-FFF2-40B4-BE49-F238E27FC236}">
-                <a16:creationId xmlns:a16="http://schemas.microsoft.com/office/drawing/2014/main" id="{B984C72E-C8A7-69D8-2E06-6CA1205D2484}"/>
-              </a:ext>
-            </a:extLst>
-          </p:cNvPr>
-          <p:cNvSpPr>
-            <a:spLocks noGrp="1"/>
-          </p:cNvSpPr>
-          <p:nvPr>
-            <p:ph type="ftr" sz="quarter" idx="11"/>
-          </p:nvPr>
-        </p:nvSpPr>
-        <p:spPr>
-          <a:xfrm>
-            <a:off x="7344016" y="6424761"/>
-            <a:ext cx="4059936" cy="365125"/>
-          </a:xfrm>
-        </p:spPr>
-        <p:txBody>
-          <a:bodyPr>
-            <a:normAutofit/>
-          </a:bodyPr>
-          <a:lstStyle/>
-          <a:p>
-            <a:pPr>
-              <a:spcAft>
-                <a:spcPts val="600"/>
-              </a:spcAft>
-            </a:pPr>
-            <a:r>
-              <a:rPr lang="en-US">
-                <a:solidFill>
-                  <a:schemeClr val="bg1"/>
-                </a:solidFill>
-              </a:rPr>
-              <a:t>Sample Footer Text</a:t>
-            </a:r>
-          </a:p>
-        </p:txBody>
-      </p:sp>
       <p:sp>
         <p:nvSpPr>
           <p:cNvPr id="6" name="Slide Number Placeholder 5">
@@ -10469,42 +11981,6 @@
               <a:t>Implementáció</a:t>
             </a:r>
             <a:endParaRPr lang="en-US" sz="4800" dirty="0"/>
-          </a:p>
-        </p:txBody>
-      </p:sp>
-      <p:sp>
-        <p:nvSpPr>
-          <p:cNvPr id="3" name="Text Placeholder 2">
-            <a:extLst>
-              <a:ext uri="{FF2B5EF4-FFF2-40B4-BE49-F238E27FC236}">
-                <a16:creationId xmlns:a16="http://schemas.microsoft.com/office/drawing/2014/main" id="{1207CC0E-9CDF-E55B-6A28-99DE82C36594}"/>
-              </a:ext>
-            </a:extLst>
-          </p:cNvPr>
-          <p:cNvSpPr>
-            <a:spLocks noGrp="1"/>
-          </p:cNvSpPr>
-          <p:nvPr>
-            <p:ph type="body" idx="1"/>
-          </p:nvPr>
-        </p:nvSpPr>
-        <p:spPr>
-          <a:xfrm>
-            <a:off x="321218" y="5897931"/>
-            <a:ext cx="11203841" cy="539804"/>
-          </a:xfrm>
-        </p:spPr>
-        <p:txBody>
-          <a:bodyPr vert="horz" lIns="91440" tIns="45720" rIns="91440" bIns="45720" rtlCol="0" anchor="t">
-            <a:normAutofit/>
-          </a:bodyPr>
-          <a:lstStyle/>
-          <a:p>
-            <a:endParaRPr lang="en-US">
-              <a:solidFill>
-                <a:schemeClr val="tx1"/>
-              </a:solidFill>
-            </a:endParaRPr>
           </a:p>
         </p:txBody>
       </p:sp>
@@ -10627,60 +12103,13 @@
                   <a:spcPts val="600"/>
                 </a:spcAft>
               </a:pPr>
-              <a:t>5/11/2025</a:t>
+              <a:t>5/13/2025</a:t>
             </a:fld>
             <a:endParaRPr lang="en-US">
               <a:solidFill>
                 <a:srgbClr val="FFFFFF"/>
               </a:solidFill>
             </a:endParaRPr>
-          </a:p>
-        </p:txBody>
-      </p:sp>
-      <p:sp>
-        <p:nvSpPr>
-          <p:cNvPr id="5" name="Footer Placeholder 4">
-            <a:extLst>
-              <a:ext uri="{FF2B5EF4-FFF2-40B4-BE49-F238E27FC236}">
-                <a16:creationId xmlns:a16="http://schemas.microsoft.com/office/drawing/2014/main" id="{C483BA70-0E88-C6AC-3E8F-CA7AA57ADAE5}"/>
-              </a:ext>
-            </a:extLst>
-          </p:cNvPr>
-          <p:cNvSpPr>
-            <a:spLocks noGrp="1"/>
-          </p:cNvSpPr>
-          <p:nvPr>
-            <p:ph type="ftr" sz="quarter" idx="11"/>
-          </p:nvPr>
-        </p:nvSpPr>
-        <p:spPr>
-          <a:xfrm>
-            <a:off x="7344016" y="6424761"/>
-            <a:ext cx="4059936" cy="365125"/>
-          </a:xfrm>
-        </p:spPr>
-        <p:txBody>
-          <a:bodyPr vert="horz" lIns="91440" tIns="45720" rIns="91440" bIns="45720" rtlCol="0" anchor="ctr">
-            <a:normAutofit/>
-          </a:bodyPr>
-          <a:lstStyle/>
-          <a:p>
-            <a:pPr>
-              <a:spcAft>
-                <a:spcPts val="600"/>
-              </a:spcAft>
-            </a:pPr>
-            <a:r>
-              <a:rPr lang="en-US" b="0" kern="1200" cap="all" spc="0" baseline="0">
-                <a:solidFill>
-                  <a:schemeClr val="tx1"/>
-                </a:solidFill>
-                <a:latin typeface="+mn-lt"/>
-                <a:ea typeface="+mn-ea"/>
-                <a:cs typeface="+mn-cs"/>
-              </a:rPr>
-              <a:t>Sample Footer Text</a:t>
-            </a:r>
           </a:p>
         </p:txBody>
       </p:sp>

</xml_diff>

<commit_message>
feat: Update live streaming service presentation file
</commit_message>
<xml_diff>
--- a/Documents/live-streaming-service-presentation.pptx
+++ b/Documents/live-streaming-service-presentation.pptx
@@ -17,7 +17,8 @@
     <p:sldId id="265" r:id="rId11"/>
     <p:sldId id="266" r:id="rId12"/>
     <p:sldId id="267" r:id="rId13"/>
-    <p:sldId id="268" r:id="rId14"/>
+    <p:sldId id="269" r:id="rId14"/>
+    <p:sldId id="268" r:id="rId15"/>
   </p:sldIdLst>
   <p:sldSz cx="12192000" cy="6858000"/>
   <p:notesSz cx="6858000" cy="9144000"/>
@@ -8395,7 +8396,10 @@
           <a:bodyPr/>
           <a:lstStyle/>
           <a:p>
-            <a:endParaRPr lang="en-GB"/>
+            <a:pPr marL="0" indent="0">
+              <a:buNone/>
+            </a:pPr>
+            <a:endParaRPr lang="en-GB" dirty="0"/>
           </a:p>
         </p:txBody>
       </p:sp>
@@ -8520,7 +8524,7 @@
           <p:cNvPr id="2" name="Title 1">
             <a:extLst>
               <a:ext uri="{FF2B5EF4-FFF2-40B4-BE49-F238E27FC236}">
-                <a16:creationId xmlns:a16="http://schemas.microsoft.com/office/drawing/2014/main" id="{73F53867-5770-3126-BFED-BCEDC7DE3D45}"/>
+                <a16:creationId xmlns:a16="http://schemas.microsoft.com/office/drawing/2014/main" id="{584FB7AE-8474-C89A-F373-37231224CB49}"/>
               </a:ext>
             </a:extLst>
           </p:cNvPr>
@@ -8538,7 +8542,7 @@
           <a:p>
             <a:r>
               <a:rPr lang="en-US" dirty="0" err="1"/>
-              <a:t>Összefoglalva</a:t>
+              <a:t>Nehézségek</a:t>
             </a:r>
             <a:endParaRPr lang="en-GB" dirty="0"/>
           </a:p>
@@ -8549,7 +8553,7 @@
           <p:cNvPr id="3" name="Content Placeholder 2">
             <a:extLst>
               <a:ext uri="{FF2B5EF4-FFF2-40B4-BE49-F238E27FC236}">
-                <a16:creationId xmlns:a16="http://schemas.microsoft.com/office/drawing/2014/main" id="{1CA23CA7-BA98-FF1A-914D-AF8EE3D0CE70}"/>
+                <a16:creationId xmlns:a16="http://schemas.microsoft.com/office/drawing/2014/main" id="{3A8C12D5-F94B-3C04-E192-E24DE7253FAB}"/>
               </a:ext>
             </a:extLst>
           </p:cNvPr>
@@ -8565,7 +8569,7 @@
           <a:bodyPr/>
           <a:lstStyle/>
           <a:p>
-            <a:endParaRPr lang="en-GB" dirty="0"/>
+            <a:endParaRPr lang="en-GB"/>
           </a:p>
         </p:txBody>
       </p:sp>
@@ -8574,7 +8578,7 @@
           <p:cNvPr id="4" name="Date Placeholder 3">
             <a:extLst>
               <a:ext uri="{FF2B5EF4-FFF2-40B4-BE49-F238E27FC236}">
-                <a16:creationId xmlns:a16="http://schemas.microsoft.com/office/drawing/2014/main" id="{4B498C31-B6F3-3134-8B18-A36C5C345190}"/>
+                <a16:creationId xmlns:a16="http://schemas.microsoft.com/office/drawing/2014/main" id="{3CFCAA98-ADD5-2CD6-6D5C-FFB9630154B0}"/>
               </a:ext>
             </a:extLst>
           </p:cNvPr>
@@ -8603,7 +8607,7 @@
           <p:cNvPr id="5" name="Footer Placeholder 4">
             <a:extLst>
               <a:ext uri="{FF2B5EF4-FFF2-40B4-BE49-F238E27FC236}">
-                <a16:creationId xmlns:a16="http://schemas.microsoft.com/office/drawing/2014/main" id="{38A1FD55-38F0-DBBD-0766-0D4067DCA6AF}"/>
+                <a16:creationId xmlns:a16="http://schemas.microsoft.com/office/drawing/2014/main" id="{B3071936-0991-78C9-DA0E-0F138EFD59C8}"/>
               </a:ext>
             </a:extLst>
           </p:cNvPr>
@@ -8631,7 +8635,7 @@
           <p:cNvPr id="6" name="Slide Number Placeholder 5">
             <a:extLst>
               <a:ext uri="{FF2B5EF4-FFF2-40B4-BE49-F238E27FC236}">
-                <a16:creationId xmlns:a16="http://schemas.microsoft.com/office/drawing/2014/main" id="{292130B4-8DA1-533F-FFA4-753E3D433C85}"/>
+                <a16:creationId xmlns:a16="http://schemas.microsoft.com/office/drawing/2014/main" id="{5647CB6F-56CE-9AF5-3F08-43BB0C220DB9}"/>
               </a:ext>
             </a:extLst>
           </p:cNvPr>
@@ -8650,6 +8654,176 @@
             <a:fld id="{6E91CC32-6A6B-4E2E-BBA1-6864F305DA26}" type="slidenum">
               <a:rPr lang="en-US" smtClean="0"/>
               <a:t>13</a:t>
+            </a:fld>
+            <a:endParaRPr lang="en-US"/>
+          </a:p>
+        </p:txBody>
+      </p:sp>
+    </p:spTree>
+    <p:extLst>
+      <p:ext uri="{BB962C8B-B14F-4D97-AF65-F5344CB8AC3E}">
+        <p14:creationId xmlns:p14="http://schemas.microsoft.com/office/powerpoint/2010/main" val="3130342024"/>
+      </p:ext>
+    </p:extLst>
+  </p:cSld>
+  <p:clrMapOvr>
+    <a:masterClrMapping/>
+  </p:clrMapOvr>
+</p:sld>
+</file>
+
+<file path=ppt/slides/slide14.xml><?xml version="1.0" encoding="utf-8"?>
+<p:sld xmlns:a="http://schemas.openxmlformats.org/drawingml/2006/main" xmlns:r="http://schemas.openxmlformats.org/officeDocument/2006/relationships" xmlns:p="http://schemas.openxmlformats.org/presentationml/2006/main">
+  <p:cSld>
+    <p:spTree>
+      <p:nvGrpSpPr>
+        <p:cNvPr id="1" name=""/>
+        <p:cNvGrpSpPr/>
+        <p:nvPr/>
+      </p:nvGrpSpPr>
+      <p:grpSpPr>
+        <a:xfrm>
+          <a:off x="0" y="0"/>
+          <a:ext cx="0" cy="0"/>
+          <a:chOff x="0" y="0"/>
+          <a:chExt cx="0" cy="0"/>
+        </a:xfrm>
+      </p:grpSpPr>
+      <p:sp>
+        <p:nvSpPr>
+          <p:cNvPr id="2" name="Title 1">
+            <a:extLst>
+              <a:ext uri="{FF2B5EF4-FFF2-40B4-BE49-F238E27FC236}">
+                <a16:creationId xmlns:a16="http://schemas.microsoft.com/office/drawing/2014/main" id="{73F53867-5770-3126-BFED-BCEDC7DE3D45}"/>
+              </a:ext>
+            </a:extLst>
+          </p:cNvPr>
+          <p:cNvSpPr>
+            <a:spLocks noGrp="1"/>
+          </p:cNvSpPr>
+          <p:nvPr>
+            <p:ph type="title"/>
+          </p:nvPr>
+        </p:nvSpPr>
+        <p:spPr/>
+        <p:txBody>
+          <a:bodyPr/>
+          <a:lstStyle/>
+          <a:p>
+            <a:r>
+              <a:rPr lang="en-US" dirty="0" err="1"/>
+              <a:t>Összefoglalva</a:t>
+            </a:r>
+            <a:endParaRPr lang="en-GB" dirty="0"/>
+          </a:p>
+        </p:txBody>
+      </p:sp>
+      <p:sp>
+        <p:nvSpPr>
+          <p:cNvPr id="3" name="Content Placeholder 2">
+            <a:extLst>
+              <a:ext uri="{FF2B5EF4-FFF2-40B4-BE49-F238E27FC236}">
+                <a16:creationId xmlns:a16="http://schemas.microsoft.com/office/drawing/2014/main" id="{1CA23CA7-BA98-FF1A-914D-AF8EE3D0CE70}"/>
+              </a:ext>
+            </a:extLst>
+          </p:cNvPr>
+          <p:cNvSpPr>
+            <a:spLocks noGrp="1"/>
+          </p:cNvSpPr>
+          <p:nvPr>
+            <p:ph idx="1"/>
+          </p:nvPr>
+        </p:nvSpPr>
+        <p:spPr/>
+        <p:txBody>
+          <a:bodyPr/>
+          <a:lstStyle/>
+          <a:p>
+            <a:endParaRPr lang="en-GB" dirty="0"/>
+          </a:p>
+        </p:txBody>
+      </p:sp>
+      <p:sp>
+        <p:nvSpPr>
+          <p:cNvPr id="4" name="Date Placeholder 3">
+            <a:extLst>
+              <a:ext uri="{FF2B5EF4-FFF2-40B4-BE49-F238E27FC236}">
+                <a16:creationId xmlns:a16="http://schemas.microsoft.com/office/drawing/2014/main" id="{4B498C31-B6F3-3134-8B18-A36C5C345190}"/>
+              </a:ext>
+            </a:extLst>
+          </p:cNvPr>
+          <p:cNvSpPr>
+            <a:spLocks noGrp="1"/>
+          </p:cNvSpPr>
+          <p:nvPr>
+            <p:ph type="dt" sz="half" idx="10"/>
+          </p:nvPr>
+        </p:nvSpPr>
+        <p:spPr/>
+        <p:txBody>
+          <a:bodyPr/>
+          <a:lstStyle/>
+          <a:p>
+            <a:fld id="{0F996519-E62D-4F8C-AE1E-36928EC7D15C}" type="datetime1">
+              <a:rPr lang="en-US" smtClean="0"/>
+              <a:t>5/13/2025</a:t>
+            </a:fld>
+            <a:endParaRPr lang="en-US"/>
+          </a:p>
+        </p:txBody>
+      </p:sp>
+      <p:sp>
+        <p:nvSpPr>
+          <p:cNvPr id="5" name="Footer Placeholder 4">
+            <a:extLst>
+              <a:ext uri="{FF2B5EF4-FFF2-40B4-BE49-F238E27FC236}">
+                <a16:creationId xmlns:a16="http://schemas.microsoft.com/office/drawing/2014/main" id="{38A1FD55-38F0-DBBD-0766-0D4067DCA6AF}"/>
+              </a:ext>
+            </a:extLst>
+          </p:cNvPr>
+          <p:cNvSpPr>
+            <a:spLocks noGrp="1"/>
+          </p:cNvSpPr>
+          <p:nvPr>
+            <p:ph type="ftr" sz="quarter" idx="11"/>
+          </p:nvPr>
+        </p:nvSpPr>
+        <p:spPr/>
+        <p:txBody>
+          <a:bodyPr/>
+          <a:lstStyle/>
+          <a:p>
+            <a:r>
+              <a:rPr lang="en-US"/>
+              <a:t>Sample Footer Text</a:t>
+            </a:r>
+          </a:p>
+        </p:txBody>
+      </p:sp>
+      <p:sp>
+        <p:nvSpPr>
+          <p:cNvPr id="6" name="Slide Number Placeholder 5">
+            <a:extLst>
+              <a:ext uri="{FF2B5EF4-FFF2-40B4-BE49-F238E27FC236}">
+                <a16:creationId xmlns:a16="http://schemas.microsoft.com/office/drawing/2014/main" id="{292130B4-8DA1-533F-FFA4-753E3D433C85}"/>
+              </a:ext>
+            </a:extLst>
+          </p:cNvPr>
+          <p:cNvSpPr>
+            <a:spLocks noGrp="1"/>
+          </p:cNvSpPr>
+          <p:nvPr>
+            <p:ph type="sldNum" sz="quarter" idx="12"/>
+          </p:nvPr>
+        </p:nvSpPr>
+        <p:spPr/>
+        <p:txBody>
+          <a:bodyPr/>
+          <a:lstStyle/>
+          <a:p>
+            <a:fld id="{6E91CC32-6A6B-4E2E-BBA1-6864F305DA26}" type="slidenum">
+              <a:rPr lang="en-US" smtClean="0"/>
+              <a:t>14</a:t>
             </a:fld>
             <a:endParaRPr lang="en-US"/>
           </a:p>

</xml_diff>

<commit_message>
fix: Update nginx configuration to enable error logging
</commit_message>
<xml_diff>
--- a/Documents/live-streaming-service-presentation.pptx
+++ b/Documents/live-streaming-service-presentation.pptx
@@ -3253,7 +3253,7 @@
           <a:p>
             <a:fld id="{143B4103-D6FE-4A3E-BEA2-F579EC7F2BCE}" type="datetimeFigureOut">
               <a:rPr lang="en-GB" smtClean="0"/>
-              <a:t>13/05/2025</a:t>
+              <a:t>14/05/2025</a:t>
             </a:fld>
             <a:endParaRPr lang="en-GB"/>
           </a:p>
@@ -3830,13 +3830,13 @@
   <p:clrMapOvr>
     <a:masterClrMapping/>
   </p:clrMapOvr>
-  <mc:AlternateContent xmlns:mc="http://schemas.openxmlformats.org/markup-compatibility/2006">
-    <mc:Choice xmlns:p14="http://schemas.microsoft.com/office/powerpoint/2010/main" Requires="p14">
+  <mc:AlternateContent xmlns:mc="http://schemas.openxmlformats.org/markup-compatibility/2006" xmlns:p14="http://schemas.microsoft.com/office/powerpoint/2010/main">
+    <mc:Choice Requires="p14">
       <p:transition p14:dur="250">
         <p:fade/>
       </p:transition>
     </mc:Choice>
-    <mc:Fallback>
+    <mc:Fallback xmlns="">
       <p:transition>
         <p:fade/>
       </p:transition>
@@ -4054,13 +4054,13 @@
   <p:clrMapOvr>
     <a:masterClrMapping/>
   </p:clrMapOvr>
-  <mc:AlternateContent xmlns:mc="http://schemas.openxmlformats.org/markup-compatibility/2006">
-    <mc:Choice xmlns:p14="http://schemas.microsoft.com/office/powerpoint/2010/main" Requires="p14">
+  <mc:AlternateContent xmlns:mc="http://schemas.openxmlformats.org/markup-compatibility/2006" xmlns:p14="http://schemas.microsoft.com/office/powerpoint/2010/main">
+    <mc:Choice Requires="p14">
       <p:transition p14:dur="250">
         <p:fade/>
       </p:transition>
     </mc:Choice>
-    <mc:Fallback>
+    <mc:Fallback xmlns="">
       <p:transition>
         <p:fade/>
       </p:transition>
@@ -4277,13 +4277,13 @@
   <p:clrMapOvr>
     <a:masterClrMapping/>
   </p:clrMapOvr>
-  <mc:AlternateContent xmlns:mc="http://schemas.openxmlformats.org/markup-compatibility/2006">
-    <mc:Choice xmlns:p14="http://schemas.microsoft.com/office/powerpoint/2010/main" Requires="p14">
+  <mc:AlternateContent xmlns:mc="http://schemas.openxmlformats.org/markup-compatibility/2006" xmlns:p14="http://schemas.microsoft.com/office/powerpoint/2010/main">
+    <mc:Choice Requires="p14">
       <p:transition p14:dur="250">
         <p:fade/>
       </p:transition>
     </mc:Choice>
-    <mc:Fallback>
+    <mc:Fallback xmlns="">
       <p:transition>
         <p:fade/>
       </p:transition>
@@ -4466,7 +4466,12 @@
             <p:ph type="sldNum" sz="quarter" idx="12"/>
           </p:nvPr>
         </p:nvSpPr>
-        <p:spPr/>
+        <p:spPr>
+          <a:xfrm>
+            <a:off x="20828" y="6580039"/>
+            <a:ext cx="314639" cy="209847"/>
+          </a:xfrm>
+        </p:spPr>
         <p:txBody>
           <a:bodyPr/>
           <a:lstStyle/>
@@ -4489,13 +4494,13 @@
   <p:clrMapOvr>
     <a:masterClrMapping/>
   </p:clrMapOvr>
-  <mc:AlternateContent xmlns:mc="http://schemas.openxmlformats.org/markup-compatibility/2006">
-    <mc:Choice xmlns:p14="http://schemas.microsoft.com/office/powerpoint/2010/main" Requires="p14">
+  <mc:AlternateContent xmlns:mc="http://schemas.openxmlformats.org/markup-compatibility/2006" xmlns:p14="http://schemas.microsoft.com/office/powerpoint/2010/main">
+    <mc:Choice Requires="p14">
       <p:transition p14:dur="250">
         <p:fade/>
       </p:transition>
     </mc:Choice>
-    <mc:Fallback>
+    <mc:Fallback xmlns="">
       <p:transition>
         <p:fade/>
       </p:transition>
@@ -4783,13 +4788,13 @@
   <p:clrMapOvr>
     <a:masterClrMapping/>
   </p:clrMapOvr>
-  <mc:AlternateContent xmlns:mc="http://schemas.openxmlformats.org/markup-compatibility/2006">
-    <mc:Choice xmlns:p14="http://schemas.microsoft.com/office/powerpoint/2010/main" Requires="p14">
+  <mc:AlternateContent xmlns:mc="http://schemas.openxmlformats.org/markup-compatibility/2006" xmlns:p14="http://schemas.microsoft.com/office/powerpoint/2010/main">
+    <mc:Choice Requires="p14">
       <p:transition p14:dur="250">
         <p:fade/>
       </p:transition>
     </mc:Choice>
-    <mc:Fallback>
+    <mc:Fallback xmlns="">
       <p:transition>
         <p:fade/>
       </p:transition>
@@ -5106,13 +5111,13 @@
   <p:clrMapOvr>
     <a:masterClrMapping/>
   </p:clrMapOvr>
-  <mc:AlternateContent xmlns:mc="http://schemas.openxmlformats.org/markup-compatibility/2006">
-    <mc:Choice xmlns:p14="http://schemas.microsoft.com/office/powerpoint/2010/main" Requires="p14">
+  <mc:AlternateContent xmlns:mc="http://schemas.openxmlformats.org/markup-compatibility/2006" xmlns:p14="http://schemas.microsoft.com/office/powerpoint/2010/main">
+    <mc:Choice Requires="p14">
       <p:transition p14:dur="250">
         <p:fade/>
       </p:transition>
     </mc:Choice>
-    <mc:Fallback>
+    <mc:Fallback xmlns="">
       <p:transition>
         <p:fade/>
       </p:transition>
@@ -5538,13 +5543,13 @@
   <p:clrMapOvr>
     <a:masterClrMapping/>
   </p:clrMapOvr>
-  <mc:AlternateContent xmlns:mc="http://schemas.openxmlformats.org/markup-compatibility/2006">
-    <mc:Choice xmlns:p14="http://schemas.microsoft.com/office/powerpoint/2010/main" Requires="p14">
+  <mc:AlternateContent xmlns:mc="http://schemas.openxmlformats.org/markup-compatibility/2006" xmlns:p14="http://schemas.microsoft.com/office/powerpoint/2010/main">
+    <mc:Choice Requires="p14">
       <p:transition p14:dur="250">
         <p:fade/>
       </p:transition>
     </mc:Choice>
-    <mc:Fallback>
+    <mc:Fallback xmlns="">
       <p:transition>
         <p:fade/>
       </p:transition>
@@ -5699,13 +5704,13 @@
   <p:clrMapOvr>
     <a:masterClrMapping/>
   </p:clrMapOvr>
-  <mc:AlternateContent xmlns:mc="http://schemas.openxmlformats.org/markup-compatibility/2006">
-    <mc:Choice xmlns:p14="http://schemas.microsoft.com/office/powerpoint/2010/main" Requires="p14">
+  <mc:AlternateContent xmlns:mc="http://schemas.openxmlformats.org/markup-compatibility/2006" xmlns:p14="http://schemas.microsoft.com/office/powerpoint/2010/main">
+    <mc:Choice Requires="p14">
       <p:transition p14:dur="250">
         <p:fade/>
       </p:transition>
     </mc:Choice>
-    <mc:Fallback>
+    <mc:Fallback xmlns="">
       <p:transition>
         <p:fade/>
       </p:transition>
@@ -5826,13 +5831,13 @@
   <p:clrMapOvr>
     <a:masterClrMapping/>
   </p:clrMapOvr>
-  <mc:AlternateContent xmlns:mc="http://schemas.openxmlformats.org/markup-compatibility/2006">
-    <mc:Choice xmlns:p14="http://schemas.microsoft.com/office/powerpoint/2010/main" Requires="p14">
+  <mc:AlternateContent xmlns:mc="http://schemas.openxmlformats.org/markup-compatibility/2006" xmlns:p14="http://schemas.microsoft.com/office/powerpoint/2010/main">
+    <mc:Choice Requires="p14">
       <p:transition p14:dur="250">
         <p:fade/>
       </p:transition>
     </mc:Choice>
-    <mc:Fallback>
+    <mc:Fallback xmlns="">
       <p:transition>
         <p:fade/>
       </p:transition>
@@ -6153,13 +6158,13 @@
   <p:clrMapOvr>
     <a:masterClrMapping/>
   </p:clrMapOvr>
-  <mc:AlternateContent xmlns:mc="http://schemas.openxmlformats.org/markup-compatibility/2006">
-    <mc:Choice xmlns:p14="http://schemas.microsoft.com/office/powerpoint/2010/main" Requires="p14">
+  <mc:AlternateContent xmlns:mc="http://schemas.openxmlformats.org/markup-compatibility/2006" xmlns:p14="http://schemas.microsoft.com/office/powerpoint/2010/main">
+    <mc:Choice Requires="p14">
       <p:transition p14:dur="250">
         <p:fade/>
       </p:transition>
     </mc:Choice>
-    <mc:Fallback>
+    <mc:Fallback xmlns="">
       <p:transition>
         <p:fade/>
       </p:transition>
@@ -6464,13 +6469,13 @@
   <p:clrMapOvr>
     <a:masterClrMapping/>
   </p:clrMapOvr>
-  <mc:AlternateContent xmlns:mc="http://schemas.openxmlformats.org/markup-compatibility/2006">
-    <mc:Choice xmlns:p14="http://schemas.microsoft.com/office/powerpoint/2010/main" Requires="p14">
+  <mc:AlternateContent xmlns:mc="http://schemas.openxmlformats.org/markup-compatibility/2006" xmlns:p14="http://schemas.microsoft.com/office/powerpoint/2010/main">
+    <mc:Choice Requires="p14">
       <p:transition p14:dur="250">
         <p:fade/>
       </p:transition>
     </mc:Choice>
-    <mc:Fallback>
+    <mc:Fallback xmlns="">
       <p:transition>
         <p:fade/>
       </p:transition>
@@ -6715,7 +6720,7 @@
         </p:nvSpPr>
         <p:spPr>
           <a:xfrm>
-            <a:off x="11403951" y="6425816"/>
+            <a:off x="120583" y="6412146"/>
             <a:ext cx="429768" cy="365125"/>
           </a:xfrm>
           <a:prstGeom prst="rect">
@@ -6763,19 +6768,19 @@
     <p:sldLayoutId id="2147483730" r:id="rId10"/>
     <p:sldLayoutId id="2147483732" r:id="rId11"/>
   </p:sldLayoutIdLst>
-  <mc:AlternateContent xmlns:mc="http://schemas.openxmlformats.org/markup-compatibility/2006">
-    <mc:Choice xmlns:p14="http://schemas.microsoft.com/office/powerpoint/2010/main" Requires="p14">
+  <mc:AlternateContent xmlns:mc="http://schemas.openxmlformats.org/markup-compatibility/2006" xmlns:p14="http://schemas.microsoft.com/office/powerpoint/2010/main">
+    <mc:Choice Requires="p14">
       <p:transition p14:dur="250">
         <p:fade/>
       </p:transition>
     </mc:Choice>
-    <mc:Fallback>
+    <mc:Fallback xmlns="">
       <p:transition>
         <p:fade/>
       </p:transition>
     </mc:Fallback>
   </mc:AlternateContent>
-  <p:hf sldNum="0" hdr="0" ftr="0"/>
+  <p:hf hdr="0" ftr="0"/>
   <p:txStyles>
     <p:titleStyle>
       <a:lvl1pPr algn="l" defTabSz="914400" rtl="0" eaLnBrk="1" latinLnBrk="0" hangingPunct="1">
@@ -7258,10 +7263,10 @@
           <a:lstStyle/>
           <a:p>
             <a:r>
-              <a:rPr lang="en-US" sz="4800"/>
+              <a:rPr lang="en-US" sz="4800" dirty="0"/>
               <a:t>Live Streaming Service</a:t>
             </a:r>
-            <a:endParaRPr lang="en-GB" sz="4800"/>
+            <a:endParaRPr lang="en-GB" sz="4800" dirty="0"/>
           </a:p>
         </p:txBody>
       </p:sp>
@@ -7366,6 +7371,35 @@
               <a:rPr lang="en-US"/>
               <a:t>5/13/2025</a:t>
             </a:r>
+          </a:p>
+        </p:txBody>
+      </p:sp>
+      <p:sp>
+        <p:nvSpPr>
+          <p:cNvPr id="5" name="Slide Number Placeholder 4">
+            <a:extLst>
+              <a:ext uri="{FF2B5EF4-FFF2-40B4-BE49-F238E27FC236}">
+                <a16:creationId xmlns:a16="http://schemas.microsoft.com/office/drawing/2014/main" id="{DCC19E92-51BC-6798-8DEC-BEABE2674D88}"/>
+              </a:ext>
+            </a:extLst>
+          </p:cNvPr>
+          <p:cNvSpPr>
+            <a:spLocks noGrp="1"/>
+          </p:cNvSpPr>
+          <p:nvPr>
+            <p:ph type="sldNum" sz="quarter" idx="12"/>
+          </p:nvPr>
+        </p:nvSpPr>
+        <p:spPr/>
+        <p:txBody>
+          <a:bodyPr/>
+          <a:lstStyle/>
+          <a:p>
+            <a:fld id="{6E91CC32-6A6B-4E2E-BBA1-6864F305DA26}" type="slidenum">
+              <a:rPr lang="en-US" smtClean="0"/>
+              <a:t>1</a:t>
+            </a:fld>
+            <a:endParaRPr lang="en-US"/>
           </a:p>
         </p:txBody>
       </p:sp>
@@ -7379,13 +7413,13 @@
   <p:clrMapOvr>
     <a:masterClrMapping/>
   </p:clrMapOvr>
-  <mc:AlternateContent xmlns:mc="http://schemas.openxmlformats.org/markup-compatibility/2006">
-    <mc:Choice xmlns:p14="http://schemas.microsoft.com/office/powerpoint/2010/main" Requires="p14">
+  <mc:AlternateContent xmlns:mc="http://schemas.openxmlformats.org/markup-compatibility/2006" xmlns:p14="http://schemas.microsoft.com/office/powerpoint/2010/main">
+    <mc:Choice Requires="p14">
       <p:transition p14:dur="250">
         <p:fade/>
       </p:transition>
     </mc:Choice>
-    <mc:Fallback>
+    <mc:Fallback xmlns="">
       <p:transition>
         <p:fade/>
       </p:transition>
@@ -7597,8 +7631,8 @@
         </p:nvSpPr>
         <p:spPr>
           <a:xfrm>
-            <a:off x="340137" y="2574488"/>
-            <a:ext cx="5062115" cy="3547872"/>
+            <a:off x="135254" y="2986172"/>
+            <a:ext cx="7351259" cy="2372690"/>
           </a:xfrm>
         </p:spPr>
         <p:txBody>
@@ -7615,7 +7649,7 @@
               <a:buChar char="•"/>
             </a:pPr>
             <a:r>
-              <a:rPr lang="hu-HU" sz="1500" b="0" i="0">
+              <a:rPr lang="hu-HU" b="0" i="0" dirty="0">
                 <a:effectLst/>
                 <a:latin typeface="Segoe WPC"/>
               </a:rPr>
@@ -7631,39 +7665,11 @@
               <a:buChar char="•"/>
             </a:pPr>
             <a:r>
-              <a:rPr lang="hu-HU" sz="1500" b="0" i="0">
+              <a:rPr lang="hu-HU" b="0" i="0" dirty="0">
                 <a:effectLst/>
                 <a:latin typeface="Segoe WPC"/>
               </a:rPr>
-              <a:t>Élő </a:t>
-            </a:r>
-            <a:r>
-              <a:rPr lang="hu-HU" sz="1500" b="0" i="0" err="1">
-                <a:effectLst/>
-                <a:latin typeface="Segoe WPC"/>
-              </a:rPr>
-              <a:t>stream</a:t>
-            </a:r>
-            <a:r>
-              <a:rPr lang="hu-HU" sz="1500" b="0" i="0">
-                <a:effectLst/>
-                <a:latin typeface="Segoe WPC"/>
-              </a:rPr>
-              <a:t> indítása egyedi </a:t>
-            </a:r>
-            <a:r>
-              <a:rPr lang="hu-HU" sz="1500" b="0" i="0" err="1">
-                <a:effectLst/>
-                <a:latin typeface="Segoe WPC"/>
-              </a:rPr>
-              <a:t>stream</a:t>
-            </a:r>
-            <a:r>
-              <a:rPr lang="hu-HU" sz="1500" b="0" i="0">
-                <a:effectLst/>
-                <a:latin typeface="Segoe WPC"/>
-              </a:rPr>
-              <a:t> kulccsal</a:t>
+              <a:t>Élő stream indítása egyedi stream kulccsal</a:t>
             </a:r>
           </a:p>
           <a:p>
@@ -7675,18 +7681,11 @@
               <a:buChar char="•"/>
             </a:pPr>
             <a:r>
-              <a:rPr lang="hu-HU" sz="1500" b="0" i="0" err="1">
+              <a:rPr lang="hu-HU" b="0" i="0" dirty="0">
                 <a:effectLst/>
                 <a:latin typeface="Segoe WPC"/>
               </a:rPr>
-              <a:t>Streamek</a:t>
-            </a:r>
-            <a:r>
-              <a:rPr lang="hu-HU" sz="1500" b="0" i="0">
-                <a:effectLst/>
-                <a:latin typeface="Segoe WPC"/>
-              </a:rPr>
-              <a:t> böngészése, nézése valós idejű nézőszámlálással</a:t>
+              <a:t>Streamek böngészése, nézése valós idejű nézőszámlálással</a:t>
             </a:r>
           </a:p>
           <a:p>
@@ -7698,18 +7697,11 @@
               <a:buChar char="•"/>
             </a:pPr>
             <a:r>
-              <a:rPr lang="hu-HU" sz="1500" b="0" i="0" err="1">
+              <a:rPr lang="hu-HU" b="0" i="0" dirty="0">
                 <a:effectLst/>
                 <a:latin typeface="Segoe WPC"/>
               </a:rPr>
-              <a:t>Stream</a:t>
-            </a:r>
-            <a:r>
-              <a:rPr lang="hu-HU" sz="1500" b="0" i="0">
-                <a:effectLst/>
-                <a:latin typeface="Segoe WPC"/>
-              </a:rPr>
-              <a:t> ajánlások (népszerűség, követések alapján)</a:t>
+              <a:t>Stream ajánlások (népszerűség, követések alapján)</a:t>
             </a:r>
           </a:p>
           <a:p>
@@ -7721,111 +7713,12 @@
               <a:buChar char="•"/>
             </a:pPr>
             <a:r>
-              <a:rPr lang="hu-HU" sz="1500" b="0" i="0">
+              <a:rPr lang="hu-HU" b="0" i="0" dirty="0">
                 <a:effectLst/>
                 <a:latin typeface="Segoe WPC"/>
               </a:rPr>
-              <a:t>Követés funkció (</a:t>
-            </a:r>
-            <a:r>
-              <a:rPr lang="hu-HU" sz="1500" b="0" i="0" err="1">
-                <a:effectLst/>
-                <a:latin typeface="Segoe WPC"/>
-              </a:rPr>
-              <a:t>streamerek</a:t>
-            </a:r>
-            <a:r>
-              <a:rPr lang="hu-HU" sz="1500" b="0" i="0">
-                <a:effectLst/>
-                <a:latin typeface="Segoe WPC"/>
-              </a:rPr>
-              <a:t> követése, élő státusz megjelenítése)</a:t>
-            </a:r>
-          </a:p>
-          <a:p>
-            <a:pPr>
-              <a:lnSpc>
-                <a:spcPct val="110000"/>
-              </a:lnSpc>
-              <a:buFont typeface="Arial" panose="020B0604020202020204" pitchFamily="34" charset="0"/>
-              <a:buChar char="•"/>
-            </a:pPr>
-            <a:r>
-              <a:rPr lang="hu-HU" sz="1500" b="0" i="0">
-                <a:effectLst/>
-                <a:latin typeface="Segoe WPC"/>
-              </a:rPr>
-              <a:t>Modern, reszponzív webes felület (</a:t>
-            </a:r>
-            <a:r>
-              <a:rPr lang="hu-HU" sz="1500" b="0" i="0" err="1">
-                <a:effectLst/>
-                <a:latin typeface="Segoe WPC"/>
-              </a:rPr>
-              <a:t>Angular</a:t>
-            </a:r>
-            <a:r>
-              <a:rPr lang="hu-HU" sz="1500" b="0" i="0">
-                <a:effectLst/>
-                <a:latin typeface="Segoe WPC"/>
-              </a:rPr>
-              <a:t> frontend)</a:t>
-            </a:r>
-            <a:endParaRPr lang="en-US" sz="1500" b="0" i="0">
-              <a:effectLst/>
-              <a:latin typeface="Segoe WPC"/>
-            </a:endParaRPr>
-          </a:p>
-          <a:p>
-            <a:pPr>
-              <a:lnSpc>
-                <a:spcPct val="110000"/>
-              </a:lnSpc>
-              <a:buFont typeface="Arial" panose="020B0604020202020204" pitchFamily="34" charset="0"/>
-              <a:buChar char="•"/>
-            </a:pPr>
-            <a:r>
-              <a:rPr lang="en-US" sz="1500" err="1">
-                <a:latin typeface="Segoe WPC"/>
-              </a:rPr>
-              <a:t>Mikroszolgáltatás</a:t>
-            </a:r>
-            <a:r>
-              <a:rPr lang="en-US" sz="1500">
-                <a:latin typeface="Segoe WPC"/>
-              </a:rPr>
-              <a:t> </a:t>
-            </a:r>
-            <a:r>
-              <a:rPr lang="en-US" sz="1500" err="1">
-                <a:latin typeface="Segoe WPC"/>
-              </a:rPr>
-              <a:t>architektúra</a:t>
-            </a:r>
-            <a:r>
-              <a:rPr lang="en-US" sz="1500">
-                <a:latin typeface="Segoe WPC"/>
-              </a:rPr>
-              <a:t> </a:t>
-            </a:r>
-            <a:r>
-              <a:rPr lang="en-US" sz="1500" err="1">
-                <a:latin typeface="Segoe WPC"/>
-              </a:rPr>
-              <a:t>Kubernetesben</a:t>
-            </a:r>
-            <a:endParaRPr lang="hu-HU" sz="1500" b="0" i="0">
-              <a:effectLst/>
-              <a:latin typeface="Segoe WPC"/>
-            </a:endParaRPr>
-          </a:p>
-          <a:p>
-            <a:pPr>
-              <a:lnSpc>
-                <a:spcPct val="110000"/>
-              </a:lnSpc>
-            </a:pPr>
-            <a:endParaRPr lang="en-GB" sz="1500"/>
+              <a:t>Követés funkció (streamerek követése, élő státusz megjelenítése)</a:t>
+            </a:r>
           </a:p>
         </p:txBody>
       </p:sp>
@@ -8233,6 +8126,35 @@
           </a:p>
         </p:txBody>
       </p:sp>
+      <p:sp>
+        <p:nvSpPr>
+          <p:cNvPr id="6" name="Slide Number Placeholder 5">
+            <a:extLst>
+              <a:ext uri="{FF2B5EF4-FFF2-40B4-BE49-F238E27FC236}">
+                <a16:creationId xmlns:a16="http://schemas.microsoft.com/office/drawing/2014/main" id="{58F779DF-D302-A51B-4EF8-433CC1052BDD}"/>
+              </a:ext>
+            </a:extLst>
+          </p:cNvPr>
+          <p:cNvSpPr>
+            <a:spLocks noGrp="1"/>
+          </p:cNvSpPr>
+          <p:nvPr>
+            <p:ph type="sldNum" sz="quarter" idx="12"/>
+          </p:nvPr>
+        </p:nvSpPr>
+        <p:spPr/>
+        <p:txBody>
+          <a:bodyPr/>
+          <a:lstStyle/>
+          <a:p>
+            <a:fld id="{6E91CC32-6A6B-4E2E-BBA1-6864F305DA26}" type="slidenum">
+              <a:rPr lang="en-US" smtClean="0"/>
+              <a:t>10</a:t>
+            </a:fld>
+            <a:endParaRPr lang="en-US"/>
+          </a:p>
+        </p:txBody>
+      </p:sp>
     </p:spTree>
     <p:extLst>
       <p:ext uri="{BB962C8B-B14F-4D97-AF65-F5344CB8AC3E}">
@@ -8243,13 +8165,13 @@
   <p:clrMapOvr>
     <a:masterClrMapping/>
   </p:clrMapOvr>
-  <mc:AlternateContent xmlns:mc="http://schemas.openxmlformats.org/markup-compatibility/2006">
-    <mc:Choice xmlns:p14="http://schemas.microsoft.com/office/powerpoint/2010/main" Requires="p14">
+  <mc:AlternateContent xmlns:mc="http://schemas.openxmlformats.org/markup-compatibility/2006" xmlns:p14="http://schemas.microsoft.com/office/powerpoint/2010/main">
+    <mc:Choice Requires="p14">
       <p:transition p14:dur="250">
         <p:fade/>
       </p:transition>
     </mc:Choice>
-    <mc:Fallback>
+    <mc:Fallback xmlns="">
       <p:transition>
         <p:fade/>
       </p:transition>
@@ -8511,7 +8433,7 @@
           <a:lstStyle/>
           <a:p>
             <a:r>
-              <a:rPr lang="en-US" b="1" kern="1200">
+              <a:rPr lang="en-US" b="1" kern="1200" dirty="0" err="1">
                 <a:solidFill>
                   <a:schemeClr val="tx1"/>
                 </a:solidFill>
@@ -8521,6 +8443,14 @@
               </a:rPr>
               <a:t>Architektúra</a:t>
             </a:r>
+            <a:endParaRPr lang="en-US" b="1" kern="1200" dirty="0">
+              <a:solidFill>
+                <a:schemeClr val="tx1"/>
+              </a:solidFill>
+              <a:latin typeface="+mj-lt"/>
+              <a:ea typeface="+mj-ea"/>
+              <a:cs typeface="+mj-cs"/>
+            </a:endParaRPr>
           </a:p>
         </p:txBody>
       </p:sp>
@@ -8578,8 +8508,8 @@
         </p:nvSpPr>
         <p:spPr>
           <a:xfrm>
-            <a:off x="170309" y="1721105"/>
-            <a:ext cx="4532418" cy="3472190"/>
+            <a:off x="178147" y="2154524"/>
+            <a:ext cx="5058469" cy="3472190"/>
           </a:xfrm>
           <a:prstGeom prst="rect">
             <a:avLst/>
@@ -8602,40 +8532,51 @@
               <a:buChar char="•"/>
             </a:pPr>
             <a:r>
-              <a:rPr lang="en-US" sz="1100" b="0" i="0" dirty="0" err="1">
+              <a:rPr lang="en-US" sz="1400" b="0" i="0" dirty="0" err="1">
                 <a:effectLst/>
               </a:rPr>
               <a:t>Mikroszolgáltatás-alapú</a:t>
             </a:r>
             <a:r>
-              <a:rPr lang="en-US" sz="1100" b="0" i="0" dirty="0">
+              <a:rPr lang="en-US" sz="1400" b="0" i="0" dirty="0">
                 <a:effectLst/>
               </a:rPr>
-              <a:t> backend (</a:t>
-            </a:r>
-            <a:r>
-              <a:rPr lang="en-US" sz="1100" b="0" i="0" dirty="0" err="1">
+              <a:t> backend </a:t>
+            </a:r>
+            <a:br>
+              <a:rPr lang="en-US" sz="1400" b="0" i="0" dirty="0">
+                <a:effectLst/>
+              </a:rPr>
+            </a:br>
+            <a:r>
+              <a:rPr lang="en-US" sz="1400" b="0" i="0" dirty="0">
+                <a:effectLst/>
+              </a:rPr>
+              <a:t>     (</a:t>
+            </a:r>
+            <a:r>
+              <a:rPr lang="en-US" sz="1400" b="0" i="0" dirty="0" err="1">
                 <a:effectLst/>
               </a:rPr>
               <a:t>különálló</a:t>
             </a:r>
             <a:r>
-              <a:rPr lang="en-US" sz="1100" b="0" i="0" dirty="0">
+              <a:rPr lang="en-US" sz="1400" b="0" i="0" dirty="0">
                 <a:effectLst/>
               </a:rPr>
               <a:t> </a:t>
             </a:r>
             <a:r>
-              <a:rPr lang="en-US" sz="1100" b="0" i="0" dirty="0" err="1">
+              <a:rPr lang="en-US" sz="1400" b="0" i="0" dirty="0" err="1">
                 <a:effectLst/>
               </a:rPr>
               <a:t>szolgáltatások</a:t>
             </a:r>
             <a:r>
-              <a:rPr lang="en-US" sz="1100" b="0" i="0" dirty="0">
+              <a:rPr lang="en-US" sz="1400" b="0" i="0" dirty="0">
                 <a:effectLst/>
               </a:rPr>
-              <a:t>: Auth, User, Stream, Viewer, Follower)</a:t>
+              <a:t>)</a:t>
             </a:r>
           </a:p>
           <a:p>
@@ -8650,78 +8591,42 @@
               <a:buChar char="•"/>
             </a:pPr>
             <a:r>
-              <a:rPr lang="en-US" sz="1100" b="0" i="0" dirty="0">
+              <a:rPr lang="en-US" sz="1400" b="0" i="0" dirty="0">
                 <a:effectLst/>
               </a:rPr>
-              <a:t>Minden </a:t>
-            </a:r>
-            <a:r>
-              <a:rPr lang="en-US" sz="1100" b="0" i="0" dirty="0" err="1">
+              <a:t>REST API </a:t>
+            </a:r>
+            <a:r>
+              <a:rPr lang="en-US" sz="1400" b="0" i="0" dirty="0" err="1">
                 <a:effectLst/>
               </a:rPr>
-              <a:t>fő</a:t>
-            </a:r>
-            <a:r>
-              <a:rPr lang="en-US" sz="1100" b="0" i="0" dirty="0">
+              <a:t>hívások</a:t>
+            </a:r>
+            <a:r>
+              <a:rPr lang="en-US" sz="1400" b="0" i="0" dirty="0">
                 <a:effectLst/>
               </a:rPr>
               <a:t> </a:t>
             </a:r>
             <a:r>
-              <a:rPr lang="en-US" sz="1100" b="0" i="0" dirty="0" err="1">
+              <a:rPr lang="en-US" sz="1400" b="0" i="0" dirty="0" err="1">
                 <a:effectLst/>
               </a:rPr>
-              <a:t>komponens</a:t>
-            </a:r>
-            <a:r>
-              <a:rPr lang="en-US" sz="1100" b="0" i="0" dirty="0">
+              <a:t>komponensek</a:t>
+            </a:r>
+            <a:r>
+              <a:rPr lang="en-US" sz="1400" b="0" i="0" dirty="0">
                 <a:effectLst/>
               </a:rPr>
               <a:t> </a:t>
             </a:r>
             <a:r>
-              <a:rPr lang="en-US" sz="1100" b="0" i="0" dirty="0" err="1">
+              <a:rPr lang="en-US" sz="1400" b="0" i="0" dirty="0" err="1">
                 <a:effectLst/>
               </a:rPr>
-              <a:t>külön</a:t>
-            </a:r>
-            <a:r>
-              <a:rPr lang="en-US" sz="1100" b="0" i="0" dirty="0">
-                <a:effectLst/>
-              </a:rPr>
-              <a:t> </a:t>
-            </a:r>
-            <a:r>
-              <a:rPr lang="en-US" sz="1100" b="0" i="0" dirty="0" err="1">
-                <a:effectLst/>
-              </a:rPr>
-              <a:t>konténerben</a:t>
-            </a:r>
-            <a:r>
-              <a:rPr lang="en-US" sz="1100" b="0" i="0" dirty="0">
-                <a:effectLst/>
-              </a:rPr>
-              <a:t>, Kubernetes </a:t>
-            </a:r>
-            <a:r>
-              <a:rPr lang="en-US" sz="1100" b="0" i="0" dirty="0" err="1">
-                <a:effectLst/>
-              </a:rPr>
-              <a:t>klaszterben</a:t>
-            </a:r>
-            <a:r>
-              <a:rPr lang="en-US" sz="1100" b="0" i="0" dirty="0">
-                <a:effectLst/>
-              </a:rPr>
-              <a:t> </a:t>
-            </a:r>
-            <a:r>
-              <a:rPr lang="en-US" sz="1100" b="0" i="0" dirty="0" err="1">
-                <a:effectLst/>
-              </a:rPr>
-              <a:t>fut</a:t>
-            </a:r>
-            <a:endParaRPr lang="en-US" sz="1100" b="0" i="0" dirty="0">
+              <a:t>között</a:t>
+            </a:r>
+            <a:endParaRPr lang="en-US" sz="1400" b="0" i="0" dirty="0">
               <a:effectLst/>
             </a:endParaRPr>
           </a:p>
@@ -8737,41 +8642,44 @@
               <a:buChar char="•"/>
             </a:pPr>
             <a:r>
-              <a:rPr lang="en-US" sz="1100" b="0" i="0" dirty="0" err="1">
+              <a:rPr lang="en-US" sz="1400" b="0" i="0" dirty="0">
                 <a:effectLst/>
               </a:rPr>
-              <a:t>Komponensek</a:t>
-            </a:r>
-            <a:r>
-              <a:rPr lang="en-US" sz="1100" b="0" i="0" dirty="0">
+              <a:t>Streaming </a:t>
+            </a:r>
+            <a:r>
+              <a:rPr lang="en-US" sz="1400" b="0" i="0" dirty="0" err="1">
                 <a:effectLst/>
               </a:rPr>
-              <a:t> </a:t>
-            </a:r>
-            <a:r>
-              <a:rPr lang="en-US" sz="1100" b="0" i="0" dirty="0" err="1">
+              <a:t>szerver</a:t>
+            </a:r>
+            <a:r>
+              <a:rPr lang="en-US" sz="1400" b="0" i="0" dirty="0">
                 <a:effectLst/>
               </a:rPr>
-              <a:t>közötti</a:t>
-            </a:r>
-            <a:r>
-              <a:rPr lang="en-US" sz="1100" b="0" i="0" dirty="0">
+              <a:t>: RTMP </a:t>
+            </a:r>
+            <a:r>
+              <a:rPr lang="en-US" sz="1400" b="0" i="0" dirty="0" err="1">
                 <a:effectLst/>
               </a:rPr>
-              <a:t> </a:t>
-            </a:r>
-            <a:r>
-              <a:rPr lang="en-US" sz="1100" b="0" i="0" dirty="0" err="1">
+              <a:t>fogadás</a:t>
+            </a:r>
+            <a:r>
+              <a:rPr lang="en-US" sz="1400" b="0" i="0" dirty="0">
                 <a:effectLst/>
               </a:rPr>
-              <a:t>kommunikáció</a:t>
-            </a:r>
-            <a:r>
-              <a:rPr lang="en-US" sz="1100" b="0" i="0" dirty="0">
+              <a:t>, HLS </a:t>
+            </a:r>
+            <a:r>
+              <a:rPr lang="en-US" sz="1400" b="0" i="0" dirty="0" err="1">
                 <a:effectLst/>
               </a:rPr>
-              <a:t>: REST API, WebSocket</a:t>
-            </a:r>
+              <a:t>továbbítás</a:t>
+            </a:r>
+            <a:endParaRPr lang="en-US" sz="1400" b="0" i="0" dirty="0">
+              <a:effectLst/>
+            </a:endParaRPr>
           </a:p>
           <a:p>
             <a:pPr indent="-228600">
@@ -8785,43 +8693,43 @@
               <a:buChar char="•"/>
             </a:pPr>
             <a:r>
-              <a:rPr lang="en-US" sz="1100" b="0" i="0" dirty="0">
+              <a:rPr lang="en-US" sz="1400" b="0" i="0" dirty="0">
                 <a:effectLst/>
               </a:rPr>
-              <a:t>Streaming </a:t>
-            </a:r>
-            <a:r>
-              <a:rPr lang="en-US" sz="1100" b="0" i="0" dirty="0" err="1">
+              <a:t>PostgreSQL (</a:t>
+            </a:r>
+            <a:r>
+              <a:rPr lang="en-US" sz="1400" b="0" i="0" dirty="0" err="1">
                 <a:effectLst/>
               </a:rPr>
-              <a:t>szerver</a:t>
-            </a:r>
-            <a:r>
-              <a:rPr lang="en-US" sz="1100" b="0" i="0" dirty="0">
+              <a:t>tartós</a:t>
+            </a:r>
+            <a:r>
+              <a:rPr lang="en-US" sz="1400" b="0" i="0" dirty="0">
                 <a:effectLst/>
               </a:rPr>
-              <a:t>: Nginx-RTMP (RTMP </a:t>
-            </a:r>
-            <a:r>
-              <a:rPr lang="en-US" sz="1100" b="0" i="0" dirty="0" err="1">
+              <a:t> </a:t>
+            </a:r>
+            <a:r>
+              <a:rPr lang="en-US" sz="1400" b="0" i="0" dirty="0" err="1">
                 <a:effectLst/>
               </a:rPr>
-              <a:t>fogadás</a:t>
-            </a:r>
-            <a:r>
-              <a:rPr lang="en-US" sz="1100" b="0" i="0" dirty="0">
+              <a:t>adatok</a:t>
+            </a:r>
+            <a:r>
+              <a:rPr lang="en-US" sz="1400" b="0" i="0" dirty="0">
                 <a:effectLst/>
               </a:rPr>
-              <a:t>, HLS </a:t>
-            </a:r>
-            <a:r>
-              <a:rPr lang="en-US" sz="1100" b="0" i="0" dirty="0" err="1">
+              <a:t>), Redis (</a:t>
+            </a:r>
+            <a:r>
+              <a:rPr lang="en-US" sz="1400" b="0" i="0" dirty="0" err="1">
                 <a:effectLst/>
               </a:rPr>
-              <a:t>továbbítás</a:t>
-            </a:r>
-            <a:r>
-              <a:rPr lang="en-US" sz="1100" b="0" i="0" dirty="0">
+              <a:t>gyorsítótár</a:t>
+            </a:r>
+            <a:r>
+              <a:rPr lang="en-US" sz="1400" b="0" i="0" dirty="0">
                 <a:effectLst/>
               </a:rPr>
               <a:t>)</a:t>
@@ -8839,89 +8747,44 @@
               <a:buChar char="•"/>
             </a:pPr>
             <a:r>
-              <a:rPr lang="en-US" sz="1100" b="0" i="0" dirty="0" err="1">
+              <a:rPr lang="en-US" sz="1400" b="0" i="0" dirty="0">
                 <a:effectLst/>
               </a:rPr>
-              <a:t>Adatkezelés</a:t>
-            </a:r>
-            <a:r>
-              <a:rPr lang="en-US" sz="1100" b="0" i="0" dirty="0">
+              <a:t>Ingress controller a </a:t>
+            </a:r>
+            <a:r>
+              <a:rPr lang="en-US" sz="1400" b="0" i="0" dirty="0" err="1">
                 <a:effectLst/>
               </a:rPr>
-              <a:t>: PostgreSQL (</a:t>
-            </a:r>
-            <a:r>
-              <a:rPr lang="en-US" sz="1100" b="0" i="0" dirty="0" err="1">
-                <a:effectLst/>
-              </a:rPr>
-              <a:t>tartós</a:t>
-            </a:r>
-            <a:r>
-              <a:rPr lang="en-US" sz="1100" b="0" i="0" dirty="0">
+              <a:t>külső</a:t>
+            </a:r>
+            <a:r>
+              <a:rPr lang="en-US" sz="1400" b="0" i="0" dirty="0">
                 <a:effectLst/>
               </a:rPr>
               <a:t> </a:t>
             </a:r>
             <a:r>
-              <a:rPr lang="en-US" sz="1100" b="0" i="0" dirty="0" err="1">
+              <a:rPr lang="en-US" sz="1400" b="0" i="0" dirty="0" err="1">
                 <a:effectLst/>
               </a:rPr>
-              <a:t>adatok</a:t>
-            </a:r>
-            <a:r>
-              <a:rPr lang="en-US" sz="1100" b="0" i="0" dirty="0">
-                <a:effectLst/>
-              </a:rPr>
-              <a:t>), Redis (</a:t>
-            </a:r>
-            <a:r>
-              <a:rPr lang="en-US" sz="1100" b="0" i="0" dirty="0" err="1">
-                <a:effectLst/>
-              </a:rPr>
-              <a:t>gyorsítótár</a:t>
-            </a:r>
-            <a:r>
-              <a:rPr lang="en-US" sz="1100" b="0" i="0" dirty="0">
-                <a:effectLst/>
-              </a:rPr>
-              <a:t>, </a:t>
-            </a:r>
-            <a:r>
-              <a:rPr lang="en-US" sz="1100" b="0" i="0" dirty="0" err="1">
-                <a:effectLst/>
-              </a:rPr>
-              <a:t>valós</a:t>
-            </a:r>
-            <a:r>
-              <a:rPr lang="en-US" sz="1100" b="0" i="0" dirty="0">
+              <a:t>forgalom</a:t>
+            </a:r>
+            <a:r>
+              <a:rPr lang="en-US" sz="1400" b="0" i="0" dirty="0">
                 <a:effectLst/>
               </a:rPr>
               <a:t> </a:t>
             </a:r>
             <a:r>
-              <a:rPr lang="en-US" sz="1100" b="0" i="0" dirty="0" err="1">
+              <a:rPr lang="en-US" sz="1400" b="0" i="0" dirty="0" err="1">
                 <a:effectLst/>
               </a:rPr>
-              <a:t>idejű</a:t>
-            </a:r>
-            <a:r>
-              <a:rPr lang="en-US" sz="1100" b="0" i="0" dirty="0">
-                <a:effectLst/>
-              </a:rPr>
-              <a:t> </a:t>
-            </a:r>
-            <a:r>
-              <a:rPr lang="en-US" sz="1100" b="0" i="0" dirty="0" err="1">
-                <a:effectLst/>
-              </a:rPr>
-              <a:t>nézőszám</a:t>
-            </a:r>
-            <a:r>
-              <a:rPr lang="en-US" sz="1100" b="0" i="0" dirty="0">
-                <a:effectLst/>
-              </a:rPr>
-              <a:t>)</a:t>
-            </a:r>
+              <a:t>irányítására</a:t>
+            </a:r>
+            <a:endParaRPr lang="en-US" sz="1400" b="0" i="0" dirty="0">
+              <a:effectLst/>
+            </a:endParaRPr>
           </a:p>
           <a:p>
             <a:pPr indent="-228600">
@@ -8935,42 +8798,42 @@
               <a:buChar char="•"/>
             </a:pPr>
             <a:r>
-              <a:rPr lang="en-US" sz="1100" b="0" i="0" dirty="0">
+              <a:rPr lang="en-US" sz="1400" b="0" i="0" dirty="0">
                 <a:effectLst/>
               </a:rPr>
-              <a:t>Ingress controller a </a:t>
-            </a:r>
-            <a:r>
-              <a:rPr lang="en-US" sz="1100" b="0" i="0" dirty="0" err="1">
+              <a:t>Angular </a:t>
+            </a:r>
+            <a:r>
+              <a:rPr lang="en-US" sz="1400" b="0" i="0" dirty="0" err="1">
                 <a:effectLst/>
               </a:rPr>
-              <a:t>külső</a:t>
-            </a:r>
-            <a:r>
-              <a:rPr lang="en-US" sz="1100" b="0" i="0" dirty="0">
+              <a:t>alapú</a:t>
+            </a:r>
+            <a:r>
+              <a:rPr lang="en-US" sz="1400" b="0" i="0" dirty="0">
                 <a:effectLst/>
               </a:rPr>
               <a:t> </a:t>
             </a:r>
             <a:r>
-              <a:rPr lang="en-US" sz="1100" b="0" i="0" dirty="0" err="1">
+              <a:rPr lang="en-US" sz="1400" b="0" i="0" dirty="0" err="1">
                 <a:effectLst/>
               </a:rPr>
-              <a:t>forgalom</a:t>
-            </a:r>
-            <a:r>
-              <a:rPr lang="en-US" sz="1100" b="0" i="0" dirty="0">
+              <a:t>webalkalmazás</a:t>
+            </a:r>
+            <a:r>
+              <a:rPr lang="en-US" sz="1400" b="0" i="0" dirty="0">
                 <a:effectLst/>
               </a:rPr>
-              <a:t> </a:t>
-            </a:r>
-            <a:r>
-              <a:rPr lang="en-US" sz="1100" b="0" i="0" dirty="0" err="1">
+              <a:t>, HLS </a:t>
+            </a:r>
+            <a:r>
+              <a:rPr lang="en-US" sz="1400" b="0" i="0" dirty="0" err="1">
                 <a:effectLst/>
               </a:rPr>
-              <a:t>irányítására</a:t>
-            </a:r>
-            <a:endParaRPr lang="en-US" sz="1100" b="0" i="0" dirty="0">
+              <a:t>lejátszás</a:t>
+            </a:r>
+            <a:endParaRPr lang="en-US" sz="1400" b="0" i="0" dirty="0">
               <a:effectLst/>
             </a:endParaRPr>
           </a:p>
@@ -8986,111 +8849,48 @@
               <a:buChar char="•"/>
             </a:pPr>
             <a:r>
-              <a:rPr lang="en-US" sz="1100" b="0" i="0" dirty="0">
+              <a:rPr lang="en-US" sz="1400" b="0" i="0" dirty="0" err="1">
                 <a:effectLst/>
               </a:rPr>
-              <a:t>Frontend: Angular </a:t>
-            </a:r>
-            <a:r>
-              <a:rPr lang="en-US" sz="1100" b="0" i="0" dirty="0" err="1">
+              <a:t>Skálázható</a:t>
+            </a:r>
+            <a:r>
+              <a:rPr lang="en-US" sz="1400" b="0" i="0" dirty="0">
                 <a:effectLst/>
               </a:rPr>
-              <a:t>alapú</a:t>
-            </a:r>
-            <a:r>
-              <a:rPr lang="en-US" sz="1100" b="0" i="0" dirty="0">
+              <a:t>, </a:t>
+            </a:r>
+            <a:r>
+              <a:rPr lang="en-US" sz="1400" b="0" i="0" dirty="0" err="1">
+                <a:effectLst/>
+              </a:rPr>
+              <a:t>bővíthető</a:t>
+            </a:r>
+            <a:r>
+              <a:rPr lang="en-US" sz="1400" b="0" i="0" dirty="0">
+                <a:effectLst/>
+              </a:rPr>
+              <a:t>, </a:t>
+            </a:r>
+            <a:r>
+              <a:rPr lang="en-US" sz="1400" b="0" i="0" dirty="0" err="1">
+                <a:effectLst/>
+              </a:rPr>
+              <a:t>biztonságos</a:t>
+            </a:r>
+            <a:r>
+              <a:rPr lang="en-US" sz="1400" b="0" i="0" dirty="0">
                 <a:effectLst/>
               </a:rPr>
               <a:t> </a:t>
             </a:r>
             <a:r>
-              <a:rPr lang="en-US" sz="1100" b="0" i="0" dirty="0" err="1">
-                <a:effectLst/>
-              </a:rPr>
-              <a:t>webalkalmazás</a:t>
-            </a:r>
-            <a:r>
-              <a:rPr lang="en-US" sz="1100" b="0" i="0" dirty="0">
-                <a:effectLst/>
-              </a:rPr>
-              <a:t>, HLS </a:t>
-            </a:r>
-            <a:r>
-              <a:rPr lang="en-US" sz="1100" b="0" i="0" dirty="0" err="1">
-                <a:effectLst/>
-              </a:rPr>
-              <a:t>lejátszás</a:t>
-            </a:r>
-            <a:r>
-              <a:rPr lang="en-US" sz="1100" b="0" i="0" dirty="0">
-                <a:effectLst/>
-              </a:rPr>
-              <a:t> Shaka </a:t>
-            </a:r>
-            <a:r>
-              <a:rPr lang="en-US" sz="1100" b="0" i="0" dirty="0" err="1">
-                <a:effectLst/>
-              </a:rPr>
-              <a:t>Playerrel</a:t>
-            </a:r>
-            <a:endParaRPr lang="en-US" sz="1100" b="0" i="0" dirty="0">
-              <a:effectLst/>
-            </a:endParaRPr>
-          </a:p>
-          <a:p>
-            <a:pPr indent="-228600">
-              <a:lnSpc>
-                <a:spcPct val="110000"/>
-              </a:lnSpc>
-              <a:spcAft>
-                <a:spcPts val="600"/>
-              </a:spcAft>
-              <a:buFont typeface="Arial" panose="020B0604020202020204" pitchFamily="34" charset="0"/>
-              <a:buChar char="•"/>
-            </a:pPr>
-            <a:r>
-              <a:rPr lang="en-US" sz="1100" b="0" i="0" dirty="0" err="1">
-                <a:effectLst/>
-              </a:rPr>
-              <a:t>Skálázható</a:t>
-            </a:r>
-            <a:r>
-              <a:rPr lang="en-US" sz="1100" b="0" i="0" dirty="0">
-                <a:effectLst/>
-              </a:rPr>
-              <a:t>, </a:t>
-            </a:r>
-            <a:r>
-              <a:rPr lang="en-US" sz="1100" b="0" i="0" dirty="0" err="1">
-                <a:effectLst/>
-              </a:rPr>
-              <a:t>bővíthető</a:t>
-            </a:r>
-            <a:r>
-              <a:rPr lang="en-US" sz="1100" b="0" i="0" dirty="0">
-                <a:effectLst/>
-              </a:rPr>
-              <a:t>, </a:t>
-            </a:r>
-            <a:r>
-              <a:rPr lang="en-US" sz="1100" b="0" i="0" dirty="0" err="1">
-                <a:effectLst/>
-              </a:rPr>
-              <a:t>biztonságos</a:t>
-            </a:r>
-            <a:r>
-              <a:rPr lang="en-US" sz="1100" b="0" i="0" dirty="0">
-                <a:effectLst/>
-              </a:rPr>
-              <a:t> </a:t>
-            </a:r>
-            <a:r>
-              <a:rPr lang="en-US" sz="1100" b="0" i="0" dirty="0" err="1">
+              <a:rPr lang="en-US" sz="1400" b="0" i="0" dirty="0" err="1">
                 <a:effectLst/>
               </a:rPr>
               <a:t>rendszerfelépítés</a:t>
             </a:r>
-            <a:endParaRPr lang="en-US" sz="1100" b="0" i="0" dirty="0">
+            <a:endParaRPr lang="en-US" sz="1400" b="0" i="0" dirty="0">
               <a:effectLst/>
             </a:endParaRPr>
           </a:p>
@@ -9103,7 +8903,7 @@
                 <a:spcPts val="600"/>
               </a:spcAft>
             </a:pPr>
-            <a:endParaRPr lang="en-US" sz="1100" dirty="0"/>
+            <a:endParaRPr lang="en-US" sz="1400" dirty="0"/>
           </a:p>
         </p:txBody>
       </p:sp>
@@ -9464,6 +9264,35 @@
           </a:p>
         </p:txBody>
       </p:sp>
+      <p:sp>
+        <p:nvSpPr>
+          <p:cNvPr id="6" name="Slide Number Placeholder 5">
+            <a:extLst>
+              <a:ext uri="{FF2B5EF4-FFF2-40B4-BE49-F238E27FC236}">
+                <a16:creationId xmlns:a16="http://schemas.microsoft.com/office/drawing/2014/main" id="{4FB721FE-2F4F-B539-3AF7-D7CD40BC92D9}"/>
+              </a:ext>
+            </a:extLst>
+          </p:cNvPr>
+          <p:cNvSpPr>
+            <a:spLocks noGrp="1"/>
+          </p:cNvSpPr>
+          <p:nvPr>
+            <p:ph type="sldNum" sz="quarter" idx="12"/>
+          </p:nvPr>
+        </p:nvSpPr>
+        <p:spPr/>
+        <p:txBody>
+          <a:bodyPr/>
+          <a:lstStyle/>
+          <a:p>
+            <a:fld id="{6E91CC32-6A6B-4E2E-BBA1-6864F305DA26}" type="slidenum">
+              <a:rPr lang="en-US" smtClean="0"/>
+              <a:t>11</a:t>
+            </a:fld>
+            <a:endParaRPr lang="en-US"/>
+          </a:p>
+        </p:txBody>
+      </p:sp>
     </p:spTree>
     <p:extLst>
       <p:ext uri="{BB962C8B-B14F-4D97-AF65-F5344CB8AC3E}">
@@ -9474,13 +9303,13 @@
   <p:clrMapOvr>
     <a:masterClrMapping/>
   </p:clrMapOvr>
-  <mc:AlternateContent xmlns:mc="http://schemas.openxmlformats.org/markup-compatibility/2006">
-    <mc:Choice xmlns:p14="http://schemas.microsoft.com/office/powerpoint/2010/main" Requires="p14">
+  <mc:AlternateContent xmlns:mc="http://schemas.openxmlformats.org/markup-compatibility/2006" xmlns:p14="http://schemas.microsoft.com/office/powerpoint/2010/main">
+    <mc:Choice Requires="p14">
       <p:transition p14:dur="250">
         <p:fade/>
       </p:transition>
     </mc:Choice>
-    <mc:Fallback>
+    <mc:Fallback xmlns="">
       <p:transition>
         <p:fade/>
       </p:transition>
@@ -10332,6 +10161,35 @@
           </a:p>
         </p:txBody>
       </p:sp>
+      <p:sp>
+        <p:nvSpPr>
+          <p:cNvPr id="5" name="Slide Number Placeholder 4">
+            <a:extLst>
+              <a:ext uri="{FF2B5EF4-FFF2-40B4-BE49-F238E27FC236}">
+                <a16:creationId xmlns:a16="http://schemas.microsoft.com/office/drawing/2014/main" id="{E6643B58-8F95-3480-DCB7-B62A4086E119}"/>
+              </a:ext>
+            </a:extLst>
+          </p:cNvPr>
+          <p:cNvSpPr>
+            <a:spLocks noGrp="1"/>
+          </p:cNvSpPr>
+          <p:nvPr>
+            <p:ph type="sldNum" sz="quarter" idx="12"/>
+          </p:nvPr>
+        </p:nvSpPr>
+        <p:spPr/>
+        <p:txBody>
+          <a:bodyPr/>
+          <a:lstStyle/>
+          <a:p>
+            <a:fld id="{6E91CC32-6A6B-4E2E-BBA1-6864F305DA26}" type="slidenum">
+              <a:rPr lang="en-US" smtClean="0"/>
+              <a:t>12</a:t>
+            </a:fld>
+            <a:endParaRPr lang="en-US"/>
+          </a:p>
+        </p:txBody>
+      </p:sp>
     </p:spTree>
     <p:extLst>
       <p:ext uri="{BB962C8B-B14F-4D97-AF65-F5344CB8AC3E}">
@@ -10342,13 +10200,13 @@
   <p:clrMapOvr>
     <a:masterClrMapping/>
   </p:clrMapOvr>
-  <mc:AlternateContent xmlns:mc="http://schemas.openxmlformats.org/markup-compatibility/2006">
-    <mc:Choice xmlns:p14="http://schemas.microsoft.com/office/powerpoint/2010/main" Requires="p14">
+  <mc:AlternateContent xmlns:mc="http://schemas.openxmlformats.org/markup-compatibility/2006" xmlns:p14="http://schemas.microsoft.com/office/powerpoint/2010/main">
+    <mc:Choice Requires="p14">
       <p:transition p14:dur="250">
         <p:fade/>
       </p:transition>
     </mc:Choice>
-    <mc:Fallback>
+    <mc:Fallback xmlns="">
       <p:transition>
         <p:fade/>
       </p:transition>
@@ -10552,8 +10410,8 @@
         </p:nvSpPr>
         <p:spPr>
           <a:xfrm>
-            <a:off x="340626" y="2569464"/>
-            <a:ext cx="5487896" cy="3555491"/>
+            <a:off x="222380" y="1854412"/>
+            <a:ext cx="6876137" cy="4048018"/>
           </a:xfrm>
         </p:spPr>
         <p:txBody>
@@ -10570,11 +10428,11 @@
               <a:buChar char="•"/>
             </a:pPr>
             <a:r>
-              <a:rPr lang="hu-HU" sz="1400" b="0" i="0">
+              <a:rPr lang="hu-HU" sz="1600" b="0" i="0" dirty="0">
                 <a:effectLst/>
                 <a:latin typeface="Segoe WPC"/>
               </a:rPr>
-              <a:t>Mikroszolgáltatások közötti adat-szinkronizáció (pl. nézőszám frissítése ViewerService és StreamDbHandler között)</a:t>
+              <a:t>Mikroszolgáltatások közötti adat-szinkronizáció (pl. nézőszám frissítése)</a:t>
             </a:r>
           </a:p>
           <a:p>
@@ -10586,7 +10444,7 @@
               <a:buChar char="•"/>
             </a:pPr>
             <a:r>
-              <a:rPr lang="hu-HU" sz="1400" b="0" i="0">
+              <a:rPr lang="hu-HU" sz="1600" b="0" i="0" dirty="0">
                 <a:effectLst/>
                 <a:latin typeface="Segoe WPC"/>
               </a:rPr>
@@ -10602,11 +10460,11 @@
               <a:buChar char="•"/>
             </a:pPr>
             <a:r>
-              <a:rPr lang="hu-HU" sz="1400" b="0" i="0">
+              <a:rPr lang="hu-HU" sz="1600" b="0" i="0" dirty="0">
                 <a:effectLst/>
                 <a:latin typeface="Segoe WPC"/>
               </a:rPr>
-              <a:t>Hibakezelés a szolgáltatások közötti kommunikációban (pl. elérhetetlen komponensek, adatinkonzisztencia)</a:t>
+              <a:t>Hibakezelés a szolgáltatások közötti kommunikációban (pl. elérhetetlen komponensek)</a:t>
             </a:r>
           </a:p>
           <a:p>
@@ -10618,7 +10476,7 @@
               <a:buChar char="•"/>
             </a:pPr>
             <a:r>
-              <a:rPr lang="hu-HU" sz="1400" b="0" i="0">
+              <a:rPr lang="hu-HU" sz="1600" b="0" i="0" dirty="0">
                 <a:effectLst/>
                 <a:latin typeface="Segoe WPC"/>
               </a:rPr>
@@ -10634,11 +10492,25 @@
               <a:buChar char="•"/>
             </a:pPr>
             <a:r>
-              <a:rPr lang="hu-HU" sz="1400" b="0" i="0">
+              <a:rPr lang="en-GB" sz="1600" b="0" i="0" dirty="0" err="1">
                 <a:effectLst/>
                 <a:latin typeface="Segoe WPC"/>
               </a:rPr>
-              <a:t>Valós idejű nézőszámlálás és gyors adatfrissítés megvalósítása Redis cache segítségével</a:t>
+              <a:t>Gyors</a:t>
+            </a:r>
+            <a:r>
+              <a:rPr lang="en-GB" sz="1600" b="0" i="0" dirty="0">
+                <a:effectLst/>
+                <a:latin typeface="Segoe WPC"/>
+              </a:rPr>
+              <a:t> </a:t>
+            </a:r>
+            <a:r>
+              <a:rPr lang="hu-HU" sz="1600" b="0" i="0" dirty="0">
+                <a:effectLst/>
+                <a:latin typeface="Segoe WPC"/>
+              </a:rPr>
+              <a:t>adatfrissítés megvalósítása Redis cache segítségével</a:t>
             </a:r>
           </a:p>
           <a:p>
@@ -10650,7 +10522,7 @@
               <a:buChar char="•"/>
             </a:pPr>
             <a:r>
-              <a:rPr lang="hu-HU" sz="1400" b="0" i="0">
+              <a:rPr lang="hu-HU" sz="1600" b="0" i="0" dirty="0">
                 <a:effectLst/>
                 <a:latin typeface="Segoe WPC"/>
               </a:rPr>
@@ -10663,7 +10535,7 @@
                 <a:spcPct val="110000"/>
               </a:lnSpc>
             </a:pPr>
-            <a:endParaRPr lang="en-GB" sz="1400"/>
+            <a:endParaRPr lang="en-GB" sz="1600" dirty="0"/>
           </a:p>
         </p:txBody>
       </p:sp>
@@ -11164,6 +11036,35 @@
           </a:p>
         </p:txBody>
       </p:sp>
+      <p:sp>
+        <p:nvSpPr>
+          <p:cNvPr id="5" name="Slide Number Placeholder 4">
+            <a:extLst>
+              <a:ext uri="{FF2B5EF4-FFF2-40B4-BE49-F238E27FC236}">
+                <a16:creationId xmlns:a16="http://schemas.microsoft.com/office/drawing/2014/main" id="{6FAB253B-B986-5B97-892D-853FA5298005}"/>
+              </a:ext>
+            </a:extLst>
+          </p:cNvPr>
+          <p:cNvSpPr>
+            <a:spLocks noGrp="1"/>
+          </p:cNvSpPr>
+          <p:nvPr>
+            <p:ph type="sldNum" sz="quarter" idx="12"/>
+          </p:nvPr>
+        </p:nvSpPr>
+        <p:spPr/>
+        <p:txBody>
+          <a:bodyPr/>
+          <a:lstStyle/>
+          <a:p>
+            <a:fld id="{6E91CC32-6A6B-4E2E-BBA1-6864F305DA26}" type="slidenum">
+              <a:rPr lang="en-US" smtClean="0"/>
+              <a:t>13</a:t>
+            </a:fld>
+            <a:endParaRPr lang="en-US"/>
+          </a:p>
+        </p:txBody>
+      </p:sp>
     </p:spTree>
     <p:extLst>
       <p:ext uri="{BB962C8B-B14F-4D97-AF65-F5344CB8AC3E}">
@@ -11174,13 +11075,13 @@
   <p:clrMapOvr>
     <a:masterClrMapping/>
   </p:clrMapOvr>
-  <mc:AlternateContent xmlns:mc="http://schemas.openxmlformats.org/markup-compatibility/2006">
-    <mc:Choice xmlns:p14="http://schemas.microsoft.com/office/powerpoint/2010/main" Requires="p14">
+  <mc:AlternateContent xmlns:mc="http://schemas.openxmlformats.org/markup-compatibility/2006" xmlns:p14="http://schemas.microsoft.com/office/powerpoint/2010/main">
+    <mc:Choice Requires="p14">
       <p:transition p14:dur="250">
         <p:fade/>
       </p:transition>
     </mc:Choice>
-    <mc:Fallback>
+    <mc:Fallback xmlns="">
       <p:transition>
         <p:fade/>
       </p:transition>
@@ -11384,8 +11285,8 @@
         </p:nvSpPr>
         <p:spPr>
           <a:xfrm>
-            <a:off x="340137" y="2574488"/>
-            <a:ext cx="5062115" cy="3547872"/>
+            <a:off x="340137" y="1690123"/>
+            <a:ext cx="6816153" cy="4432237"/>
           </a:xfrm>
         </p:spPr>
         <p:txBody>
@@ -11402,7 +11303,7 @@
               <a:buChar char="•"/>
             </a:pPr>
             <a:r>
-              <a:rPr lang="hu-HU" sz="1300" b="0" i="0">
+              <a:rPr lang="hu-HU" sz="1600" b="0" i="0" dirty="0">
                 <a:effectLst/>
                 <a:latin typeface="Segoe WPC"/>
               </a:rPr>
@@ -11418,7 +11319,7 @@
               <a:buChar char="•"/>
             </a:pPr>
             <a:r>
-              <a:rPr lang="hu-HU" sz="1300" b="0" i="0">
+              <a:rPr lang="hu-HU" sz="1600" b="0" i="0" dirty="0">
                 <a:effectLst/>
                 <a:latin typeface="Segoe WPC"/>
               </a:rPr>
@@ -11434,7 +11335,7 @@
               <a:buChar char="•"/>
             </a:pPr>
             <a:r>
-              <a:rPr lang="hu-HU" sz="1300" b="0" i="0">
+              <a:rPr lang="hu-HU" sz="1600" b="0" i="0" dirty="0">
                 <a:effectLst/>
                 <a:latin typeface="Segoe WPC"/>
               </a:rPr>
@@ -11450,7 +11351,7 @@
               <a:buChar char="•"/>
             </a:pPr>
             <a:r>
-              <a:rPr lang="hu-HU" sz="1300" b="0" i="0">
+              <a:rPr lang="hu-HU" sz="1600" b="0" i="0" dirty="0">
                 <a:effectLst/>
                 <a:latin typeface="Segoe WPC"/>
               </a:rPr>
@@ -11466,7 +11367,7 @@
               <a:buChar char="•"/>
             </a:pPr>
             <a:r>
-              <a:rPr lang="hu-HU" sz="1300" b="0" i="0">
+              <a:rPr lang="hu-HU" sz="1600" b="0" i="0" dirty="0">
                 <a:effectLst/>
                 <a:latin typeface="Segoe WPC"/>
               </a:rPr>
@@ -11482,7 +11383,7 @@
               <a:buChar char="•"/>
             </a:pPr>
             <a:r>
-              <a:rPr lang="hu-HU" sz="1300" b="0" i="0">
+              <a:rPr lang="hu-HU" sz="1600" b="0" i="0" dirty="0">
                 <a:effectLst/>
                 <a:latin typeface="Segoe WPC"/>
               </a:rPr>
@@ -11498,7 +11399,7 @@
               <a:buChar char="•"/>
             </a:pPr>
             <a:r>
-              <a:rPr lang="hu-HU" sz="1300" b="0" i="0">
+              <a:rPr lang="hu-HU" sz="1600" b="0" i="0" dirty="0">
                 <a:effectLst/>
                 <a:latin typeface="Segoe WPC"/>
               </a:rPr>
@@ -11511,7 +11412,7 @@
                 <a:spcPct val="110000"/>
               </a:lnSpc>
             </a:pPr>
-            <a:endParaRPr lang="en-GB" sz="1300"/>
+            <a:endParaRPr lang="en-GB" sz="1600" dirty="0"/>
           </a:p>
         </p:txBody>
       </p:sp>
@@ -11921,6 +11822,35 @@
           </a:p>
         </p:txBody>
       </p:sp>
+      <p:sp>
+        <p:nvSpPr>
+          <p:cNvPr id="5" name="Slide Number Placeholder 4">
+            <a:extLst>
+              <a:ext uri="{FF2B5EF4-FFF2-40B4-BE49-F238E27FC236}">
+                <a16:creationId xmlns:a16="http://schemas.microsoft.com/office/drawing/2014/main" id="{772DD105-C379-23B6-6D4A-46A615236EF6}"/>
+              </a:ext>
+            </a:extLst>
+          </p:cNvPr>
+          <p:cNvSpPr>
+            <a:spLocks noGrp="1"/>
+          </p:cNvSpPr>
+          <p:nvPr>
+            <p:ph type="sldNum" sz="quarter" idx="12"/>
+          </p:nvPr>
+        </p:nvSpPr>
+        <p:spPr/>
+        <p:txBody>
+          <a:bodyPr/>
+          <a:lstStyle/>
+          <a:p>
+            <a:fld id="{6E91CC32-6A6B-4E2E-BBA1-6864F305DA26}" type="slidenum">
+              <a:rPr lang="en-US" smtClean="0"/>
+              <a:t>14</a:t>
+            </a:fld>
+            <a:endParaRPr lang="en-US"/>
+          </a:p>
+        </p:txBody>
+      </p:sp>
     </p:spTree>
     <p:extLst>
       <p:ext uri="{BB962C8B-B14F-4D97-AF65-F5344CB8AC3E}">
@@ -11931,13 +11861,13 @@
   <p:clrMapOvr>
     <a:masterClrMapping/>
   </p:clrMapOvr>
-  <mc:AlternateContent xmlns:mc="http://schemas.openxmlformats.org/markup-compatibility/2006">
-    <mc:Choice xmlns:p14="http://schemas.microsoft.com/office/powerpoint/2010/main" Requires="p14">
+  <mc:AlternateContent xmlns:mc="http://schemas.openxmlformats.org/markup-compatibility/2006" xmlns:p14="http://schemas.microsoft.com/office/powerpoint/2010/main">
+    <mc:Choice Requires="p14">
       <p:transition p14:dur="250">
         <p:fade/>
       </p:transition>
     </mc:Choice>
-    <mc:Fallback>
+    <mc:Fallback xmlns="">
       <p:transition>
         <p:fade/>
       </p:transition>
@@ -12526,6 +12456,35 @@
           </a:p>
         </p:txBody>
       </p:sp>
+      <p:sp>
+        <p:nvSpPr>
+          <p:cNvPr id="3" name="Slide Number Placeholder 2">
+            <a:extLst>
+              <a:ext uri="{FF2B5EF4-FFF2-40B4-BE49-F238E27FC236}">
+                <a16:creationId xmlns:a16="http://schemas.microsoft.com/office/drawing/2014/main" id="{6A3CAE4F-F053-6465-0FD3-93F12ED03893}"/>
+              </a:ext>
+            </a:extLst>
+          </p:cNvPr>
+          <p:cNvSpPr>
+            <a:spLocks noGrp="1"/>
+          </p:cNvSpPr>
+          <p:nvPr>
+            <p:ph type="sldNum" sz="quarter" idx="12"/>
+          </p:nvPr>
+        </p:nvSpPr>
+        <p:spPr/>
+        <p:txBody>
+          <a:bodyPr/>
+          <a:lstStyle/>
+          <a:p>
+            <a:fld id="{6E91CC32-6A6B-4E2E-BBA1-6864F305DA26}" type="slidenum">
+              <a:rPr lang="en-US" smtClean="0"/>
+              <a:t>2</a:t>
+            </a:fld>
+            <a:endParaRPr lang="en-US"/>
+          </a:p>
+        </p:txBody>
+      </p:sp>
     </p:spTree>
     <p:extLst>
       <p:ext uri="{BB962C8B-B14F-4D97-AF65-F5344CB8AC3E}">
@@ -12536,13 +12495,13 @@
   <p:clrMapOvr>
     <a:masterClrMapping/>
   </p:clrMapOvr>
-  <mc:AlternateContent xmlns:mc="http://schemas.openxmlformats.org/markup-compatibility/2006">
-    <mc:Choice xmlns:p14="http://schemas.microsoft.com/office/powerpoint/2010/main" Requires="p14">
+  <mc:AlternateContent xmlns:mc="http://schemas.openxmlformats.org/markup-compatibility/2006" xmlns:p14="http://schemas.microsoft.com/office/powerpoint/2010/main">
+    <mc:Choice Requires="p14">
       <p:transition p14:dur="250">
         <p:fade/>
       </p:transition>
     </mc:Choice>
-    <mc:Fallback>
+    <mc:Fallback xmlns="">
       <p:transition>
         <p:fade/>
       </p:transition>
@@ -13414,6 +13373,35 @@
           </a:p>
         </p:txBody>
       </p:sp>
+      <p:sp>
+        <p:nvSpPr>
+          <p:cNvPr id="6" name="Slide Number Placeholder 5">
+            <a:extLst>
+              <a:ext uri="{FF2B5EF4-FFF2-40B4-BE49-F238E27FC236}">
+                <a16:creationId xmlns:a16="http://schemas.microsoft.com/office/drawing/2014/main" id="{16BBC9F9-7F4D-0986-FDA7-35D072D4DD0B}"/>
+              </a:ext>
+            </a:extLst>
+          </p:cNvPr>
+          <p:cNvSpPr>
+            <a:spLocks noGrp="1"/>
+          </p:cNvSpPr>
+          <p:nvPr>
+            <p:ph type="sldNum" sz="quarter" idx="12"/>
+          </p:nvPr>
+        </p:nvSpPr>
+        <p:spPr/>
+        <p:txBody>
+          <a:bodyPr/>
+          <a:lstStyle/>
+          <a:p>
+            <a:fld id="{6E91CC32-6A6B-4E2E-BBA1-6864F305DA26}" type="slidenum">
+              <a:rPr lang="en-US" smtClean="0"/>
+              <a:t>3</a:t>
+            </a:fld>
+            <a:endParaRPr lang="en-US"/>
+          </a:p>
+        </p:txBody>
+      </p:sp>
     </p:spTree>
     <p:extLst>
       <p:ext uri="{BB962C8B-B14F-4D97-AF65-F5344CB8AC3E}">
@@ -13424,13 +13412,13 @@
   <p:clrMapOvr>
     <a:masterClrMapping/>
   </p:clrMapOvr>
-  <mc:AlternateContent xmlns:mc="http://schemas.openxmlformats.org/markup-compatibility/2006">
-    <mc:Choice xmlns:p14="http://schemas.microsoft.com/office/powerpoint/2010/main" Requires="p14">
+  <mc:AlternateContent xmlns:mc="http://schemas.openxmlformats.org/markup-compatibility/2006" xmlns:p14="http://schemas.microsoft.com/office/powerpoint/2010/main">
+    <mc:Choice Requires="p14">
       <p:transition p14:dur="250">
         <p:fade/>
       </p:transition>
     </mc:Choice>
-    <mc:Fallback>
+    <mc:Fallback xmlns="">
       <p:transition>
         <p:fade/>
       </p:transition>
@@ -14259,6 +14247,35 @@
           </a:p>
         </p:txBody>
       </p:sp>
+      <p:sp>
+        <p:nvSpPr>
+          <p:cNvPr id="7" name="Slide Number Placeholder 6">
+            <a:extLst>
+              <a:ext uri="{FF2B5EF4-FFF2-40B4-BE49-F238E27FC236}">
+                <a16:creationId xmlns:a16="http://schemas.microsoft.com/office/drawing/2014/main" id="{90A40EE8-E2C0-77CD-E9DA-D6B9D310C9DE}"/>
+              </a:ext>
+            </a:extLst>
+          </p:cNvPr>
+          <p:cNvSpPr>
+            <a:spLocks noGrp="1"/>
+          </p:cNvSpPr>
+          <p:nvPr>
+            <p:ph type="sldNum" sz="quarter" idx="12"/>
+          </p:nvPr>
+        </p:nvSpPr>
+        <p:spPr/>
+        <p:txBody>
+          <a:bodyPr/>
+          <a:lstStyle/>
+          <a:p>
+            <a:fld id="{6E91CC32-6A6B-4E2E-BBA1-6864F305DA26}" type="slidenum">
+              <a:rPr lang="en-US" smtClean="0"/>
+              <a:t>4</a:t>
+            </a:fld>
+            <a:endParaRPr lang="en-US"/>
+          </a:p>
+        </p:txBody>
+      </p:sp>
     </p:spTree>
     <p:extLst>
       <p:ext uri="{BB962C8B-B14F-4D97-AF65-F5344CB8AC3E}">
@@ -14269,13 +14286,13 @@
   <p:clrMapOvr>
     <a:masterClrMapping/>
   </p:clrMapOvr>
-  <mc:AlternateContent xmlns:mc="http://schemas.openxmlformats.org/markup-compatibility/2006">
-    <mc:Choice xmlns:p14="http://schemas.microsoft.com/office/powerpoint/2010/main" Requires="p14">
+  <mc:AlternateContent xmlns:mc="http://schemas.openxmlformats.org/markup-compatibility/2006" xmlns:p14="http://schemas.microsoft.com/office/powerpoint/2010/main">
+    <mc:Choice Requires="p14">
       <p:transition p14:dur="250">
         <p:fade/>
       </p:transition>
     </mc:Choice>
-    <mc:Fallback>
+    <mc:Fallback xmlns="">
       <p:transition>
         <p:fade/>
       </p:transition>
@@ -14957,6 +14974,35 @@
           </a:p>
         </p:txBody>
       </p:sp>
+      <p:sp>
+        <p:nvSpPr>
+          <p:cNvPr id="6" name="Slide Number Placeholder 5">
+            <a:extLst>
+              <a:ext uri="{FF2B5EF4-FFF2-40B4-BE49-F238E27FC236}">
+                <a16:creationId xmlns:a16="http://schemas.microsoft.com/office/drawing/2014/main" id="{F99FC27C-1CFA-F415-8EB6-97D24A31D2E1}"/>
+              </a:ext>
+            </a:extLst>
+          </p:cNvPr>
+          <p:cNvSpPr>
+            <a:spLocks noGrp="1"/>
+          </p:cNvSpPr>
+          <p:nvPr>
+            <p:ph type="sldNum" sz="quarter" idx="12"/>
+          </p:nvPr>
+        </p:nvSpPr>
+        <p:spPr/>
+        <p:txBody>
+          <a:bodyPr/>
+          <a:lstStyle/>
+          <a:p>
+            <a:fld id="{6E91CC32-6A6B-4E2E-BBA1-6864F305DA26}" type="slidenum">
+              <a:rPr lang="en-US" smtClean="0"/>
+              <a:t>5</a:t>
+            </a:fld>
+            <a:endParaRPr lang="en-US"/>
+          </a:p>
+        </p:txBody>
+      </p:sp>
     </p:spTree>
     <p:extLst>
       <p:ext uri="{BB962C8B-B14F-4D97-AF65-F5344CB8AC3E}">
@@ -14967,13 +15013,13 @@
   <p:clrMapOvr>
     <a:masterClrMapping/>
   </p:clrMapOvr>
-  <mc:AlternateContent xmlns:mc="http://schemas.openxmlformats.org/markup-compatibility/2006">
-    <mc:Choice xmlns:p14="http://schemas.microsoft.com/office/powerpoint/2010/main" Requires="p14">
+  <mc:AlternateContent xmlns:mc="http://schemas.openxmlformats.org/markup-compatibility/2006" xmlns:p14="http://schemas.microsoft.com/office/powerpoint/2010/main">
+    <mc:Choice Requires="p14">
       <p:transition p14:dur="250">
         <p:fade/>
       </p:transition>
     </mc:Choice>
-    <mc:Fallback>
+    <mc:Fallback xmlns="">
       <p:transition>
         <p:fade/>
       </p:transition>
@@ -15488,6 +15534,35 @@
           </a:p>
         </p:txBody>
       </p:sp>
+      <p:sp>
+        <p:nvSpPr>
+          <p:cNvPr id="6" name="Slide Number Placeholder 5">
+            <a:extLst>
+              <a:ext uri="{FF2B5EF4-FFF2-40B4-BE49-F238E27FC236}">
+                <a16:creationId xmlns:a16="http://schemas.microsoft.com/office/drawing/2014/main" id="{E876F3CB-FEC0-EC26-366B-EFD58AF6B859}"/>
+              </a:ext>
+            </a:extLst>
+          </p:cNvPr>
+          <p:cNvSpPr>
+            <a:spLocks noGrp="1"/>
+          </p:cNvSpPr>
+          <p:nvPr>
+            <p:ph type="sldNum" sz="quarter" idx="12"/>
+          </p:nvPr>
+        </p:nvSpPr>
+        <p:spPr/>
+        <p:txBody>
+          <a:bodyPr/>
+          <a:lstStyle/>
+          <a:p>
+            <a:fld id="{6E91CC32-6A6B-4E2E-BBA1-6864F305DA26}" type="slidenum">
+              <a:rPr lang="en-US" smtClean="0"/>
+              <a:t>6</a:t>
+            </a:fld>
+            <a:endParaRPr lang="en-US"/>
+          </a:p>
+        </p:txBody>
+      </p:sp>
     </p:spTree>
     <p:extLst>
       <p:ext uri="{BB962C8B-B14F-4D97-AF65-F5344CB8AC3E}">
@@ -15498,13 +15573,13 @@
   <p:clrMapOvr>
     <a:masterClrMapping/>
   </p:clrMapOvr>
-  <mc:AlternateContent xmlns:mc="http://schemas.openxmlformats.org/markup-compatibility/2006">
-    <mc:Choice xmlns:p14="http://schemas.microsoft.com/office/powerpoint/2010/main" Requires="p14">
+  <mc:AlternateContent xmlns:mc="http://schemas.openxmlformats.org/markup-compatibility/2006" xmlns:p14="http://schemas.microsoft.com/office/powerpoint/2010/main">
+    <mc:Choice Requires="p14">
       <p:transition p14:dur="250">
         <p:fade/>
       </p:transition>
     </mc:Choice>
-    <mc:Fallback>
+    <mc:Fallback xmlns="">
       <p:transition>
         <p:fade/>
       </p:transition>
@@ -16278,6 +16353,35 @@
           </a:p>
         </p:txBody>
       </p:sp>
+      <p:sp>
+        <p:nvSpPr>
+          <p:cNvPr id="6" name="Slide Number Placeholder 5">
+            <a:extLst>
+              <a:ext uri="{FF2B5EF4-FFF2-40B4-BE49-F238E27FC236}">
+                <a16:creationId xmlns:a16="http://schemas.microsoft.com/office/drawing/2014/main" id="{E9A70A77-2449-04FE-29AF-2B0370C6A9F2}"/>
+              </a:ext>
+            </a:extLst>
+          </p:cNvPr>
+          <p:cNvSpPr>
+            <a:spLocks noGrp="1"/>
+          </p:cNvSpPr>
+          <p:nvPr>
+            <p:ph type="sldNum" sz="quarter" idx="12"/>
+          </p:nvPr>
+        </p:nvSpPr>
+        <p:spPr/>
+        <p:txBody>
+          <a:bodyPr/>
+          <a:lstStyle/>
+          <a:p>
+            <a:fld id="{6E91CC32-6A6B-4E2E-BBA1-6864F305DA26}" type="slidenum">
+              <a:rPr lang="en-US" smtClean="0"/>
+              <a:t>7</a:t>
+            </a:fld>
+            <a:endParaRPr lang="en-US"/>
+          </a:p>
+        </p:txBody>
+      </p:sp>
     </p:spTree>
     <p:extLst>
       <p:ext uri="{BB962C8B-B14F-4D97-AF65-F5344CB8AC3E}">
@@ -16288,13 +16392,13 @@
   <p:clrMapOvr>
     <a:masterClrMapping/>
   </p:clrMapOvr>
-  <mc:AlternateContent xmlns:mc="http://schemas.openxmlformats.org/markup-compatibility/2006">
-    <mc:Choice xmlns:p14="http://schemas.microsoft.com/office/powerpoint/2010/main" Requires="p14">
+  <mc:AlternateContent xmlns:mc="http://schemas.openxmlformats.org/markup-compatibility/2006" xmlns:p14="http://schemas.microsoft.com/office/powerpoint/2010/main">
+    <mc:Choice Requires="p14">
       <p:transition p14:dur="250">
         <p:fade/>
       </p:transition>
     </mc:Choice>
-    <mc:Fallback>
+    <mc:Fallback xmlns="">
       <p:transition>
         <p:fade/>
       </p:transition>
@@ -17113,6 +17217,35 @@
           </a:p>
         </p:txBody>
       </p:sp>
+      <p:sp>
+        <p:nvSpPr>
+          <p:cNvPr id="6" name="Slide Number Placeholder 5">
+            <a:extLst>
+              <a:ext uri="{FF2B5EF4-FFF2-40B4-BE49-F238E27FC236}">
+                <a16:creationId xmlns:a16="http://schemas.microsoft.com/office/drawing/2014/main" id="{3F7D53D9-C206-266B-6EB8-E58BBE7AEE34}"/>
+              </a:ext>
+            </a:extLst>
+          </p:cNvPr>
+          <p:cNvSpPr>
+            <a:spLocks noGrp="1"/>
+          </p:cNvSpPr>
+          <p:nvPr>
+            <p:ph type="sldNum" sz="quarter" idx="12"/>
+          </p:nvPr>
+        </p:nvSpPr>
+        <p:spPr/>
+        <p:txBody>
+          <a:bodyPr/>
+          <a:lstStyle/>
+          <a:p>
+            <a:fld id="{6E91CC32-6A6B-4E2E-BBA1-6864F305DA26}" type="slidenum">
+              <a:rPr lang="en-US" smtClean="0"/>
+              <a:t>8</a:t>
+            </a:fld>
+            <a:endParaRPr lang="en-US"/>
+          </a:p>
+        </p:txBody>
+      </p:sp>
     </p:spTree>
     <p:extLst>
       <p:ext uri="{BB962C8B-B14F-4D97-AF65-F5344CB8AC3E}">
@@ -17123,13 +17256,13 @@
   <p:clrMapOvr>
     <a:masterClrMapping/>
   </p:clrMapOvr>
-  <mc:AlternateContent xmlns:mc="http://schemas.openxmlformats.org/markup-compatibility/2006">
-    <mc:Choice xmlns:p14="http://schemas.microsoft.com/office/powerpoint/2010/main" Requires="p14">
+  <mc:AlternateContent xmlns:mc="http://schemas.openxmlformats.org/markup-compatibility/2006" xmlns:p14="http://schemas.microsoft.com/office/powerpoint/2010/main">
+    <mc:Choice Requires="p14">
       <p:transition p14:dur="250">
         <p:fade/>
       </p:transition>
     </mc:Choice>
-    <mc:Fallback>
+    <mc:Fallback xmlns="">
       <p:transition>
         <p:fade/>
       </p:transition>
@@ -17657,6 +17790,35 @@
           </a:p>
         </p:txBody>
       </p:sp>
+      <p:sp>
+        <p:nvSpPr>
+          <p:cNvPr id="6" name="Slide Number Placeholder 5">
+            <a:extLst>
+              <a:ext uri="{FF2B5EF4-FFF2-40B4-BE49-F238E27FC236}">
+                <a16:creationId xmlns:a16="http://schemas.microsoft.com/office/drawing/2014/main" id="{D458BF48-C378-BAB1-3149-303449BEF9E1}"/>
+              </a:ext>
+            </a:extLst>
+          </p:cNvPr>
+          <p:cNvSpPr>
+            <a:spLocks noGrp="1"/>
+          </p:cNvSpPr>
+          <p:nvPr>
+            <p:ph type="sldNum" sz="quarter" idx="12"/>
+          </p:nvPr>
+        </p:nvSpPr>
+        <p:spPr/>
+        <p:txBody>
+          <a:bodyPr/>
+          <a:lstStyle/>
+          <a:p>
+            <a:fld id="{6E91CC32-6A6B-4E2E-BBA1-6864F305DA26}" type="slidenum">
+              <a:rPr lang="en-US" smtClean="0"/>
+              <a:t>9</a:t>
+            </a:fld>
+            <a:endParaRPr lang="en-US"/>
+          </a:p>
+        </p:txBody>
+      </p:sp>
     </p:spTree>
     <p:extLst>
       <p:ext uri="{BB962C8B-B14F-4D97-AF65-F5344CB8AC3E}">
@@ -17667,13 +17829,13 @@
   <p:clrMapOvr>
     <a:masterClrMapping/>
   </p:clrMapOvr>
-  <mc:AlternateContent xmlns:mc="http://schemas.openxmlformats.org/markup-compatibility/2006">
-    <mc:Choice xmlns:p14="http://schemas.microsoft.com/office/powerpoint/2010/main" Requires="p14">
+  <mc:AlternateContent xmlns:mc="http://schemas.openxmlformats.org/markup-compatibility/2006" xmlns:p14="http://schemas.microsoft.com/office/powerpoint/2010/main">
+    <mc:Choice Requires="p14">
       <p:transition p14:dur="250">
         <p:fade/>
       </p:transition>
     </mc:Choice>
-    <mc:Fallback>
+    <mc:Fallback xmlns="">
       <p:transition>
         <p:fade/>
       </p:transition>

</xml_diff>

<commit_message>
fix: Update live streaming service presentation
</commit_message>
<xml_diff>
--- a/Documents/live-streaming-service-presentation.pptx
+++ b/Documents/live-streaming-service-presentation.pptx
@@ -1,6 +1,6 @@
 
 <file path=ppt/presentation.xml><?xml version="1.0" encoding="utf-8"?>
-<p:presentation xmlns:a="http://schemas.openxmlformats.org/drawingml/2006/main" xmlns:r="http://schemas.openxmlformats.org/officeDocument/2006/relationships" xmlns:p="http://schemas.openxmlformats.org/presentationml/2006/main" saveSubsetFonts="1">
+<p:presentation xmlns:a="http://schemas.openxmlformats.org/drawingml/2006/main" xmlns:r="http://schemas.openxmlformats.org/officeDocument/2006/relationships" xmlns:p="http://schemas.openxmlformats.org/presentationml/2006/main" embedTrueTypeFonts="1" saveSubsetFonts="1">
   <p:sldMasterIdLst>
     <p:sldMasterId id="2147483738" r:id="rId1"/>
   </p:sldMasterIdLst>
@@ -25,6 +25,13 @@
   </p:sldIdLst>
   <p:sldSz cx="12192000" cy="6858000"/>
   <p:notesSz cx="6858000" cy="9144000"/>
+  <p:embeddedFontLst>
+    <p:embeddedFont>
+      <p:font typeface="Neue Haas Grotesk Text Pro" panose="020B0504020202020204" pitchFamily="34" charset="0"/>
+      <p:regular r:id="rId17"/>
+      <p:bold r:id="rId18"/>
+    </p:embeddedFont>
+  </p:embeddedFontLst>
   <p:defaultTextStyle>
     <a:defPPr>
       <a:defRPr lang="en-US"/>
@@ -1069,9 +1076,18 @@
         <a:lstStyle/>
         <a:p>
           <a:r>
-            <a:rPr lang="en-US"/>
-            <a:t>Komplex Rendszerek</a:t>
+            <a:rPr lang="en-US" dirty="0" err="1"/>
+            <a:t>Komplex</a:t>
           </a:r>
+          <a:r>
+            <a:rPr lang="en-US" dirty="0"/>
+            <a:t> </a:t>
+          </a:r>
+          <a:r>
+            <a:rPr lang="en-US" dirty="0" err="1"/>
+            <a:t>Rendszerek</a:t>
+          </a:r>
+          <a:endParaRPr lang="en-US" dirty="0"/>
         </a:p>
       </dgm:t>
     </dgm:pt>
@@ -1105,9 +1121,18 @@
         <a:lstStyle/>
         <a:p>
           <a:r>
-            <a:rPr lang="en-US"/>
-            <a:t>Hullámzó erőforrásigény</a:t>
+            <a:rPr lang="en-US" dirty="0" err="1"/>
+            <a:t>Hullámzó</a:t>
           </a:r>
+          <a:r>
+            <a:rPr lang="en-US" dirty="0"/>
+            <a:t> </a:t>
+          </a:r>
+          <a:r>
+            <a:rPr lang="en-US" dirty="0" err="1"/>
+            <a:t>erőforrásigény</a:t>
+          </a:r>
+          <a:endParaRPr lang="en-US" dirty="0"/>
         </a:p>
       </dgm:t>
     </dgm:pt>
@@ -1517,9 +1542,18 @@
             <a:buNone/>
           </a:pPr>
           <a:r>
-            <a:rPr lang="en-US" sz="2800" kern="1200"/>
-            <a:t>Komplex Rendszerek</a:t>
+            <a:rPr lang="en-US" sz="2800" kern="1200" dirty="0" err="1"/>
+            <a:t>Komplex</a:t>
           </a:r>
+          <a:r>
+            <a:rPr lang="en-US" sz="2800" kern="1200" dirty="0"/>
+            <a:t> </a:t>
+          </a:r>
+          <a:r>
+            <a:rPr lang="en-US" sz="2800" kern="1200" dirty="0" err="1"/>
+            <a:t>Rendszerek</a:t>
+          </a:r>
+          <a:endParaRPr lang="en-US" sz="2800" kern="1200" dirty="0"/>
         </a:p>
       </dsp:txBody>
       <dsp:txXfrm>
@@ -1644,9 +1678,18 @@
             <a:buNone/>
           </a:pPr>
           <a:r>
-            <a:rPr lang="en-US" sz="2800" kern="1200"/>
-            <a:t>Hullámzó erőforrásigény</a:t>
+            <a:rPr lang="en-US" sz="2800" kern="1200" dirty="0" err="1"/>
+            <a:t>Hullámzó</a:t>
           </a:r>
+          <a:r>
+            <a:rPr lang="en-US" sz="2800" kern="1200" dirty="0"/>
+            <a:t> </a:t>
+          </a:r>
+          <a:r>
+            <a:rPr lang="en-US" sz="2800" kern="1200" dirty="0" err="1"/>
+            <a:t>erőforrásigény</a:t>
+          </a:r>
+          <a:endParaRPr lang="en-US" sz="2800" kern="1200" dirty="0"/>
         </a:p>
       </dsp:txBody>
       <dsp:txXfrm>
@@ -7637,7 +7680,7 @@
         </p:spPr>
         <p:txBody>
           <a:bodyPr anchor="b">
-            <a:normAutofit/>
+            <a:normAutofit fontScale="92500"/>
           </a:bodyPr>
           <a:lstStyle/>
           <a:p>
@@ -7651,7 +7694,6 @@
             <a:r>
               <a:rPr lang="hu-HU" b="0" i="0" dirty="0">
                 <a:effectLst/>
-                <a:latin typeface="Segoe WPC"/>
               </a:rPr>
               <a:t>Felhasználói regisztráció és bejelentkezés (JWT alapú hitelesítés)</a:t>
             </a:r>
@@ -7667,7 +7709,6 @@
             <a:r>
               <a:rPr lang="hu-HU" b="0" i="0" dirty="0">
                 <a:effectLst/>
-                <a:latin typeface="Segoe WPC"/>
               </a:rPr>
               <a:t>Élő stream indítása egyedi stream kulccsal</a:t>
             </a:r>
@@ -7683,7 +7724,6 @@
             <a:r>
               <a:rPr lang="hu-HU" b="0" i="0" dirty="0">
                 <a:effectLst/>
-                <a:latin typeface="Segoe WPC"/>
               </a:rPr>
               <a:t>Streamek böngészése, nézése valós idejű nézőszámlálással</a:t>
             </a:r>
@@ -7699,7 +7739,6 @@
             <a:r>
               <a:rPr lang="hu-HU" b="0" i="0" dirty="0">
                 <a:effectLst/>
-                <a:latin typeface="Segoe WPC"/>
               </a:rPr>
               <a:t>Stream ajánlások (népszerűség, követések alapján)</a:t>
             </a:r>
@@ -7715,7 +7754,6 @@
             <a:r>
               <a:rPr lang="hu-HU" b="0" i="0" dirty="0">
                 <a:effectLst/>
-                <a:latin typeface="Segoe WPC"/>
               </a:rPr>
               <a:t>Követés funkció (streamerek követése, élő státusz megjelenítése)</a:t>
             </a:r>
@@ -8517,7 +8555,7 @@
         </p:spPr>
         <p:txBody>
           <a:bodyPr vert="horz" lIns="91440" tIns="45720" rIns="91440" bIns="45720" rtlCol="0" anchor="b">
-            <a:normAutofit/>
+            <a:normAutofit lnSpcReduction="10000"/>
           </a:bodyPr>
           <a:lstStyle/>
           <a:p>
@@ -8532,48 +8570,48 @@
               <a:buChar char="•"/>
             </a:pPr>
             <a:r>
-              <a:rPr lang="en-US" sz="1400" b="0" i="0" dirty="0" err="1">
+              <a:rPr lang="en-US" sz="1600" b="0" i="0" dirty="0" err="1">
                 <a:effectLst/>
               </a:rPr>
               <a:t>Mikroszolgáltatás-alapú</a:t>
             </a:r>
             <a:r>
-              <a:rPr lang="en-US" sz="1400" b="0" i="0" dirty="0">
+              <a:rPr lang="en-US" sz="1600" b="0" i="0" dirty="0">
                 <a:effectLst/>
               </a:rPr>
               <a:t> backend </a:t>
             </a:r>
             <a:br>
-              <a:rPr lang="en-US" sz="1400" b="0" i="0" dirty="0">
+              <a:rPr lang="en-US" sz="1600" b="0" i="0" dirty="0">
                 <a:effectLst/>
               </a:rPr>
             </a:br>
             <a:r>
-              <a:rPr lang="en-US" sz="1400" b="0" i="0" dirty="0">
+              <a:rPr lang="en-US" sz="1600" b="0" i="0" dirty="0">
                 <a:effectLst/>
               </a:rPr>
               <a:t>     (</a:t>
             </a:r>
             <a:r>
-              <a:rPr lang="en-US" sz="1400" b="0" i="0" dirty="0" err="1">
+              <a:rPr lang="en-US" sz="1600" b="0" i="0" dirty="0" err="1">
                 <a:effectLst/>
               </a:rPr>
               <a:t>különálló</a:t>
             </a:r>
             <a:r>
-              <a:rPr lang="en-US" sz="1400" b="0" i="0" dirty="0">
+              <a:rPr lang="en-US" sz="1600" b="0" i="0" dirty="0">
                 <a:effectLst/>
               </a:rPr>
               <a:t> </a:t>
             </a:r>
             <a:r>
-              <a:rPr lang="en-US" sz="1400" b="0" i="0" dirty="0" err="1">
+              <a:rPr lang="en-US" sz="1600" b="0" i="0" dirty="0" err="1">
                 <a:effectLst/>
               </a:rPr>
               <a:t>szolgáltatások</a:t>
             </a:r>
             <a:r>
-              <a:rPr lang="en-US" sz="1400" b="0" i="0" dirty="0">
+              <a:rPr lang="en-US" sz="1600" b="0" i="0" dirty="0">
                 <a:effectLst/>
               </a:rPr>
               <a:t>)</a:t>
@@ -8591,42 +8629,42 @@
               <a:buChar char="•"/>
             </a:pPr>
             <a:r>
-              <a:rPr lang="en-US" sz="1400" b="0" i="0" dirty="0">
+              <a:rPr lang="en-US" sz="1600" b="0" i="0" dirty="0">
                 <a:effectLst/>
               </a:rPr>
               <a:t>REST API </a:t>
             </a:r>
             <a:r>
-              <a:rPr lang="en-US" sz="1400" b="0" i="0" dirty="0" err="1">
+              <a:rPr lang="en-US" sz="1600" b="0" i="0" dirty="0" err="1">
                 <a:effectLst/>
               </a:rPr>
               <a:t>hívások</a:t>
             </a:r>
             <a:r>
-              <a:rPr lang="en-US" sz="1400" b="0" i="0" dirty="0">
+              <a:rPr lang="en-US" sz="1600" b="0" i="0" dirty="0">
                 <a:effectLst/>
               </a:rPr>
               <a:t> </a:t>
             </a:r>
             <a:r>
-              <a:rPr lang="en-US" sz="1400" b="0" i="0" dirty="0" err="1">
+              <a:rPr lang="en-US" sz="1600" b="0" i="0" dirty="0" err="1">
                 <a:effectLst/>
               </a:rPr>
               <a:t>komponensek</a:t>
             </a:r>
             <a:r>
-              <a:rPr lang="en-US" sz="1400" b="0" i="0" dirty="0">
+              <a:rPr lang="en-US" sz="1600" b="0" i="0" dirty="0">
                 <a:effectLst/>
               </a:rPr>
               <a:t> </a:t>
             </a:r>
             <a:r>
-              <a:rPr lang="en-US" sz="1400" b="0" i="0" dirty="0" err="1">
+              <a:rPr lang="en-US" sz="1600" b="0" i="0" dirty="0" err="1">
                 <a:effectLst/>
               </a:rPr>
               <a:t>között</a:t>
             </a:r>
-            <a:endParaRPr lang="en-US" sz="1400" b="0" i="0" dirty="0">
+            <a:endParaRPr lang="en-US" sz="1600" b="0" i="0" dirty="0">
               <a:effectLst/>
             </a:endParaRPr>
           </a:p>
@@ -8642,42 +8680,78 @@
               <a:buChar char="•"/>
             </a:pPr>
             <a:r>
-              <a:rPr lang="en-US" sz="1400" b="0" i="0" dirty="0">
+              <a:rPr lang="en-US" sz="1600" b="0" i="0" dirty="0">
                 <a:effectLst/>
               </a:rPr>
               <a:t>Streaming </a:t>
             </a:r>
             <a:r>
-              <a:rPr lang="en-US" sz="1400" b="0" i="0" dirty="0" err="1">
+              <a:rPr lang="en-US" sz="1600" b="0" i="0" dirty="0" err="1">
                 <a:effectLst/>
               </a:rPr>
               <a:t>szerver</a:t>
             </a:r>
             <a:r>
-              <a:rPr lang="en-US" sz="1400" b="0" i="0" dirty="0">
+              <a:rPr lang="en-US" sz="1600" b="0" i="0" dirty="0">
                 <a:effectLst/>
               </a:rPr>
-              <a:t>: RTMP </a:t>
-            </a:r>
-            <a:r>
-              <a:rPr lang="en-US" sz="1400" b="0" i="0" dirty="0" err="1">
+              <a:t>: </a:t>
+            </a:r>
+          </a:p>
+          <a:p>
+            <a:pPr lvl="1" indent="-228600">
+              <a:lnSpc>
+                <a:spcPct val="110000"/>
+              </a:lnSpc>
+              <a:spcAft>
+                <a:spcPts val="600"/>
+              </a:spcAft>
+              <a:buFont typeface="Arial" panose="020B0604020202020204" pitchFamily="34" charset="0"/>
+              <a:buChar char="•"/>
+            </a:pPr>
+            <a:r>
+              <a:rPr lang="en-US" sz="1600" b="0" i="0" dirty="0">
+                <a:effectLst/>
+              </a:rPr>
+              <a:t>RTMP </a:t>
+            </a:r>
+            <a:r>
+              <a:rPr lang="en-US" sz="1600" b="0" i="0" dirty="0" err="1">
                 <a:effectLst/>
               </a:rPr>
               <a:t>fogadás</a:t>
             </a:r>
             <a:r>
-              <a:rPr lang="en-US" sz="1400" b="0" i="0" dirty="0">
+              <a:rPr lang="en-US" sz="1600" b="0" i="0" dirty="0">
                 <a:effectLst/>
               </a:rPr>
-              <a:t>, HLS </a:t>
-            </a:r>
-            <a:r>
-              <a:rPr lang="en-US" sz="1400" b="0" i="0" dirty="0" err="1">
+              <a:t>, </a:t>
+            </a:r>
+          </a:p>
+          <a:p>
+            <a:pPr lvl="1" indent="-228600">
+              <a:lnSpc>
+                <a:spcPct val="110000"/>
+              </a:lnSpc>
+              <a:spcAft>
+                <a:spcPts val="600"/>
+              </a:spcAft>
+              <a:buFont typeface="Arial" panose="020B0604020202020204" pitchFamily="34" charset="0"/>
+              <a:buChar char="•"/>
+            </a:pPr>
+            <a:r>
+              <a:rPr lang="en-US" sz="1600" b="0" i="0" dirty="0">
+                <a:effectLst/>
+              </a:rPr>
+              <a:t>HLS </a:t>
+            </a:r>
+            <a:r>
+              <a:rPr lang="en-US" sz="1600" b="0" i="0" dirty="0" err="1">
                 <a:effectLst/>
               </a:rPr>
               <a:t>továbbítás</a:t>
             </a:r>
-            <a:endParaRPr lang="en-US" sz="1400" b="0" i="0" dirty="0">
+            <a:endParaRPr lang="en-US" sz="1600" b="0" i="0" dirty="0">
               <a:effectLst/>
             </a:endParaRPr>
           </a:p>
@@ -8693,43 +8767,43 @@
               <a:buChar char="•"/>
             </a:pPr>
             <a:r>
-              <a:rPr lang="en-US" sz="1400" b="0" i="0" dirty="0">
+              <a:rPr lang="en-US" sz="1600" b="0" i="0" dirty="0">
                 <a:effectLst/>
               </a:rPr>
               <a:t>PostgreSQL (</a:t>
             </a:r>
             <a:r>
-              <a:rPr lang="en-US" sz="1400" b="0" i="0" dirty="0" err="1">
+              <a:rPr lang="en-US" sz="1600" b="0" i="0" dirty="0" err="1">
                 <a:effectLst/>
               </a:rPr>
               <a:t>tartós</a:t>
             </a:r>
             <a:r>
-              <a:rPr lang="en-US" sz="1400" b="0" i="0" dirty="0">
+              <a:rPr lang="en-US" sz="1600" b="0" i="0" dirty="0">
                 <a:effectLst/>
               </a:rPr>
               <a:t> </a:t>
             </a:r>
             <a:r>
-              <a:rPr lang="en-US" sz="1400" b="0" i="0" dirty="0" err="1">
+              <a:rPr lang="en-US" sz="1600" b="0" i="0" dirty="0" err="1">
                 <a:effectLst/>
               </a:rPr>
               <a:t>adatok</a:t>
             </a:r>
             <a:r>
-              <a:rPr lang="en-US" sz="1400" b="0" i="0" dirty="0">
+              <a:rPr lang="en-US" sz="1600" b="0" i="0" dirty="0">
                 <a:effectLst/>
               </a:rPr>
               <a:t>), Redis (</a:t>
             </a:r>
             <a:r>
-              <a:rPr lang="en-US" sz="1400" b="0" i="0" dirty="0" err="1">
+              <a:rPr lang="en-US" sz="1600" b="0" i="0" dirty="0" err="1">
                 <a:effectLst/>
               </a:rPr>
               <a:t>gyorsítótár</a:t>
             </a:r>
             <a:r>
-              <a:rPr lang="en-US" sz="1400" b="0" i="0" dirty="0">
+              <a:rPr lang="en-US" sz="1600" b="0" i="0" dirty="0">
                 <a:effectLst/>
               </a:rPr>
               <a:t>)</a:t>
@@ -8747,42 +8821,42 @@
               <a:buChar char="•"/>
             </a:pPr>
             <a:r>
-              <a:rPr lang="en-US" sz="1400" b="0" i="0" dirty="0">
+              <a:rPr lang="en-US" sz="1600" b="0" i="0" dirty="0">
                 <a:effectLst/>
               </a:rPr>
               <a:t>Ingress controller a </a:t>
             </a:r>
             <a:r>
-              <a:rPr lang="en-US" sz="1400" b="0" i="0" dirty="0" err="1">
+              <a:rPr lang="en-US" sz="1600" b="0" i="0" dirty="0" err="1">
                 <a:effectLst/>
               </a:rPr>
               <a:t>külső</a:t>
             </a:r>
             <a:r>
-              <a:rPr lang="en-US" sz="1400" b="0" i="0" dirty="0">
+              <a:rPr lang="en-US" sz="1600" b="0" i="0" dirty="0">
                 <a:effectLst/>
               </a:rPr>
               <a:t> </a:t>
             </a:r>
             <a:r>
-              <a:rPr lang="en-US" sz="1400" b="0" i="0" dirty="0" err="1">
+              <a:rPr lang="en-US" sz="1600" b="0" i="0" dirty="0" err="1">
                 <a:effectLst/>
               </a:rPr>
               <a:t>forgalom</a:t>
             </a:r>
             <a:r>
-              <a:rPr lang="en-US" sz="1400" b="0" i="0" dirty="0">
+              <a:rPr lang="en-US" sz="1600" b="0" i="0" dirty="0">
                 <a:effectLst/>
               </a:rPr>
               <a:t> </a:t>
             </a:r>
             <a:r>
-              <a:rPr lang="en-US" sz="1400" b="0" i="0" dirty="0" err="1">
+              <a:rPr lang="en-US" sz="1600" b="0" i="0" dirty="0" err="1">
                 <a:effectLst/>
               </a:rPr>
               <a:t>irányítására</a:t>
             </a:r>
-            <a:endParaRPr lang="en-US" sz="1400" b="0" i="0" dirty="0">
+            <a:endParaRPr lang="en-US" sz="1600" b="0" i="0" dirty="0">
               <a:effectLst/>
             </a:endParaRPr>
           </a:p>
@@ -8798,42 +8872,42 @@
               <a:buChar char="•"/>
             </a:pPr>
             <a:r>
-              <a:rPr lang="en-US" sz="1400" b="0" i="0" dirty="0">
+              <a:rPr lang="en-US" sz="1600" b="0" i="0" dirty="0">
                 <a:effectLst/>
               </a:rPr>
               <a:t>Angular </a:t>
             </a:r>
             <a:r>
-              <a:rPr lang="en-US" sz="1400" b="0" i="0" dirty="0" err="1">
+              <a:rPr lang="en-US" sz="1600" b="0" i="0" dirty="0" err="1">
                 <a:effectLst/>
               </a:rPr>
               <a:t>alapú</a:t>
             </a:r>
             <a:r>
-              <a:rPr lang="en-US" sz="1400" b="0" i="0" dirty="0">
+              <a:rPr lang="en-US" sz="1600" b="0" i="0" dirty="0">
                 <a:effectLst/>
               </a:rPr>
               <a:t> </a:t>
             </a:r>
             <a:r>
-              <a:rPr lang="en-US" sz="1400" b="0" i="0" dirty="0" err="1">
+              <a:rPr lang="en-US" sz="1600" b="0" i="0" dirty="0" err="1">
                 <a:effectLst/>
               </a:rPr>
               <a:t>webalkalmazás</a:t>
             </a:r>
             <a:r>
-              <a:rPr lang="en-US" sz="1400" b="0" i="0" dirty="0">
+              <a:rPr lang="en-US" sz="1600" b="0" i="0" dirty="0">
                 <a:effectLst/>
               </a:rPr>
               <a:t>, HLS </a:t>
             </a:r>
             <a:r>
-              <a:rPr lang="en-US" sz="1400" b="0" i="0" dirty="0" err="1">
+              <a:rPr lang="en-US" sz="1600" b="0" i="0" dirty="0" err="1">
                 <a:effectLst/>
               </a:rPr>
               <a:t>lejátszás</a:t>
             </a:r>
-            <a:endParaRPr lang="en-US" sz="1400" b="0" i="0" dirty="0">
+            <a:endParaRPr lang="en-US" sz="1600" b="0" i="0" dirty="0">
               <a:effectLst/>
             </a:endParaRPr>
           </a:p>
@@ -8849,48 +8923,53 @@
               <a:buChar char="•"/>
             </a:pPr>
             <a:r>
-              <a:rPr lang="en-US" sz="1400" b="0" i="0" dirty="0" err="1">
+              <a:rPr lang="en-US" sz="1600" b="0" i="0" dirty="0" err="1">
                 <a:effectLst/>
               </a:rPr>
               <a:t>Skálázható</a:t>
             </a:r>
             <a:r>
-              <a:rPr lang="en-US" sz="1400" b="0" i="0" dirty="0">
+              <a:rPr lang="en-US" sz="1600" b="0" i="0" dirty="0">
                 <a:effectLst/>
               </a:rPr>
               <a:t>, </a:t>
             </a:r>
             <a:r>
-              <a:rPr lang="en-US" sz="1400" b="0" i="0" dirty="0" err="1">
+              <a:rPr lang="en-US" sz="1600" b="0" i="0" dirty="0" err="1">
                 <a:effectLst/>
               </a:rPr>
               <a:t>bővíthető</a:t>
             </a:r>
             <a:r>
-              <a:rPr lang="en-US" sz="1400" b="0" i="0" dirty="0">
+              <a:rPr lang="en-US" sz="1600" b="0" i="0" dirty="0">
                 <a:effectLst/>
               </a:rPr>
               <a:t>, </a:t>
             </a:r>
             <a:r>
-              <a:rPr lang="en-US" sz="1400" b="0" i="0" dirty="0" err="1">
+              <a:rPr lang="en-US" sz="1600" b="0" i="0" dirty="0" err="1">
                 <a:effectLst/>
               </a:rPr>
               <a:t>biztonságos</a:t>
             </a:r>
-            <a:r>
-              <a:rPr lang="en-US" sz="1400" b="0" i="0" dirty="0">
+            <a:br>
+              <a:rPr lang="en-US" sz="1600" b="0" i="0" dirty="0">
                 <a:effectLst/>
               </a:rPr>
-              <a:t> </a:t>
-            </a:r>
-            <a:r>
-              <a:rPr lang="en-US" sz="1400" b="0" i="0" dirty="0" err="1">
+            </a:br>
+            <a:r>
+              <a:rPr lang="en-US" sz="1600" b="0" i="0" dirty="0">
+                <a:effectLst/>
+              </a:rPr>
+              <a:t>     </a:t>
+            </a:r>
+            <a:r>
+              <a:rPr lang="en-US" sz="1600" b="0" i="0" dirty="0" err="1">
                 <a:effectLst/>
               </a:rPr>
               <a:t>rendszerfelépítés</a:t>
             </a:r>
-            <a:endParaRPr lang="en-US" sz="1400" b="0" i="0" dirty="0">
+            <a:endParaRPr lang="en-US" sz="1600" b="0" i="0" dirty="0">
               <a:effectLst/>
             </a:endParaRPr>
           </a:p>
@@ -8903,7 +8982,7 @@
                 <a:spcPts val="600"/>
               </a:spcAft>
             </a:pPr>
-            <a:endParaRPr lang="en-US" sz="1400" dirty="0"/>
+            <a:endParaRPr lang="en-US" sz="1600" dirty="0"/>
           </a:p>
         </p:txBody>
       </p:sp>
@@ -10410,8 +10489,8 @@
         </p:nvSpPr>
         <p:spPr>
           <a:xfrm>
-            <a:off x="222380" y="1854412"/>
-            <a:ext cx="6876137" cy="4048018"/>
+            <a:off x="20828" y="1841411"/>
+            <a:ext cx="7274833" cy="4048018"/>
           </a:xfrm>
         </p:spPr>
         <p:txBody>
@@ -10430,9 +10509,19 @@
             <a:r>
               <a:rPr lang="hu-HU" sz="1600" b="0" i="0" dirty="0">
                 <a:effectLst/>
-                <a:latin typeface="Segoe WPC"/>
               </a:rPr>
-              <a:t>Mikroszolgáltatások közötti adat-szinkronizáció (pl. nézőszám frissítése)</a:t>
+              <a:t>Mikroszolgáltatások közötti adat-szinkronizáció </a:t>
+            </a:r>
+            <a:br>
+              <a:rPr lang="en-GB" sz="1600" b="0" i="0" dirty="0">
+                <a:effectLst/>
+              </a:rPr>
+            </a:br>
+            <a:r>
+              <a:rPr lang="hu-HU" sz="1600" b="0" i="0" dirty="0">
+                <a:effectLst/>
+              </a:rPr>
+              <a:t>(pl. nézőszám frissítése)</a:t>
             </a:r>
           </a:p>
           <a:p>
@@ -10446,9 +10535,19 @@
             <a:r>
               <a:rPr lang="hu-HU" sz="1600" b="0" i="0" dirty="0">
                 <a:effectLst/>
-                <a:latin typeface="Segoe WPC"/>
               </a:rPr>
-              <a:t>Streaming szerver (Nginx-RTMP) és backend szolgáltatások integrációja (webhookok, API hívások)</a:t>
+              <a:t>Streaming szerver (Nginx-RTMP) és backend </a:t>
+            </a:r>
+            <a:br>
+              <a:rPr lang="en-GB" sz="1600" b="0" i="0" dirty="0">
+                <a:effectLst/>
+              </a:rPr>
+            </a:br>
+            <a:r>
+              <a:rPr lang="hu-HU" sz="1600" b="0" i="0" dirty="0">
+                <a:effectLst/>
+              </a:rPr>
+              <a:t>szolgáltatások integrációja (webhookok, API hívások)</a:t>
             </a:r>
           </a:p>
           <a:p>
@@ -10462,9 +10561,19 @@
             <a:r>
               <a:rPr lang="hu-HU" sz="1600" b="0" i="0" dirty="0">
                 <a:effectLst/>
-                <a:latin typeface="Segoe WPC"/>
               </a:rPr>
-              <a:t>Hibakezelés a szolgáltatások közötti kommunikációban (pl. elérhetetlen komponensek)</a:t>
+              <a:t>Hibakezelés a szolgáltatások közötti kommunikációban </a:t>
+            </a:r>
+            <a:br>
+              <a:rPr lang="en-GB" sz="1600" b="0" i="0" dirty="0">
+                <a:effectLst/>
+              </a:rPr>
+            </a:br>
+            <a:r>
+              <a:rPr lang="hu-HU" sz="1600" b="0" i="0" dirty="0">
+                <a:effectLst/>
+              </a:rPr>
+              <a:t>(pl. elérhetetlen komponensek)</a:t>
             </a:r>
           </a:p>
           <a:p>
@@ -10478,7 +10587,6 @@
             <a:r>
               <a:rPr lang="hu-HU" sz="1600" b="0" i="0" dirty="0">
                 <a:effectLst/>
-                <a:latin typeface="Segoe WPC"/>
               </a:rPr>
               <a:t>JWT tokenek érvényességének egységes ellenőrzése minden szolgáltatásban (közös token handler fejlesztése)</a:t>
             </a:r>
@@ -10494,21 +10602,18 @@
             <a:r>
               <a:rPr lang="en-GB" sz="1600" b="0" i="0" dirty="0" err="1">
                 <a:effectLst/>
-                <a:latin typeface="Segoe WPC"/>
               </a:rPr>
               <a:t>Gyors</a:t>
             </a:r>
             <a:r>
               <a:rPr lang="en-GB" sz="1600" b="0" i="0" dirty="0">
                 <a:effectLst/>
-                <a:latin typeface="Segoe WPC"/>
               </a:rPr>
               <a:t> </a:t>
             </a:r>
             <a:r>
               <a:rPr lang="hu-HU" sz="1600" b="0" i="0" dirty="0">
                 <a:effectLst/>
-                <a:latin typeface="Segoe WPC"/>
               </a:rPr>
               <a:t>adatfrissítés megvalósítása Redis cache segítségével</a:t>
             </a:r>
@@ -10524,9 +10629,19 @@
             <a:r>
               <a:rPr lang="hu-HU" sz="1600" b="0" i="0" dirty="0">
                 <a:effectLst/>
-                <a:latin typeface="Segoe WPC"/>
               </a:rPr>
-              <a:t>Fejlesztői környezet (Docker, Kubernetes, VS Code) helyes beállítása és használata</a:t>
+              <a:t>Fejlesztői környezet (Docker, Kubernetes, VS Code) </a:t>
+            </a:r>
+            <a:br>
+              <a:rPr lang="en-GB" sz="1600" b="0" i="0" dirty="0">
+                <a:effectLst/>
+              </a:rPr>
+            </a:br>
+            <a:r>
+              <a:rPr lang="hu-HU" sz="1600" b="0" i="0" dirty="0">
+                <a:effectLst/>
+              </a:rPr>
+              <a:t>helyes beállítása és használata</a:t>
             </a:r>
           </a:p>
           <a:p>
@@ -11305,7 +11420,6 @@
             <a:r>
               <a:rPr lang="hu-HU" sz="1600" b="0" i="0" dirty="0">
                 <a:effectLst/>
-                <a:latin typeface="Segoe WPC"/>
               </a:rPr>
               <a:t>Modern, mikroszolgáltatás-alapú streaming platform fejlesztése Kubernetes környezetben</a:t>
             </a:r>
@@ -11321,7 +11435,6 @@
             <a:r>
               <a:rPr lang="hu-HU" sz="1600" b="0" i="0" dirty="0">
                 <a:effectLst/>
-                <a:latin typeface="Segoe WPC"/>
               </a:rPr>
               <a:t>Fő funkciók: élő közvetítés, nézőszámlálás, felhasználó- és követéskezelés, ajánlórendszer</a:t>
             </a:r>
@@ -11337,7 +11450,6 @@
             <a:r>
               <a:rPr lang="hu-HU" sz="1600" b="0" i="0" dirty="0">
                 <a:effectLst/>
-                <a:latin typeface="Segoe WPC"/>
               </a:rPr>
               <a:t>Konténerizált architektúra: könnyű bővíthetőség, skálázhatóság, megbízható működés</a:t>
             </a:r>
@@ -11353,7 +11465,6 @@
             <a:r>
               <a:rPr lang="hu-HU" sz="1600" b="0" i="0" dirty="0">
                 <a:effectLst/>
-                <a:latin typeface="Segoe WPC"/>
               </a:rPr>
               <a:t>Valós idejű adatok kezelése Redis cache segítségével</a:t>
             </a:r>
@@ -11369,7 +11480,6 @@
             <a:r>
               <a:rPr lang="hu-HU" sz="1600" b="0" i="0" dirty="0">
                 <a:effectLst/>
-                <a:latin typeface="Segoe WPC"/>
               </a:rPr>
               <a:t>Biztonságos hozzáférés JWT token alapú hitelesítéssel</a:t>
             </a:r>
@@ -11385,7 +11495,6 @@
             <a:r>
               <a:rPr lang="hu-HU" sz="1600" b="0" i="0" dirty="0">
                 <a:effectLst/>
-                <a:latin typeface="Segoe WPC"/>
               </a:rPr>
               <a:t>Gyakorlati tapasztalat szerzése felhőalapú technológiákban és konténer-orkesztrációban</a:t>
             </a:r>
@@ -11401,7 +11510,6 @@
             <a:r>
               <a:rPr lang="hu-HU" sz="1600" b="0" i="0" dirty="0">
                 <a:effectLst/>
-                <a:latin typeface="Segoe WPC"/>
               </a:rPr>
               <a:t>A rendszer további funkciókkal (pl. chat, értesítések) bővíthető</a:t>
             </a:r>
@@ -12006,9 +12114,10 @@
           <a:lstStyle/>
           <a:p>
             <a:r>
-              <a:rPr lang="en-US" sz="4800"/>
+              <a:rPr lang="en-US" sz="4800" dirty="0" err="1"/>
               <a:t>Bevezetés</a:t>
             </a:r>
+            <a:endParaRPr lang="en-US" sz="4800" dirty="0"/>
           </a:p>
         </p:txBody>
       </p:sp>
@@ -14559,14 +14668,22 @@
           <a:lstStyle/>
           <a:p>
             <a:r>
-              <a:rPr lang="en-US" sz="4000">
+              <a:rPr lang="en-US" sz="4000" dirty="0" err="1">
                 <a:solidFill>
                   <a:schemeClr val="bg1"/>
                 </a:solidFill>
               </a:rPr>
-              <a:t>Informatikai Háttér		</a:t>
-            </a:r>
-            <a:endParaRPr lang="en-GB" sz="4000">
+              <a:t>Informatikai</a:t>
+            </a:r>
+            <a:r>
+              <a:rPr lang="en-US" sz="4000" dirty="0">
+                <a:solidFill>
+                  <a:schemeClr val="bg1"/>
+                </a:solidFill>
+              </a:rPr>
+              <a:t> Háttér		</a:t>
+            </a:r>
+            <a:endParaRPr lang="en-GB" sz="4000" dirty="0">
               <a:solidFill>
                 <a:schemeClr val="bg1"/>
               </a:solidFill>
@@ -16660,30 +16777,30 @@
           <a:lstStyle/>
           <a:p>
             <a:r>
-              <a:rPr lang="en-US" sz="4100"/>
+              <a:rPr lang="en-US" sz="4100" dirty="0"/>
               <a:t>Microservice </a:t>
             </a:r>
             <a:r>
-              <a:rPr lang="en-US" sz="4100" err="1"/>
+              <a:rPr lang="en-US" sz="4100" dirty="0" err="1"/>
               <a:t>architektúra</a:t>
             </a:r>
             <a:r>
-              <a:rPr lang="en-US" sz="4100"/>
+              <a:rPr lang="en-US" sz="4100" dirty="0"/>
               <a:t> </a:t>
             </a:r>
             <a:r>
-              <a:rPr lang="en-US" sz="4100" err="1"/>
+              <a:rPr lang="en-US" sz="4100" dirty="0" err="1"/>
               <a:t>és</a:t>
             </a:r>
             <a:r>
-              <a:rPr lang="en-US" sz="4100"/>
+              <a:rPr lang="en-US" sz="4100" dirty="0"/>
               <a:t> </a:t>
             </a:r>
             <a:r>
-              <a:rPr lang="en-US" sz="4100" err="1"/>
+              <a:rPr lang="en-US" sz="4100" dirty="0" err="1"/>
               <a:t>kubernetes</a:t>
             </a:r>
-            <a:endParaRPr lang="en-GB" sz="4100"/>
+            <a:endParaRPr lang="en-GB" sz="4100" dirty="0"/>
           </a:p>
         </p:txBody>
       </p:sp>

</xml_diff>

<commit_message>
feat: Add presentation and documentation for live streaming service project
</commit_message>
<xml_diff>
--- a/Documents/live-streaming-service-presentation.pptx
+++ b/Documents/live-streaming-service-presentation.pptx
@@ -1411,7 +1411,7 @@
   <dgm:whole/>
   <dgm:extLst>
     <a:ext uri="http://schemas.microsoft.com/office/drawing/2008/diagram">
-      <dsp:dataModelExt xmlns:dsp="http://schemas.microsoft.com/office/drawing/2008/diagram" relId="rId6" minVer="http://schemas.openxmlformats.org/drawingml/2006/diagram"/>
+      <dsp:dataModelExt xmlns:dsp="http://schemas.microsoft.com/office/drawing/2008/diagram" relId="rId7" minVer="http://schemas.openxmlformats.org/drawingml/2006/diagram"/>
     </a:ext>
   </dgm:extLst>
 </dgm:dataModel>
@@ -3296,7 +3296,7 @@
           <a:p>
             <a:fld id="{143B4103-D6FE-4A3E-BEA2-F579EC7F2BCE}" type="datetimeFigureOut">
               <a:rPr lang="en-GB" smtClean="0"/>
-              <a:t>14/05/2025</a:t>
+              <a:t>15/05/2025</a:t>
             </a:fld>
             <a:endParaRPr lang="en-GB"/>
           </a:p>
@@ -3608,7 +3608,91 @@
           <a:bodyPr/>
           <a:lstStyle/>
           <a:p>
-            <a:endParaRPr lang="en-GB"/>
+            <a:pPr marL="0" marR="0" lvl="0" indent="0" algn="l" defTabSz="914400" rtl="0" eaLnBrk="1" fontAlgn="auto" latinLnBrk="0" hangingPunct="1">
+              <a:lnSpc>
+                <a:spcPct val="100000"/>
+              </a:lnSpc>
+              <a:spcBef>
+                <a:spcPts val="0"/>
+              </a:spcBef>
+              <a:spcAft>
+                <a:spcPts val="0"/>
+              </a:spcAft>
+              <a:buClrTx/>
+              <a:buSzTx/>
+              <a:buFont typeface="Arial" panose="020B0604020202020204" pitchFamily="34" charset="0"/>
+              <a:buNone/>
+              <a:tabLst/>
+              <a:defRPr/>
+            </a:pPr>
+            <a:r>
+              <a:rPr lang="fr-FR" dirty="0" err="1"/>
+              <a:t>Sajnos</a:t>
+            </a:r>
+            <a:r>
+              <a:rPr lang="fr-FR" dirty="0"/>
+              <a:t> </a:t>
+            </a:r>
+            <a:r>
+              <a:rPr lang="fr-FR" dirty="0" err="1"/>
+              <a:t>most</a:t>
+            </a:r>
+            <a:r>
+              <a:rPr lang="fr-FR" dirty="0"/>
+              <a:t> </a:t>
+            </a:r>
+            <a:r>
+              <a:rPr lang="fr-FR" dirty="0" err="1"/>
+              <a:t>nincsenek</a:t>
+            </a:r>
+            <a:r>
+              <a:rPr lang="fr-FR" dirty="0"/>
+              <a:t> </a:t>
+            </a:r>
+            <a:r>
+              <a:rPr lang="fr-FR" dirty="0" err="1"/>
+              <a:t>itt</a:t>
+            </a:r>
+            <a:r>
+              <a:rPr lang="fr-FR" dirty="0"/>
+              <a:t> a </a:t>
+            </a:r>
+            <a:r>
+              <a:rPr lang="fr-FR" dirty="0" err="1"/>
+              <a:t>konzulensek</a:t>
+            </a:r>
+            <a:r>
+              <a:rPr lang="fr-FR" dirty="0"/>
+              <a:t>, de </a:t>
+            </a:r>
+            <a:r>
+              <a:rPr lang="fr-FR" dirty="0" err="1"/>
+              <a:t>véleményt</a:t>
+            </a:r>
+            <a:r>
+              <a:rPr lang="fr-FR" dirty="0"/>
+              <a:t> </a:t>
+            </a:r>
+            <a:r>
+              <a:rPr lang="fr-FR" dirty="0" err="1"/>
+              <a:t>írnak</a:t>
+            </a:r>
+            <a:r>
+              <a:rPr lang="fr-FR" dirty="0"/>
+              <a:t> a </a:t>
+            </a:r>
+            <a:r>
+              <a:rPr lang="fr-FR" dirty="0" err="1"/>
+              <a:t>projektről</a:t>
+            </a:r>
+            <a:endParaRPr lang="fr-FR" dirty="0"/>
+          </a:p>
+          <a:p>
+            <a:pPr marL="171450" indent="-171450">
+              <a:buFont typeface="Arial" panose="020B0604020202020204" pitchFamily="34" charset="0"/>
+              <a:buChar char="•"/>
+            </a:pPr>
+            <a:endParaRPr lang="en-GB" dirty="0"/>
           </a:p>
         </p:txBody>
       </p:sp>
@@ -3629,6 +3713,1352 @@
           <a:p>
             <a:fld id="{81694B9A-4063-49F0-81A7-C184009AF6F6}" type="slidenum">
               <a:rPr lang="en-GB" smtClean="0"/>
+              <a:t>1</a:t>
+            </a:fld>
+            <a:endParaRPr lang="en-GB"/>
+          </a:p>
+        </p:txBody>
+      </p:sp>
+    </p:spTree>
+    <p:extLst>
+      <p:ext uri="{BB962C8B-B14F-4D97-AF65-F5344CB8AC3E}">
+        <p14:creationId xmlns:p14="http://schemas.microsoft.com/office/powerpoint/2010/main" val="3799807096"/>
+      </p:ext>
+    </p:extLst>
+  </p:cSld>
+  <p:clrMapOvr>
+    <a:masterClrMapping/>
+  </p:clrMapOvr>
+</p:notes>
+</file>
+
+<file path=ppt/notesSlides/notesSlide10.xml><?xml version="1.0" encoding="utf-8"?>
+<p:notes xmlns:a="http://schemas.openxmlformats.org/drawingml/2006/main" xmlns:r="http://schemas.openxmlformats.org/officeDocument/2006/relationships" xmlns:p="http://schemas.openxmlformats.org/presentationml/2006/main">
+  <p:cSld>
+    <p:spTree>
+      <p:nvGrpSpPr>
+        <p:cNvPr id="1" name=""/>
+        <p:cNvGrpSpPr/>
+        <p:nvPr/>
+      </p:nvGrpSpPr>
+      <p:grpSpPr>
+        <a:xfrm>
+          <a:off x="0" y="0"/>
+          <a:ext cx="0" cy="0"/>
+          <a:chOff x="0" y="0"/>
+          <a:chExt cx="0" cy="0"/>
+        </a:xfrm>
+      </p:grpSpPr>
+      <p:sp>
+        <p:nvSpPr>
+          <p:cNvPr id="2" name="Slide Image Placeholder 1"/>
+          <p:cNvSpPr>
+            <a:spLocks noGrp="1" noRot="1" noChangeAspect="1"/>
+          </p:cNvSpPr>
+          <p:nvPr>
+            <p:ph type="sldImg"/>
+          </p:nvPr>
+        </p:nvSpPr>
+        <p:spPr/>
+      </p:sp>
+      <p:sp>
+        <p:nvSpPr>
+          <p:cNvPr id="3" name="Notes Placeholder 2"/>
+          <p:cNvSpPr>
+            <a:spLocks noGrp="1"/>
+          </p:cNvSpPr>
+          <p:nvPr>
+            <p:ph type="body" idx="1"/>
+          </p:nvPr>
+        </p:nvSpPr>
+        <p:spPr/>
+        <p:txBody>
+          <a:bodyPr/>
+          <a:lstStyle/>
+          <a:p>
+            <a:pPr marL="0" marR="0" lvl="0" indent="0" algn="l" defTabSz="914400" rtl="0" eaLnBrk="1" fontAlgn="auto" latinLnBrk="0" hangingPunct="1">
+              <a:lnSpc>
+                <a:spcPct val="100000"/>
+              </a:lnSpc>
+              <a:spcBef>
+                <a:spcPts val="0"/>
+              </a:spcBef>
+              <a:spcAft>
+                <a:spcPts val="0"/>
+              </a:spcAft>
+              <a:buClrTx/>
+              <a:buSzTx/>
+              <a:buFontTx/>
+              <a:buNone/>
+              <a:tabLst/>
+              <a:defRPr/>
+            </a:pPr>
+            <a:r>
+              <a:rPr lang="en-GB" dirty="0"/>
+              <a:t>Egy modern, </a:t>
+            </a:r>
+            <a:r>
+              <a:rPr lang="en-GB" dirty="0" err="1"/>
+              <a:t>mikroszolgáltatás-alapú</a:t>
+            </a:r>
+            <a:r>
+              <a:rPr lang="en-GB" dirty="0"/>
+              <a:t> streaming </a:t>
+            </a:r>
+            <a:r>
+              <a:rPr lang="en-GB" dirty="0" err="1"/>
+              <a:t>platformot</a:t>
+            </a:r>
+            <a:r>
+              <a:rPr lang="en-GB" dirty="0"/>
+              <a:t> </a:t>
+            </a:r>
+            <a:r>
+              <a:rPr lang="en-GB" dirty="0" err="1"/>
+              <a:t>fejlesztettem</a:t>
+            </a:r>
+            <a:r>
+              <a:rPr lang="en-GB" dirty="0"/>
+              <a:t> Kubernetes </a:t>
+            </a:r>
+            <a:r>
+              <a:rPr lang="en-GB" dirty="0" err="1"/>
+              <a:t>környezetben</a:t>
+            </a:r>
+            <a:r>
+              <a:rPr lang="en-GB" dirty="0"/>
+              <a:t>. A </a:t>
+            </a:r>
+            <a:r>
+              <a:rPr lang="en-GB" dirty="0" err="1"/>
+              <a:t>rendszer</a:t>
+            </a:r>
+            <a:r>
+              <a:rPr lang="en-GB" dirty="0"/>
+              <a:t> </a:t>
+            </a:r>
+            <a:r>
+              <a:rPr lang="en-GB" dirty="0" err="1"/>
+              <a:t>skálázható</a:t>
+            </a:r>
+            <a:r>
+              <a:rPr lang="en-GB" dirty="0"/>
+              <a:t>, </a:t>
+            </a:r>
+            <a:r>
+              <a:rPr lang="en-GB" dirty="0" err="1"/>
+              <a:t>biztonságos</a:t>
+            </a:r>
+            <a:r>
+              <a:rPr lang="en-GB" dirty="0"/>
+              <a:t> </a:t>
+            </a:r>
+            <a:r>
+              <a:rPr lang="en-GB" dirty="0" err="1"/>
+              <a:t>és</a:t>
+            </a:r>
+            <a:r>
+              <a:rPr lang="en-GB" dirty="0"/>
+              <a:t> </a:t>
+            </a:r>
+            <a:r>
+              <a:rPr lang="en-GB" dirty="0" err="1"/>
+              <a:t>könnyen</a:t>
+            </a:r>
+            <a:r>
+              <a:rPr lang="en-GB" dirty="0"/>
+              <a:t> </a:t>
+            </a:r>
+            <a:r>
+              <a:rPr lang="en-GB" dirty="0" err="1"/>
+              <a:t>bővíthető</a:t>
+            </a:r>
+            <a:r>
+              <a:rPr lang="en-GB" dirty="0"/>
+              <a:t>.</a:t>
+            </a:r>
+          </a:p>
+          <a:p>
+            <a:endParaRPr lang="en-GB" dirty="0"/>
+          </a:p>
+        </p:txBody>
+      </p:sp>
+      <p:sp>
+        <p:nvSpPr>
+          <p:cNvPr id="4" name="Slide Number Placeholder 3"/>
+          <p:cNvSpPr>
+            <a:spLocks noGrp="1"/>
+          </p:cNvSpPr>
+          <p:nvPr>
+            <p:ph type="sldNum" sz="quarter" idx="5"/>
+          </p:nvPr>
+        </p:nvSpPr>
+        <p:spPr/>
+        <p:txBody>
+          <a:bodyPr/>
+          <a:lstStyle/>
+          <a:p>
+            <a:fld id="{81694B9A-4063-49F0-81A7-C184009AF6F6}" type="slidenum">
+              <a:rPr lang="en-GB" smtClean="0"/>
+              <a:t>14</a:t>
+            </a:fld>
+            <a:endParaRPr lang="en-GB"/>
+          </a:p>
+        </p:txBody>
+      </p:sp>
+    </p:spTree>
+    <p:extLst>
+      <p:ext uri="{BB962C8B-B14F-4D97-AF65-F5344CB8AC3E}">
+        <p14:creationId xmlns:p14="http://schemas.microsoft.com/office/powerpoint/2010/main" val="3998028022"/>
+      </p:ext>
+    </p:extLst>
+  </p:cSld>
+  <p:clrMapOvr>
+    <a:masterClrMapping/>
+  </p:clrMapOvr>
+</p:notes>
+</file>
+
+<file path=ppt/notesSlides/notesSlide2.xml><?xml version="1.0" encoding="utf-8"?>
+<p:notes xmlns:a="http://schemas.openxmlformats.org/drawingml/2006/main" xmlns:r="http://schemas.openxmlformats.org/officeDocument/2006/relationships" xmlns:p="http://schemas.openxmlformats.org/presentationml/2006/main">
+  <p:cSld>
+    <p:spTree>
+      <p:nvGrpSpPr>
+        <p:cNvPr id="1" name=""/>
+        <p:cNvGrpSpPr/>
+        <p:nvPr/>
+      </p:nvGrpSpPr>
+      <p:grpSpPr>
+        <a:xfrm>
+          <a:off x="0" y="0"/>
+          <a:ext cx="0" cy="0"/>
+          <a:chOff x="0" y="0"/>
+          <a:chExt cx="0" cy="0"/>
+        </a:xfrm>
+      </p:grpSpPr>
+      <p:sp>
+        <p:nvSpPr>
+          <p:cNvPr id="2" name="Slide Image Placeholder 1"/>
+          <p:cNvSpPr>
+            <a:spLocks noGrp="1" noRot="1" noChangeAspect="1"/>
+          </p:cNvSpPr>
+          <p:nvPr>
+            <p:ph type="sldImg"/>
+          </p:nvPr>
+        </p:nvSpPr>
+        <p:spPr/>
+      </p:sp>
+      <p:sp>
+        <p:nvSpPr>
+          <p:cNvPr id="3" name="Notes Placeholder 2"/>
+          <p:cNvSpPr>
+            <a:spLocks noGrp="1"/>
+          </p:cNvSpPr>
+          <p:nvPr>
+            <p:ph type="body" idx="1"/>
+          </p:nvPr>
+        </p:nvSpPr>
+        <p:spPr/>
+        <p:txBody>
+          <a:bodyPr/>
+          <a:lstStyle/>
+          <a:p>
+            <a:pPr marL="0" marR="0" lvl="0" indent="0" algn="l" defTabSz="914400" rtl="0" eaLnBrk="1" fontAlgn="auto" latinLnBrk="0" hangingPunct="1">
+              <a:lnSpc>
+                <a:spcPct val="100000"/>
+              </a:lnSpc>
+              <a:spcBef>
+                <a:spcPts val="0"/>
+              </a:spcBef>
+              <a:spcAft>
+                <a:spcPts val="0"/>
+              </a:spcAft>
+              <a:buClrTx/>
+              <a:buSzTx/>
+              <a:buFontTx/>
+              <a:buNone/>
+              <a:tabLst/>
+              <a:defRPr/>
+            </a:pPr>
+            <a:r>
+              <a:rPr lang="en-GB" dirty="0"/>
+              <a:t>A </a:t>
+            </a:r>
+            <a:r>
+              <a:rPr lang="en-GB" dirty="0" err="1"/>
+              <a:t>feladatom</a:t>
+            </a:r>
+            <a:r>
+              <a:rPr lang="en-GB" dirty="0"/>
+              <a:t> </a:t>
+            </a:r>
+            <a:r>
+              <a:rPr lang="en-GB" dirty="0" err="1"/>
+              <a:t>egy</a:t>
+            </a:r>
+            <a:r>
+              <a:rPr lang="en-GB" dirty="0"/>
+              <a:t> </a:t>
+            </a:r>
+            <a:r>
+              <a:rPr lang="en-GB" dirty="0" err="1"/>
+              <a:t>élő</a:t>
+            </a:r>
+            <a:r>
+              <a:rPr lang="en-GB" dirty="0"/>
+              <a:t> </a:t>
+            </a:r>
+            <a:r>
+              <a:rPr lang="en-GB" dirty="0" err="1"/>
+              <a:t>videó</a:t>
+            </a:r>
+            <a:r>
+              <a:rPr lang="en-GB" dirty="0"/>
+              <a:t> </a:t>
+            </a:r>
+            <a:r>
+              <a:rPr lang="en-GB" dirty="0" err="1"/>
+              <a:t>közvetítő</a:t>
+            </a:r>
+            <a:r>
+              <a:rPr lang="en-GB" dirty="0"/>
+              <a:t> (streaming) </a:t>
+            </a:r>
+            <a:r>
+              <a:rPr lang="en-GB" dirty="0" err="1"/>
+              <a:t>szolgáltatás</a:t>
+            </a:r>
+            <a:r>
+              <a:rPr lang="en-GB" dirty="0"/>
+              <a:t> </a:t>
+            </a:r>
+            <a:r>
+              <a:rPr lang="en-GB" dirty="0" err="1"/>
+              <a:t>fejlesztése</a:t>
+            </a:r>
+            <a:r>
+              <a:rPr lang="en-GB" dirty="0"/>
+              <a:t> volt Kubernetes </a:t>
+            </a:r>
+            <a:r>
+              <a:rPr lang="en-GB" dirty="0" err="1"/>
+              <a:t>környezetben</a:t>
+            </a:r>
+            <a:r>
+              <a:rPr lang="en-GB" dirty="0"/>
+              <a:t>, </a:t>
+            </a:r>
+            <a:r>
+              <a:rPr lang="en-GB" dirty="0" err="1"/>
+              <a:t>mikroszolgáltatás-architektúrával</a:t>
+            </a:r>
+            <a:r>
+              <a:rPr lang="en-GB" dirty="0"/>
+              <a:t>. A </a:t>
+            </a:r>
+            <a:r>
+              <a:rPr lang="en-GB" dirty="0" err="1"/>
+              <a:t>rendszernek</a:t>
+            </a:r>
+            <a:r>
+              <a:rPr lang="en-GB" dirty="0"/>
+              <a:t> </a:t>
+            </a:r>
+            <a:r>
+              <a:rPr lang="en-GB" dirty="0" err="1"/>
+              <a:t>tartalmaznia</a:t>
+            </a:r>
+            <a:r>
+              <a:rPr lang="en-GB" dirty="0"/>
+              <a:t> </a:t>
+            </a:r>
+            <a:r>
+              <a:rPr lang="en-GB" dirty="0" err="1"/>
+              <a:t>kellett</a:t>
+            </a:r>
+            <a:r>
+              <a:rPr lang="en-GB" dirty="0"/>
+              <a:t> a stream </a:t>
+            </a:r>
+            <a:r>
+              <a:rPr lang="en-GB" dirty="0" err="1"/>
+              <a:t>kezelést</a:t>
+            </a:r>
+            <a:r>
+              <a:rPr lang="en-GB" dirty="0"/>
+              <a:t>, </a:t>
+            </a:r>
+            <a:r>
+              <a:rPr lang="en-GB" dirty="0" err="1"/>
+              <a:t>felhasználókezelést</a:t>
+            </a:r>
+            <a:r>
+              <a:rPr lang="en-GB" dirty="0"/>
+              <a:t> </a:t>
+            </a:r>
+            <a:r>
+              <a:rPr lang="en-GB" dirty="0" err="1"/>
+              <a:t>és</a:t>
+            </a:r>
+            <a:r>
+              <a:rPr lang="en-GB" dirty="0"/>
+              <a:t> </a:t>
+            </a:r>
+            <a:r>
+              <a:rPr lang="en-GB" dirty="0" err="1"/>
+              <a:t>nézőszámlálást</a:t>
+            </a:r>
+            <a:r>
+              <a:rPr lang="en-GB" dirty="0"/>
+              <a:t>,</a:t>
+            </a:r>
+          </a:p>
+        </p:txBody>
+      </p:sp>
+      <p:sp>
+        <p:nvSpPr>
+          <p:cNvPr id="4" name="Slide Number Placeholder 3"/>
+          <p:cNvSpPr>
+            <a:spLocks noGrp="1"/>
+          </p:cNvSpPr>
+          <p:nvPr>
+            <p:ph type="sldNum" sz="quarter" idx="5"/>
+          </p:nvPr>
+        </p:nvSpPr>
+        <p:spPr/>
+        <p:txBody>
+          <a:bodyPr/>
+          <a:lstStyle/>
+          <a:p>
+            <a:fld id="{81694B9A-4063-49F0-81A7-C184009AF6F6}" type="slidenum">
+              <a:rPr lang="en-GB" smtClean="0"/>
+              <a:t>3</a:t>
+            </a:fld>
+            <a:endParaRPr lang="en-GB"/>
+          </a:p>
+        </p:txBody>
+      </p:sp>
+    </p:spTree>
+    <p:extLst>
+      <p:ext uri="{BB962C8B-B14F-4D97-AF65-F5344CB8AC3E}">
+        <p14:creationId xmlns:p14="http://schemas.microsoft.com/office/powerpoint/2010/main" val="3364440227"/>
+      </p:ext>
+    </p:extLst>
+  </p:cSld>
+  <p:clrMapOvr>
+    <a:masterClrMapping/>
+  </p:clrMapOvr>
+</p:notes>
+</file>
+
+<file path=ppt/notesSlides/notesSlide3.xml><?xml version="1.0" encoding="utf-8"?>
+<p:notes xmlns:a="http://schemas.openxmlformats.org/drawingml/2006/main" xmlns:r="http://schemas.openxmlformats.org/officeDocument/2006/relationships" xmlns:p="http://schemas.openxmlformats.org/presentationml/2006/main">
+  <p:cSld>
+    <p:spTree>
+      <p:nvGrpSpPr>
+        <p:cNvPr id="1" name=""/>
+        <p:cNvGrpSpPr/>
+        <p:nvPr/>
+      </p:nvGrpSpPr>
+      <p:grpSpPr>
+        <a:xfrm>
+          <a:off x="0" y="0"/>
+          <a:ext cx="0" cy="0"/>
+          <a:chOff x="0" y="0"/>
+          <a:chExt cx="0" cy="0"/>
+        </a:xfrm>
+      </p:grpSpPr>
+      <p:sp>
+        <p:nvSpPr>
+          <p:cNvPr id="2" name="Slide Image Placeholder 1"/>
+          <p:cNvSpPr>
+            <a:spLocks noGrp="1" noRot="1" noChangeAspect="1"/>
+          </p:cNvSpPr>
+          <p:nvPr>
+            <p:ph type="sldImg"/>
+          </p:nvPr>
+        </p:nvSpPr>
+        <p:spPr/>
+      </p:sp>
+      <p:sp>
+        <p:nvSpPr>
+          <p:cNvPr id="3" name="Notes Placeholder 2"/>
+          <p:cNvSpPr>
+            <a:spLocks noGrp="1"/>
+          </p:cNvSpPr>
+          <p:nvPr>
+            <p:ph type="body" idx="1"/>
+          </p:nvPr>
+        </p:nvSpPr>
+        <p:spPr/>
+        <p:txBody>
+          <a:bodyPr/>
+          <a:lstStyle/>
+          <a:p>
+            <a:pPr marL="0" marR="0" lvl="0" indent="0" algn="l" defTabSz="914400" rtl="0" eaLnBrk="1" fontAlgn="auto" latinLnBrk="0" hangingPunct="1">
+              <a:lnSpc>
+                <a:spcPct val="100000"/>
+              </a:lnSpc>
+              <a:spcBef>
+                <a:spcPts val="0"/>
+              </a:spcBef>
+              <a:spcAft>
+                <a:spcPts val="0"/>
+              </a:spcAft>
+              <a:buClrTx/>
+              <a:buSzTx/>
+              <a:buFontTx/>
+              <a:buNone/>
+              <a:tabLst/>
+              <a:defRPr/>
+            </a:pPr>
+            <a:r>
+              <a:rPr lang="en-GB" dirty="0"/>
+              <a:t>A streaming </a:t>
+            </a:r>
+            <a:r>
+              <a:rPr lang="en-GB" dirty="0" err="1"/>
+              <a:t>szolgáltatások</a:t>
+            </a:r>
+            <a:r>
+              <a:rPr lang="en-GB" dirty="0"/>
+              <a:t> </a:t>
+            </a:r>
+            <a:r>
+              <a:rPr lang="en-GB" dirty="0" err="1"/>
+              <a:t>napjainkban</a:t>
+            </a:r>
+            <a:r>
+              <a:rPr lang="en-GB" dirty="0"/>
+              <a:t> </a:t>
+            </a:r>
+            <a:r>
+              <a:rPr lang="en-GB" dirty="0" err="1"/>
+              <a:t>elengedhetetlenek</a:t>
+            </a:r>
+            <a:r>
+              <a:rPr lang="en-GB" dirty="0"/>
+              <a:t>, </a:t>
+            </a:r>
+            <a:r>
+              <a:rPr lang="en-GB" dirty="0" err="1"/>
+              <a:t>legyen</a:t>
+            </a:r>
+            <a:r>
+              <a:rPr lang="en-GB" dirty="0"/>
+              <a:t> </a:t>
+            </a:r>
+            <a:r>
+              <a:rPr lang="en-GB" dirty="0" err="1"/>
+              <a:t>szó</a:t>
+            </a:r>
+            <a:r>
+              <a:rPr lang="en-GB" dirty="0"/>
+              <a:t> </a:t>
+            </a:r>
+            <a:r>
+              <a:rPr lang="en-GB" dirty="0" err="1"/>
+              <a:t>szórakozásról</a:t>
+            </a:r>
+            <a:r>
+              <a:rPr lang="en-GB" dirty="0"/>
+              <a:t>, </a:t>
+            </a:r>
+            <a:r>
+              <a:rPr lang="en-GB" dirty="0" err="1"/>
+              <a:t>oktatásról</a:t>
+            </a:r>
+            <a:r>
+              <a:rPr lang="en-GB" dirty="0"/>
+              <a:t> </a:t>
+            </a:r>
+            <a:r>
+              <a:rPr lang="en-GB" dirty="0" err="1"/>
+              <a:t>vagy</a:t>
+            </a:r>
+            <a:r>
+              <a:rPr lang="en-GB" dirty="0"/>
+              <a:t> </a:t>
+            </a:r>
+            <a:r>
+              <a:rPr lang="en-GB" dirty="0" err="1"/>
+              <a:t>üzleti</a:t>
+            </a:r>
+            <a:r>
+              <a:rPr lang="en-GB" dirty="0"/>
+              <a:t> </a:t>
+            </a:r>
+            <a:r>
+              <a:rPr lang="en-GB" dirty="0" err="1"/>
+              <a:t>célokról</a:t>
+            </a:r>
+            <a:r>
+              <a:rPr lang="en-GB" dirty="0"/>
+              <a:t>. Az </a:t>
+            </a:r>
+            <a:r>
+              <a:rPr lang="en-GB" dirty="0" err="1"/>
+              <a:t>ilyen</a:t>
+            </a:r>
+            <a:r>
+              <a:rPr lang="en-GB" dirty="0"/>
+              <a:t> </a:t>
+            </a:r>
+            <a:r>
+              <a:rPr lang="en-GB" dirty="0" err="1"/>
+              <a:t>rendszerek</a:t>
+            </a:r>
+            <a:r>
+              <a:rPr lang="en-GB" dirty="0"/>
+              <a:t> </a:t>
+            </a:r>
+            <a:r>
+              <a:rPr lang="en-GB" dirty="0" err="1"/>
+              <a:t>milliók</a:t>
+            </a:r>
+            <a:r>
+              <a:rPr lang="en-GB" dirty="0"/>
+              <a:t> </a:t>
+            </a:r>
+            <a:r>
+              <a:rPr lang="en-GB" dirty="0" err="1"/>
+              <a:t>által</a:t>
+            </a:r>
+            <a:r>
+              <a:rPr lang="en-GB" dirty="0"/>
+              <a:t> </a:t>
+            </a:r>
+            <a:r>
+              <a:rPr lang="en-GB" dirty="0" err="1"/>
+              <a:t>használtak</a:t>
+            </a:r>
+            <a:r>
+              <a:rPr lang="en-GB" dirty="0"/>
+              <a:t> </a:t>
+            </a:r>
+            <a:r>
+              <a:rPr lang="en-GB" dirty="0" err="1"/>
+              <a:t>és</a:t>
+            </a:r>
+            <a:r>
+              <a:rPr lang="en-GB" dirty="0"/>
+              <a:t> </a:t>
+            </a:r>
+            <a:r>
+              <a:rPr lang="en-GB" dirty="0" err="1"/>
+              <a:t>jelentős</a:t>
+            </a:r>
+            <a:r>
+              <a:rPr lang="en-GB" dirty="0"/>
+              <a:t> </a:t>
+            </a:r>
+            <a:r>
+              <a:rPr lang="en-GB" dirty="0" err="1"/>
+              <a:t>internetforgalmat</a:t>
+            </a:r>
+            <a:r>
+              <a:rPr lang="en-GB" dirty="0"/>
+              <a:t> </a:t>
+            </a:r>
+            <a:r>
+              <a:rPr lang="en-GB" dirty="0" err="1"/>
+              <a:t>generálnak</a:t>
+            </a:r>
+            <a:r>
+              <a:rPr lang="en-GB" dirty="0"/>
+              <a:t>.</a:t>
+            </a:r>
+          </a:p>
+          <a:p>
+            <a:endParaRPr lang="en-GB" dirty="0"/>
+          </a:p>
+        </p:txBody>
+      </p:sp>
+      <p:sp>
+        <p:nvSpPr>
+          <p:cNvPr id="4" name="Slide Number Placeholder 3"/>
+          <p:cNvSpPr>
+            <a:spLocks noGrp="1"/>
+          </p:cNvSpPr>
+          <p:nvPr>
+            <p:ph type="sldNum" sz="quarter" idx="5"/>
+          </p:nvPr>
+        </p:nvSpPr>
+        <p:spPr/>
+        <p:txBody>
+          <a:bodyPr/>
+          <a:lstStyle/>
+          <a:p>
+            <a:fld id="{81694B9A-4063-49F0-81A7-C184009AF6F6}" type="slidenum">
+              <a:rPr lang="en-GB" smtClean="0"/>
+              <a:t>4</a:t>
+            </a:fld>
+            <a:endParaRPr lang="en-GB"/>
+          </a:p>
+        </p:txBody>
+      </p:sp>
+    </p:spTree>
+    <p:extLst>
+      <p:ext uri="{BB962C8B-B14F-4D97-AF65-F5344CB8AC3E}">
+        <p14:creationId xmlns:p14="http://schemas.microsoft.com/office/powerpoint/2010/main" val="32064991"/>
+      </p:ext>
+    </p:extLst>
+  </p:cSld>
+  <p:clrMapOvr>
+    <a:masterClrMapping/>
+  </p:clrMapOvr>
+</p:notes>
+</file>
+
+<file path=ppt/notesSlides/notesSlide4.xml><?xml version="1.0" encoding="utf-8"?>
+<p:notes xmlns:a="http://schemas.openxmlformats.org/drawingml/2006/main" xmlns:r="http://schemas.openxmlformats.org/officeDocument/2006/relationships" xmlns:p="http://schemas.openxmlformats.org/presentationml/2006/main">
+  <p:cSld>
+    <p:spTree>
+      <p:nvGrpSpPr>
+        <p:cNvPr id="1" name=""/>
+        <p:cNvGrpSpPr/>
+        <p:nvPr/>
+      </p:nvGrpSpPr>
+      <p:grpSpPr>
+        <a:xfrm>
+          <a:off x="0" y="0"/>
+          <a:ext cx="0" cy="0"/>
+          <a:chOff x="0" y="0"/>
+          <a:chExt cx="0" cy="0"/>
+        </a:xfrm>
+      </p:grpSpPr>
+      <p:sp>
+        <p:nvSpPr>
+          <p:cNvPr id="2" name="Slide Image Placeholder 1"/>
+          <p:cNvSpPr>
+            <a:spLocks noGrp="1" noRot="1" noChangeAspect="1"/>
+          </p:cNvSpPr>
+          <p:nvPr>
+            <p:ph type="sldImg"/>
+          </p:nvPr>
+        </p:nvSpPr>
+        <p:spPr/>
+      </p:sp>
+      <p:sp>
+        <p:nvSpPr>
+          <p:cNvPr id="3" name="Notes Placeholder 2"/>
+          <p:cNvSpPr>
+            <a:spLocks noGrp="1"/>
+          </p:cNvSpPr>
+          <p:nvPr>
+            <p:ph type="body" idx="1"/>
+          </p:nvPr>
+        </p:nvSpPr>
+        <p:spPr/>
+        <p:txBody>
+          <a:bodyPr/>
+          <a:lstStyle/>
+          <a:p>
+            <a:pPr marL="0" marR="0" lvl="0" indent="0" algn="l" defTabSz="914400" rtl="0" eaLnBrk="1" fontAlgn="auto" latinLnBrk="0" hangingPunct="1">
+              <a:lnSpc>
+                <a:spcPct val="100000"/>
+              </a:lnSpc>
+              <a:spcBef>
+                <a:spcPts val="0"/>
+              </a:spcBef>
+              <a:spcAft>
+                <a:spcPts val="0"/>
+              </a:spcAft>
+              <a:buClrTx/>
+              <a:buSzTx/>
+              <a:buFontTx/>
+              <a:buNone/>
+              <a:tabLst/>
+              <a:defRPr/>
+            </a:pPr>
+            <a:r>
+              <a:rPr lang="hu-HU" dirty="0"/>
+              <a:t>A streaming rendszerek összetettek, sok komponens együttműködését igénylik. Az erőforrásigény hullámzó, amelyet felhőalapú megoldások, például a Kubernetes, jól kezelnek.</a:t>
+            </a:r>
+          </a:p>
+          <a:p>
+            <a:endParaRPr lang="en-GB" dirty="0"/>
+          </a:p>
+        </p:txBody>
+      </p:sp>
+      <p:sp>
+        <p:nvSpPr>
+          <p:cNvPr id="4" name="Slide Number Placeholder 3"/>
+          <p:cNvSpPr>
+            <a:spLocks noGrp="1"/>
+          </p:cNvSpPr>
+          <p:nvPr>
+            <p:ph type="sldNum" sz="quarter" idx="5"/>
+          </p:nvPr>
+        </p:nvSpPr>
+        <p:spPr/>
+        <p:txBody>
+          <a:bodyPr/>
+          <a:lstStyle/>
+          <a:p>
+            <a:fld id="{81694B9A-4063-49F0-81A7-C184009AF6F6}" type="slidenum">
+              <a:rPr lang="en-GB" smtClean="0"/>
+              <a:t>5</a:t>
+            </a:fld>
+            <a:endParaRPr lang="en-GB"/>
+          </a:p>
+        </p:txBody>
+      </p:sp>
+    </p:spTree>
+    <p:extLst>
+      <p:ext uri="{BB962C8B-B14F-4D97-AF65-F5344CB8AC3E}">
+        <p14:creationId xmlns:p14="http://schemas.microsoft.com/office/powerpoint/2010/main" val="1551618555"/>
+      </p:ext>
+    </p:extLst>
+  </p:cSld>
+  <p:clrMapOvr>
+    <a:masterClrMapping/>
+  </p:clrMapOvr>
+</p:notes>
+</file>
+
+<file path=ppt/notesSlides/notesSlide5.xml><?xml version="1.0" encoding="utf-8"?>
+<p:notes xmlns:a="http://schemas.openxmlformats.org/drawingml/2006/main" xmlns:r="http://schemas.openxmlformats.org/officeDocument/2006/relationships" xmlns:p="http://schemas.openxmlformats.org/presentationml/2006/main">
+  <p:cSld>
+    <p:spTree>
+      <p:nvGrpSpPr>
+        <p:cNvPr id="1" name=""/>
+        <p:cNvGrpSpPr/>
+        <p:nvPr/>
+      </p:nvGrpSpPr>
+      <p:grpSpPr>
+        <a:xfrm>
+          <a:off x="0" y="0"/>
+          <a:ext cx="0" cy="0"/>
+          <a:chOff x="0" y="0"/>
+          <a:chExt cx="0" cy="0"/>
+        </a:xfrm>
+      </p:grpSpPr>
+      <p:sp>
+        <p:nvSpPr>
+          <p:cNvPr id="2" name="Slide Image Placeholder 1"/>
+          <p:cNvSpPr>
+            <a:spLocks noGrp="1" noRot="1" noChangeAspect="1"/>
+          </p:cNvSpPr>
+          <p:nvPr>
+            <p:ph type="sldImg"/>
+          </p:nvPr>
+        </p:nvSpPr>
+        <p:spPr/>
+      </p:sp>
+      <p:sp>
+        <p:nvSpPr>
+          <p:cNvPr id="3" name="Notes Placeholder 2"/>
+          <p:cNvSpPr>
+            <a:spLocks noGrp="1"/>
+          </p:cNvSpPr>
+          <p:nvPr>
+            <p:ph type="body" idx="1"/>
+          </p:nvPr>
+        </p:nvSpPr>
+        <p:spPr/>
+        <p:txBody>
+          <a:bodyPr/>
+          <a:lstStyle/>
+          <a:p>
+            <a:pPr marL="0" marR="0" lvl="0" indent="0" algn="l" defTabSz="914400" rtl="0" eaLnBrk="1" fontAlgn="auto" latinLnBrk="0" hangingPunct="1">
+              <a:lnSpc>
+                <a:spcPct val="100000"/>
+              </a:lnSpc>
+              <a:spcBef>
+                <a:spcPts val="0"/>
+              </a:spcBef>
+              <a:spcAft>
+                <a:spcPts val="0"/>
+              </a:spcAft>
+              <a:buClrTx/>
+              <a:buSzTx/>
+              <a:buFontTx/>
+              <a:buNone/>
+              <a:tabLst/>
+              <a:defRPr/>
+            </a:pPr>
+            <a:r>
+              <a:rPr lang="en-GB" dirty="0"/>
+              <a:t>A streaming </a:t>
+            </a:r>
+            <a:r>
+              <a:rPr lang="en-GB" dirty="0" err="1"/>
+              <a:t>szolgáltatás</a:t>
+            </a:r>
+            <a:r>
+              <a:rPr lang="en-GB" dirty="0"/>
+              <a:t> </a:t>
+            </a:r>
+            <a:r>
+              <a:rPr lang="en-GB" dirty="0" err="1"/>
+              <a:t>két</a:t>
+            </a:r>
+            <a:r>
+              <a:rPr lang="en-GB" dirty="0"/>
+              <a:t> </a:t>
+            </a:r>
+            <a:r>
+              <a:rPr lang="en-GB" dirty="0" err="1"/>
+              <a:t>fő</a:t>
+            </a:r>
+            <a:r>
+              <a:rPr lang="en-GB" dirty="0"/>
+              <a:t> </a:t>
+            </a:r>
+            <a:r>
+              <a:rPr lang="en-GB" dirty="0" err="1"/>
+              <a:t>protokollt</a:t>
+            </a:r>
+            <a:r>
+              <a:rPr lang="en-GB" dirty="0"/>
+              <a:t> </a:t>
+            </a:r>
+            <a:r>
+              <a:rPr lang="en-GB" dirty="0" err="1"/>
+              <a:t>használ</a:t>
+            </a:r>
+            <a:r>
+              <a:rPr lang="en-GB" dirty="0"/>
+              <a:t>: RTMP a </a:t>
+            </a:r>
+            <a:r>
+              <a:rPr lang="en-GB" dirty="0" err="1"/>
+              <a:t>tartalom</a:t>
+            </a:r>
+            <a:r>
+              <a:rPr lang="en-GB" dirty="0"/>
+              <a:t> </a:t>
+            </a:r>
+            <a:r>
+              <a:rPr lang="en-GB" dirty="0" err="1"/>
+              <a:t>feltöltésére</a:t>
+            </a:r>
+            <a:r>
+              <a:rPr lang="en-GB" dirty="0"/>
+              <a:t> </a:t>
+            </a:r>
+            <a:r>
+              <a:rPr lang="en-GB" dirty="0" err="1"/>
+              <a:t>és</a:t>
+            </a:r>
+            <a:r>
+              <a:rPr lang="en-GB" dirty="0"/>
+              <a:t> HLS a </a:t>
+            </a:r>
+            <a:r>
+              <a:rPr lang="en-GB" dirty="0" err="1"/>
+              <a:t>lejátszásra</a:t>
+            </a:r>
+            <a:r>
+              <a:rPr lang="en-GB" dirty="0"/>
+              <a:t>. A </a:t>
+            </a:r>
+            <a:r>
+              <a:rPr lang="en-GB" dirty="0" err="1"/>
+              <a:t>szerver</a:t>
+            </a:r>
+            <a:r>
+              <a:rPr lang="en-GB" dirty="0"/>
+              <a:t> .m3u8 </a:t>
+            </a:r>
+            <a:r>
+              <a:rPr lang="en-GB" dirty="0" err="1"/>
+              <a:t>fájlokat</a:t>
+            </a:r>
+            <a:r>
+              <a:rPr lang="en-GB" dirty="0"/>
+              <a:t> </a:t>
+            </a:r>
+            <a:r>
+              <a:rPr lang="en-GB" dirty="0" err="1"/>
+              <a:t>hoz</a:t>
+            </a:r>
+            <a:r>
+              <a:rPr lang="en-GB" dirty="0"/>
+              <a:t> </a:t>
+            </a:r>
+            <a:r>
+              <a:rPr lang="en-GB" dirty="0" err="1"/>
+              <a:t>létre</a:t>
+            </a:r>
+            <a:r>
+              <a:rPr lang="en-GB" dirty="0"/>
+              <a:t>, </a:t>
+            </a:r>
+            <a:r>
+              <a:rPr lang="en-GB" dirty="0" err="1"/>
+              <a:t>amelyek</a:t>
+            </a:r>
+            <a:r>
+              <a:rPr lang="en-GB" dirty="0"/>
+              <a:t> </a:t>
+            </a:r>
+            <a:r>
+              <a:rPr lang="en-GB" dirty="0" err="1"/>
+              <a:t>tartalmazzák</a:t>
+            </a:r>
+            <a:r>
+              <a:rPr lang="en-GB" dirty="0"/>
+              <a:t> a </a:t>
+            </a:r>
+            <a:r>
+              <a:rPr lang="en-GB" dirty="0" err="1"/>
+              <a:t>videó</a:t>
+            </a:r>
+            <a:r>
+              <a:rPr lang="en-GB" dirty="0"/>
+              <a:t> </a:t>
+            </a:r>
+            <a:r>
+              <a:rPr lang="en-GB" dirty="0" err="1"/>
+              <a:t>szegmenseit</a:t>
+            </a:r>
+            <a:r>
+              <a:rPr lang="en-GB" dirty="0"/>
+              <a:t>.</a:t>
+            </a:r>
+          </a:p>
+          <a:p>
+            <a:endParaRPr lang="en-GB" dirty="0"/>
+          </a:p>
+        </p:txBody>
+      </p:sp>
+      <p:sp>
+        <p:nvSpPr>
+          <p:cNvPr id="4" name="Slide Number Placeholder 3"/>
+          <p:cNvSpPr>
+            <a:spLocks noGrp="1"/>
+          </p:cNvSpPr>
+          <p:nvPr>
+            <p:ph type="sldNum" sz="quarter" idx="5"/>
+          </p:nvPr>
+        </p:nvSpPr>
+        <p:spPr/>
+        <p:txBody>
+          <a:bodyPr/>
+          <a:lstStyle/>
+          <a:p>
+            <a:fld id="{81694B9A-4063-49F0-81A7-C184009AF6F6}" type="slidenum">
+              <a:rPr lang="en-GB" smtClean="0"/>
+              <a:t>7</a:t>
+            </a:fld>
+            <a:endParaRPr lang="en-GB"/>
+          </a:p>
+        </p:txBody>
+      </p:sp>
+    </p:spTree>
+    <p:extLst>
+      <p:ext uri="{BB962C8B-B14F-4D97-AF65-F5344CB8AC3E}">
+        <p14:creationId xmlns:p14="http://schemas.microsoft.com/office/powerpoint/2010/main" val="3703163142"/>
+      </p:ext>
+    </p:extLst>
+  </p:cSld>
+  <p:clrMapOvr>
+    <a:masterClrMapping/>
+  </p:clrMapOvr>
+</p:notes>
+</file>
+
+<file path=ppt/notesSlides/notesSlide6.xml><?xml version="1.0" encoding="utf-8"?>
+<p:notes xmlns:a="http://schemas.openxmlformats.org/drawingml/2006/main" xmlns:r="http://schemas.openxmlformats.org/officeDocument/2006/relationships" xmlns:p="http://schemas.openxmlformats.org/presentationml/2006/main">
+  <p:cSld>
+    <p:spTree>
+      <p:nvGrpSpPr>
+        <p:cNvPr id="1" name=""/>
+        <p:cNvGrpSpPr/>
+        <p:nvPr/>
+      </p:nvGrpSpPr>
+      <p:grpSpPr>
+        <a:xfrm>
+          <a:off x="0" y="0"/>
+          <a:ext cx="0" cy="0"/>
+          <a:chOff x="0" y="0"/>
+          <a:chExt cx="0" cy="0"/>
+        </a:xfrm>
+      </p:grpSpPr>
+      <p:sp>
+        <p:nvSpPr>
+          <p:cNvPr id="2" name="Slide Image Placeholder 1"/>
+          <p:cNvSpPr>
+            <a:spLocks noGrp="1" noRot="1" noChangeAspect="1"/>
+          </p:cNvSpPr>
+          <p:nvPr>
+            <p:ph type="sldImg"/>
+          </p:nvPr>
+        </p:nvSpPr>
+        <p:spPr/>
+      </p:sp>
+      <p:sp>
+        <p:nvSpPr>
+          <p:cNvPr id="3" name="Notes Placeholder 2"/>
+          <p:cNvSpPr>
+            <a:spLocks noGrp="1"/>
+          </p:cNvSpPr>
+          <p:nvPr>
+            <p:ph type="body" idx="1"/>
+          </p:nvPr>
+        </p:nvSpPr>
+        <p:spPr/>
+        <p:txBody>
+          <a:bodyPr/>
+          <a:lstStyle/>
+          <a:p>
+            <a:pPr marL="0" marR="0" lvl="0" indent="0" algn="l" defTabSz="914400" rtl="0" eaLnBrk="1" fontAlgn="auto" latinLnBrk="0" hangingPunct="1">
+              <a:lnSpc>
+                <a:spcPct val="100000"/>
+              </a:lnSpc>
+              <a:spcBef>
+                <a:spcPts val="0"/>
+              </a:spcBef>
+              <a:spcAft>
+                <a:spcPts val="0"/>
+              </a:spcAft>
+              <a:buClrTx/>
+              <a:buSzTx/>
+              <a:buFontTx/>
+              <a:buNone/>
+              <a:tabLst/>
+              <a:defRPr/>
+            </a:pPr>
+            <a:r>
+              <a:rPr lang="hu-HU" dirty="0"/>
+              <a:t>A rendszer mikroszolgáltatásokra épül, ahol minden funkció különálló szolgáltatásként fut. Kubernetes biztosítja a skálázhatóságot és az egyszerű telepítést.</a:t>
+            </a:r>
+          </a:p>
+          <a:p>
+            <a:endParaRPr lang="en-GB" dirty="0"/>
+          </a:p>
+        </p:txBody>
+      </p:sp>
+      <p:sp>
+        <p:nvSpPr>
+          <p:cNvPr id="4" name="Slide Number Placeholder 3"/>
+          <p:cNvSpPr>
+            <a:spLocks noGrp="1"/>
+          </p:cNvSpPr>
+          <p:nvPr>
+            <p:ph type="sldNum" sz="quarter" idx="5"/>
+          </p:nvPr>
+        </p:nvSpPr>
+        <p:spPr/>
+        <p:txBody>
+          <a:bodyPr/>
+          <a:lstStyle/>
+          <a:p>
+            <a:fld id="{81694B9A-4063-49F0-81A7-C184009AF6F6}" type="slidenum">
+              <a:rPr lang="en-GB" smtClean="0"/>
+              <a:t>8</a:t>
+            </a:fld>
+            <a:endParaRPr lang="en-GB"/>
+          </a:p>
+        </p:txBody>
+      </p:sp>
+    </p:spTree>
+    <p:extLst>
+      <p:ext uri="{BB962C8B-B14F-4D97-AF65-F5344CB8AC3E}">
+        <p14:creationId xmlns:p14="http://schemas.microsoft.com/office/powerpoint/2010/main" val="996059169"/>
+      </p:ext>
+    </p:extLst>
+  </p:cSld>
+  <p:clrMapOvr>
+    <a:masterClrMapping/>
+  </p:clrMapOvr>
+</p:notes>
+</file>
+
+<file path=ppt/notesSlides/notesSlide7.xml><?xml version="1.0" encoding="utf-8"?>
+<p:notes xmlns:a="http://schemas.openxmlformats.org/drawingml/2006/main" xmlns:r="http://schemas.openxmlformats.org/officeDocument/2006/relationships" xmlns:p="http://schemas.openxmlformats.org/presentationml/2006/main">
+  <p:cSld>
+    <p:spTree>
+      <p:nvGrpSpPr>
+        <p:cNvPr id="1" name=""/>
+        <p:cNvGrpSpPr/>
+        <p:nvPr/>
+      </p:nvGrpSpPr>
+      <p:grpSpPr>
+        <a:xfrm>
+          <a:off x="0" y="0"/>
+          <a:ext cx="0" cy="0"/>
+          <a:chOff x="0" y="0"/>
+          <a:chExt cx="0" cy="0"/>
+        </a:xfrm>
+      </p:grpSpPr>
+      <p:sp>
+        <p:nvSpPr>
+          <p:cNvPr id="2" name="Slide Image Placeholder 1"/>
+          <p:cNvSpPr>
+            <a:spLocks noGrp="1" noRot="1" noChangeAspect="1"/>
+          </p:cNvSpPr>
+          <p:nvPr>
+            <p:ph type="sldImg"/>
+          </p:nvPr>
+        </p:nvSpPr>
+        <p:spPr/>
+      </p:sp>
+      <p:sp>
+        <p:nvSpPr>
+          <p:cNvPr id="3" name="Notes Placeholder 2"/>
+          <p:cNvSpPr>
+            <a:spLocks noGrp="1"/>
+          </p:cNvSpPr>
+          <p:nvPr>
+            <p:ph type="body" idx="1"/>
+          </p:nvPr>
+        </p:nvSpPr>
+        <p:spPr/>
+        <p:txBody>
+          <a:bodyPr/>
+          <a:lstStyle/>
+          <a:p>
+            <a:pPr marL="0" marR="0" lvl="0" indent="0" algn="l" defTabSz="914400" rtl="0" eaLnBrk="1" fontAlgn="auto" latinLnBrk="0" hangingPunct="1">
+              <a:lnSpc>
+                <a:spcPct val="100000"/>
+              </a:lnSpc>
+              <a:spcBef>
+                <a:spcPts val="0"/>
+              </a:spcBef>
+              <a:spcAft>
+                <a:spcPts val="0"/>
+              </a:spcAft>
+              <a:buClrTx/>
+              <a:buSzTx/>
+              <a:buFontTx/>
+              <a:buNone/>
+              <a:tabLst/>
+              <a:defRPr/>
+            </a:pPr>
+            <a:r>
+              <a:rPr lang="en-GB" dirty="0"/>
+              <a:t>A </a:t>
+            </a:r>
+            <a:r>
+              <a:rPr lang="en-GB" dirty="0" err="1"/>
+              <a:t>rendszer</a:t>
+            </a:r>
+            <a:r>
+              <a:rPr lang="en-GB" dirty="0"/>
+              <a:t> </a:t>
+            </a:r>
+            <a:r>
+              <a:rPr lang="en-GB" dirty="0" err="1"/>
+              <a:t>fő</a:t>
+            </a:r>
+            <a:r>
+              <a:rPr lang="en-GB" dirty="0"/>
+              <a:t> </a:t>
+            </a:r>
+            <a:r>
+              <a:rPr lang="en-GB" dirty="0" err="1"/>
+              <a:t>komponensei</a:t>
+            </a:r>
+            <a:r>
+              <a:rPr lang="en-GB" dirty="0"/>
+              <a:t> a streaming </a:t>
+            </a:r>
+            <a:r>
+              <a:rPr lang="en-GB" dirty="0" err="1"/>
+              <a:t>szerver</a:t>
+            </a:r>
+            <a:r>
+              <a:rPr lang="en-GB" dirty="0"/>
+              <a:t>, </a:t>
+            </a:r>
+            <a:r>
+              <a:rPr lang="en-GB" dirty="0" err="1"/>
+              <a:t>az</a:t>
+            </a:r>
+            <a:r>
+              <a:rPr lang="en-GB" dirty="0"/>
+              <a:t> </a:t>
+            </a:r>
+            <a:r>
+              <a:rPr lang="en-GB" dirty="0" err="1"/>
+              <a:t>adatbázisok</a:t>
+            </a:r>
+            <a:r>
+              <a:rPr lang="en-GB" dirty="0"/>
+              <a:t> (PostgreSQL </a:t>
+            </a:r>
+            <a:r>
+              <a:rPr lang="en-GB" dirty="0" err="1"/>
+              <a:t>és</a:t>
+            </a:r>
+            <a:r>
+              <a:rPr lang="en-GB" dirty="0"/>
+              <a:t> Redis), </a:t>
+            </a:r>
+            <a:r>
+              <a:rPr lang="en-GB" dirty="0" err="1"/>
+              <a:t>valamint</a:t>
+            </a:r>
+            <a:r>
+              <a:rPr lang="en-GB" dirty="0"/>
+              <a:t> </a:t>
+            </a:r>
+            <a:r>
+              <a:rPr lang="en-GB" dirty="0" err="1"/>
+              <a:t>az</a:t>
+            </a:r>
+            <a:r>
+              <a:rPr lang="en-GB" dirty="0"/>
+              <a:t> Angular frontend. A </a:t>
+            </a:r>
+            <a:r>
+              <a:rPr lang="en-GB" dirty="0" err="1"/>
+              <a:t>szolgáltatások</a:t>
+            </a:r>
+            <a:r>
+              <a:rPr lang="en-GB" dirty="0"/>
+              <a:t> REST API-</a:t>
+            </a:r>
+            <a:r>
+              <a:rPr lang="en-GB" dirty="0" err="1"/>
+              <a:t>kon</a:t>
+            </a:r>
+            <a:r>
+              <a:rPr lang="en-GB" dirty="0"/>
+              <a:t> </a:t>
+            </a:r>
+            <a:r>
+              <a:rPr lang="en-GB" dirty="0" err="1"/>
+              <a:t>keresztül</a:t>
+            </a:r>
+            <a:r>
+              <a:rPr lang="en-GB" dirty="0"/>
+              <a:t> </a:t>
+            </a:r>
+            <a:r>
+              <a:rPr lang="en-GB" dirty="0" err="1"/>
+              <a:t>kommunikálnak</a:t>
+            </a:r>
+            <a:r>
+              <a:rPr lang="en-GB" dirty="0"/>
+              <a:t>.</a:t>
+            </a:r>
+          </a:p>
+          <a:p>
+            <a:endParaRPr lang="en-GB" dirty="0"/>
+          </a:p>
+        </p:txBody>
+      </p:sp>
+      <p:sp>
+        <p:nvSpPr>
+          <p:cNvPr id="4" name="Slide Number Placeholder 3"/>
+          <p:cNvSpPr>
+            <a:spLocks noGrp="1"/>
+          </p:cNvSpPr>
+          <p:nvPr>
+            <p:ph type="sldNum" sz="quarter" idx="5"/>
+          </p:nvPr>
+        </p:nvSpPr>
+        <p:spPr/>
+        <p:txBody>
+          <a:bodyPr/>
+          <a:lstStyle/>
+          <a:p>
+            <a:fld id="{81694B9A-4063-49F0-81A7-C184009AF6F6}" type="slidenum">
+              <a:rPr lang="en-GB" smtClean="0"/>
               <a:t>11</a:t>
             </a:fld>
             <a:endParaRPr lang="en-GB"/>
@@ -3639,6 +5069,427 @@
     <p:extLst>
       <p:ext uri="{BB962C8B-B14F-4D97-AF65-F5344CB8AC3E}">
         <p14:creationId xmlns:p14="http://schemas.microsoft.com/office/powerpoint/2010/main" val="3484615100"/>
+      </p:ext>
+    </p:extLst>
+  </p:cSld>
+  <p:clrMapOvr>
+    <a:masterClrMapping/>
+  </p:clrMapOvr>
+</p:notes>
+</file>
+
+<file path=ppt/notesSlides/notesSlide8.xml><?xml version="1.0" encoding="utf-8"?>
+<p:notes xmlns:a="http://schemas.openxmlformats.org/drawingml/2006/main" xmlns:r="http://schemas.openxmlformats.org/officeDocument/2006/relationships" xmlns:p="http://schemas.openxmlformats.org/presentationml/2006/main">
+  <p:cSld>
+    <p:spTree>
+      <p:nvGrpSpPr>
+        <p:cNvPr id="1" name=""/>
+        <p:cNvGrpSpPr/>
+        <p:nvPr/>
+      </p:nvGrpSpPr>
+      <p:grpSpPr>
+        <a:xfrm>
+          <a:off x="0" y="0"/>
+          <a:ext cx="0" cy="0"/>
+          <a:chOff x="0" y="0"/>
+          <a:chExt cx="0" cy="0"/>
+        </a:xfrm>
+      </p:grpSpPr>
+      <p:sp>
+        <p:nvSpPr>
+          <p:cNvPr id="2" name="Slide Image Placeholder 1"/>
+          <p:cNvSpPr>
+            <a:spLocks noGrp="1" noRot="1" noChangeAspect="1"/>
+          </p:cNvSpPr>
+          <p:nvPr>
+            <p:ph type="sldImg"/>
+          </p:nvPr>
+        </p:nvSpPr>
+        <p:spPr/>
+      </p:sp>
+      <p:sp>
+        <p:nvSpPr>
+          <p:cNvPr id="3" name="Notes Placeholder 2"/>
+          <p:cNvSpPr>
+            <a:spLocks noGrp="1"/>
+          </p:cNvSpPr>
+          <p:nvPr>
+            <p:ph type="body" idx="1"/>
+          </p:nvPr>
+        </p:nvSpPr>
+        <p:spPr/>
+        <p:txBody>
+          <a:bodyPr/>
+          <a:lstStyle/>
+          <a:p>
+            <a:pPr marL="0" marR="0" lvl="0" indent="0" algn="l" defTabSz="914400" rtl="0" eaLnBrk="1" fontAlgn="auto" latinLnBrk="0" hangingPunct="1">
+              <a:lnSpc>
+                <a:spcPct val="100000"/>
+              </a:lnSpc>
+              <a:spcBef>
+                <a:spcPts val="0"/>
+              </a:spcBef>
+              <a:spcAft>
+                <a:spcPts val="0"/>
+              </a:spcAft>
+              <a:buClrTx/>
+              <a:buSzTx/>
+              <a:buFontTx/>
+              <a:buNone/>
+              <a:tabLst/>
+              <a:defRPr/>
+            </a:pPr>
+            <a:r>
+              <a:rPr lang="en-GB" dirty="0"/>
+              <a:t>A </a:t>
+            </a:r>
+            <a:r>
+              <a:rPr lang="en-GB" dirty="0" err="1"/>
+              <a:t>felhasználó</a:t>
+            </a:r>
+            <a:r>
+              <a:rPr lang="en-GB" dirty="0"/>
+              <a:t> </a:t>
+            </a:r>
+            <a:r>
+              <a:rPr lang="en-GB" dirty="0" err="1"/>
+              <a:t>regisztrál</a:t>
+            </a:r>
+            <a:r>
+              <a:rPr lang="en-GB" dirty="0"/>
+              <a:t> </a:t>
+            </a:r>
+            <a:r>
+              <a:rPr lang="en-GB" dirty="0" err="1"/>
+              <a:t>és</a:t>
+            </a:r>
+            <a:r>
+              <a:rPr lang="en-GB" dirty="0"/>
+              <a:t> </a:t>
+            </a:r>
+            <a:r>
+              <a:rPr lang="en-GB" dirty="0" err="1"/>
+              <a:t>belép</a:t>
+            </a:r>
+            <a:r>
+              <a:rPr lang="en-GB" dirty="0"/>
+              <a:t>, </a:t>
+            </a:r>
+            <a:r>
+              <a:rPr lang="en-GB" dirty="0" err="1"/>
+              <a:t>majd</a:t>
+            </a:r>
+            <a:r>
+              <a:rPr lang="en-GB" dirty="0"/>
+              <a:t> </a:t>
+            </a:r>
+            <a:r>
+              <a:rPr lang="en-GB" dirty="0" err="1"/>
+              <a:t>egy</a:t>
+            </a:r>
+            <a:r>
+              <a:rPr lang="en-GB" dirty="0"/>
+              <a:t> stream </a:t>
+            </a:r>
+            <a:r>
+              <a:rPr lang="en-GB" dirty="0" err="1"/>
+              <a:t>kulcsot</a:t>
+            </a:r>
+            <a:r>
+              <a:rPr lang="en-GB" dirty="0"/>
+              <a:t> </a:t>
+            </a:r>
+            <a:r>
+              <a:rPr lang="en-GB" dirty="0" err="1"/>
+              <a:t>generál</a:t>
+            </a:r>
+            <a:r>
+              <a:rPr lang="en-GB" dirty="0"/>
+              <a:t>. </a:t>
+            </a:r>
+            <a:r>
+              <a:rPr lang="en-GB" dirty="0" err="1"/>
+              <a:t>Ezt</a:t>
+            </a:r>
+            <a:r>
+              <a:rPr lang="en-GB" dirty="0"/>
+              <a:t> a </a:t>
+            </a:r>
+            <a:r>
+              <a:rPr lang="en-GB" dirty="0" err="1"/>
+              <a:t>kulcsot</a:t>
+            </a:r>
+            <a:r>
+              <a:rPr lang="en-GB" dirty="0"/>
+              <a:t> </a:t>
+            </a:r>
+            <a:r>
+              <a:rPr lang="en-GB" dirty="0" err="1"/>
+              <a:t>használja</a:t>
+            </a:r>
+            <a:r>
+              <a:rPr lang="en-GB" dirty="0"/>
+              <a:t> a streaming </a:t>
+            </a:r>
+            <a:r>
+              <a:rPr lang="en-GB" dirty="0" err="1"/>
+              <a:t>szoftver</a:t>
+            </a:r>
+            <a:r>
+              <a:rPr lang="en-GB" dirty="0"/>
+              <a:t> (pl. OBS), </a:t>
+            </a:r>
+            <a:r>
+              <a:rPr lang="en-GB" dirty="0" err="1"/>
+              <a:t>hogy</a:t>
+            </a:r>
+            <a:r>
+              <a:rPr lang="en-GB" dirty="0"/>
+              <a:t> </a:t>
+            </a:r>
+            <a:r>
+              <a:rPr lang="en-GB" dirty="0" err="1"/>
+              <a:t>élő</a:t>
+            </a:r>
+            <a:r>
+              <a:rPr lang="en-GB" dirty="0"/>
+              <a:t> </a:t>
+            </a:r>
+            <a:r>
+              <a:rPr lang="en-GB" dirty="0" err="1"/>
+              <a:t>adást</a:t>
+            </a:r>
+            <a:r>
+              <a:rPr lang="en-GB" dirty="0"/>
+              <a:t> </a:t>
+            </a:r>
+            <a:r>
+              <a:rPr lang="en-GB" dirty="0" err="1"/>
+              <a:t>indítson</a:t>
+            </a:r>
+            <a:r>
+              <a:rPr lang="en-GB" dirty="0"/>
+              <a:t>.</a:t>
+            </a:r>
+          </a:p>
+          <a:p>
+            <a:endParaRPr lang="en-GB" dirty="0"/>
+          </a:p>
+        </p:txBody>
+      </p:sp>
+      <p:sp>
+        <p:nvSpPr>
+          <p:cNvPr id="4" name="Slide Number Placeholder 3"/>
+          <p:cNvSpPr>
+            <a:spLocks noGrp="1"/>
+          </p:cNvSpPr>
+          <p:nvPr>
+            <p:ph type="sldNum" sz="quarter" idx="5"/>
+          </p:nvPr>
+        </p:nvSpPr>
+        <p:spPr/>
+        <p:txBody>
+          <a:bodyPr/>
+          <a:lstStyle/>
+          <a:p>
+            <a:fld id="{81694B9A-4063-49F0-81A7-C184009AF6F6}" type="slidenum">
+              <a:rPr lang="en-GB" smtClean="0"/>
+              <a:t>12</a:t>
+            </a:fld>
+            <a:endParaRPr lang="en-GB"/>
+          </a:p>
+        </p:txBody>
+      </p:sp>
+    </p:spTree>
+    <p:extLst>
+      <p:ext uri="{BB962C8B-B14F-4D97-AF65-F5344CB8AC3E}">
+        <p14:creationId xmlns:p14="http://schemas.microsoft.com/office/powerpoint/2010/main" val="456544312"/>
+      </p:ext>
+    </p:extLst>
+  </p:cSld>
+  <p:clrMapOvr>
+    <a:masterClrMapping/>
+  </p:clrMapOvr>
+</p:notes>
+</file>
+
+<file path=ppt/notesSlides/notesSlide9.xml><?xml version="1.0" encoding="utf-8"?>
+<p:notes xmlns:a="http://schemas.openxmlformats.org/drawingml/2006/main" xmlns:r="http://schemas.openxmlformats.org/officeDocument/2006/relationships" xmlns:p="http://schemas.openxmlformats.org/presentationml/2006/main">
+  <p:cSld>
+    <p:spTree>
+      <p:nvGrpSpPr>
+        <p:cNvPr id="1" name=""/>
+        <p:cNvGrpSpPr/>
+        <p:nvPr/>
+      </p:nvGrpSpPr>
+      <p:grpSpPr>
+        <a:xfrm>
+          <a:off x="0" y="0"/>
+          <a:ext cx="0" cy="0"/>
+          <a:chOff x="0" y="0"/>
+          <a:chExt cx="0" cy="0"/>
+        </a:xfrm>
+      </p:grpSpPr>
+      <p:sp>
+        <p:nvSpPr>
+          <p:cNvPr id="2" name="Slide Image Placeholder 1"/>
+          <p:cNvSpPr>
+            <a:spLocks noGrp="1" noRot="1" noChangeAspect="1"/>
+          </p:cNvSpPr>
+          <p:nvPr>
+            <p:ph type="sldImg"/>
+          </p:nvPr>
+        </p:nvSpPr>
+        <p:spPr/>
+      </p:sp>
+      <p:sp>
+        <p:nvSpPr>
+          <p:cNvPr id="3" name="Notes Placeholder 2"/>
+          <p:cNvSpPr>
+            <a:spLocks noGrp="1"/>
+          </p:cNvSpPr>
+          <p:nvPr>
+            <p:ph type="body" idx="1"/>
+          </p:nvPr>
+        </p:nvSpPr>
+        <p:spPr/>
+        <p:txBody>
+          <a:bodyPr/>
+          <a:lstStyle/>
+          <a:p>
+            <a:pPr>
+              <a:buNone/>
+            </a:pPr>
+            <a:r>
+              <a:rPr lang="en-GB" dirty="0"/>
+              <a:t>A </a:t>
+            </a:r>
+            <a:r>
+              <a:rPr lang="en-GB" dirty="0" err="1"/>
+              <a:t>legnagyobb</a:t>
+            </a:r>
+            <a:r>
+              <a:rPr lang="en-GB" dirty="0"/>
+              <a:t> </a:t>
+            </a:r>
+            <a:r>
+              <a:rPr lang="en-GB" dirty="0" err="1"/>
+              <a:t>kihívás</a:t>
+            </a:r>
+            <a:r>
+              <a:rPr lang="en-GB" dirty="0"/>
+              <a:t> </a:t>
+            </a:r>
+            <a:r>
+              <a:rPr lang="en-GB" dirty="0" err="1"/>
+              <a:t>az</a:t>
+            </a:r>
+            <a:r>
+              <a:rPr lang="en-GB" dirty="0"/>
+              <a:t> </a:t>
+            </a:r>
+            <a:r>
+              <a:rPr lang="en-GB" dirty="0" err="1"/>
+              <a:t>adat-szinkronizáció</a:t>
+            </a:r>
+            <a:r>
+              <a:rPr lang="en-GB" dirty="0"/>
+              <a:t> a </a:t>
+            </a:r>
+            <a:r>
+              <a:rPr lang="en-GB" dirty="0" err="1"/>
+              <a:t>szolgáltatások</a:t>
+            </a:r>
+            <a:r>
+              <a:rPr lang="en-GB" dirty="0"/>
+              <a:t> </a:t>
+            </a:r>
+            <a:r>
+              <a:rPr lang="en-GB" dirty="0" err="1"/>
+              <a:t>között</a:t>
+            </a:r>
+            <a:r>
+              <a:rPr lang="en-GB" dirty="0"/>
+              <a:t>, a JWT </a:t>
+            </a:r>
+            <a:r>
+              <a:rPr lang="en-GB" dirty="0" err="1"/>
+              <a:t>tokenek</a:t>
+            </a:r>
+            <a:r>
+              <a:rPr lang="en-GB" dirty="0"/>
+              <a:t> </a:t>
+            </a:r>
+            <a:r>
+              <a:rPr lang="en-GB" dirty="0" err="1"/>
+              <a:t>kezelése</a:t>
+            </a:r>
+            <a:r>
+              <a:rPr lang="en-GB" dirty="0"/>
+              <a:t> </a:t>
+            </a:r>
+            <a:r>
+              <a:rPr lang="en-GB" dirty="0" err="1"/>
+              <a:t>és</a:t>
+            </a:r>
+            <a:r>
+              <a:rPr lang="en-GB" dirty="0"/>
+              <a:t> a streaming </a:t>
+            </a:r>
+            <a:r>
+              <a:rPr lang="en-GB" dirty="0" err="1"/>
+              <a:t>szerver</a:t>
+            </a:r>
+            <a:r>
+              <a:rPr lang="en-GB" dirty="0"/>
+              <a:t> </a:t>
+            </a:r>
+            <a:r>
+              <a:rPr lang="en-GB" dirty="0" err="1"/>
+              <a:t>és</a:t>
+            </a:r>
+            <a:r>
+              <a:rPr lang="en-GB" dirty="0"/>
+              <a:t> backend </a:t>
+            </a:r>
+            <a:r>
+              <a:rPr lang="en-GB" dirty="0" err="1"/>
+              <a:t>integrációja</a:t>
+            </a:r>
+            <a:r>
+              <a:rPr lang="en-GB" dirty="0"/>
+              <a:t> volt.</a:t>
+            </a:r>
+          </a:p>
+        </p:txBody>
+      </p:sp>
+      <p:sp>
+        <p:nvSpPr>
+          <p:cNvPr id="4" name="Slide Number Placeholder 3"/>
+          <p:cNvSpPr>
+            <a:spLocks noGrp="1"/>
+          </p:cNvSpPr>
+          <p:nvPr>
+            <p:ph type="sldNum" sz="quarter" idx="5"/>
+          </p:nvPr>
+        </p:nvSpPr>
+        <p:spPr/>
+        <p:txBody>
+          <a:bodyPr/>
+          <a:lstStyle/>
+          <a:p>
+            <a:fld id="{81694B9A-4063-49F0-81A7-C184009AF6F6}" type="slidenum">
+              <a:rPr lang="en-GB" smtClean="0"/>
+              <a:t>13</a:t>
+            </a:fld>
+            <a:endParaRPr lang="en-GB"/>
+          </a:p>
+        </p:txBody>
+      </p:sp>
+    </p:spTree>
+    <p:extLst>
+      <p:ext uri="{BB962C8B-B14F-4D97-AF65-F5344CB8AC3E}">
+        <p14:creationId xmlns:p14="http://schemas.microsoft.com/office/powerpoint/2010/main" val="2553210624"/>
       </p:ext>
     </p:extLst>
   </p:cSld>
@@ -7223,7 +9074,7 @@
           <p:nvPr/>
         </p:nvPicPr>
         <p:blipFill>
-          <a:blip r:embed="rId2"/>
+          <a:blip r:embed="rId3"/>
           <a:srcRect r="21793" b="-2"/>
           <a:stretch/>
         </p:blipFill>
@@ -9840,7 +11691,7 @@
           <p:nvPr/>
         </p:nvPicPr>
         <p:blipFill>
-          <a:blip r:embed="rId2"/>
+          <a:blip r:embed="rId3"/>
           <a:stretch>
             <a:fillRect/>
           </a:stretch>
@@ -9870,7 +11721,7 @@
           <p:nvPr/>
         </p:nvPicPr>
         <p:blipFill>
-          <a:blip r:embed="rId3"/>
+          <a:blip r:embed="rId4"/>
           <a:stretch>
             <a:fillRect/>
           </a:stretch>
@@ -9900,7 +11751,7 @@
           <p:nvPr/>
         </p:nvPicPr>
         <p:blipFill>
-          <a:blip r:embed="rId4"/>
+          <a:blip r:embed="rId5"/>
           <a:stretch>
             <a:fillRect/>
           </a:stretch>
@@ -10805,7 +12656,7 @@
           <p:nvPr/>
         </p:nvPicPr>
         <p:blipFill>
-          <a:blip r:embed="rId2">
+          <a:blip r:embed="rId3">
             <a:extLst>
               <a:ext uri="{28A0092B-C50C-407E-A947-70E740481C1C}">
                 <a14:useLocalDpi xmlns:a14="http://schemas.microsoft.com/office/drawing/2010/main" val="0"/>
@@ -11539,7 +13390,7 @@
           <p:nvPr/>
         </p:nvPicPr>
         <p:blipFill>
-          <a:blip r:embed="rId2">
+          <a:blip r:embed="rId3">
             <a:extLst>
               <a:ext uri="{28A0092B-C50C-407E-A947-70E740481C1C}">
                 <a14:useLocalDpi xmlns:a14="http://schemas.microsoft.com/office/drawing/2010/main" val="0"/>
@@ -14009,7 +15860,7 @@
           </p:nvPr>
         </p:nvPicPr>
         <p:blipFill>
-          <a:blip r:embed="rId2">
+          <a:blip r:embed="rId3">
             <a:extLst>
               <a:ext uri="{28A0092B-C50C-407E-A947-70E740481C1C}">
                 <a14:useLocalDpi xmlns:a14="http://schemas.microsoft.com/office/drawing/2010/main" val="0"/>
@@ -14762,7 +16613,7 @@
         </p:xfrm>
         <a:graphic>
           <a:graphicData uri="http://schemas.openxmlformats.org/drawingml/2006/diagram">
-            <dgm:relIds xmlns:dgm="http://schemas.openxmlformats.org/drawingml/2006/diagram" xmlns:r="http://schemas.openxmlformats.org/officeDocument/2006/relationships" r:dm="rId2" r:lo="rId3" r:qs="rId4" r:cs="rId5"/>
+            <dgm:relIds xmlns:dgm="http://schemas.openxmlformats.org/drawingml/2006/diagram" xmlns:r="http://schemas.openxmlformats.org/officeDocument/2006/relationships" r:dm="rId3" r:lo="rId4" r:qs="rId5" r:cs="rId6"/>
           </a:graphicData>
         </a:graphic>
       </p:graphicFrame>
@@ -16130,7 +17981,7 @@
           <p:nvPr/>
         </p:nvPicPr>
         <p:blipFill>
-          <a:blip r:embed="rId2"/>
+          <a:blip r:embed="rId3"/>
           <a:stretch>
             <a:fillRect/>
           </a:stretch>
@@ -16988,7 +18839,7 @@
           <p:nvPr/>
         </p:nvPicPr>
         <p:blipFill>
-          <a:blip r:embed="rId2">
+          <a:blip r:embed="rId3">
             <a:extLst>
               <a:ext uri="{28A0092B-C50C-407E-A947-70E740481C1C}">
                 <a14:useLocalDpi xmlns:a14="http://schemas.microsoft.com/office/drawing/2010/main" val="0"/>

</xml_diff>